<commit_message>
added some exercises to the ppt.
</commit_message>
<xml_diff>
--- a/Version control with Git/Version control with Git.pptx
+++ b/Version control with Git/Version control with Git.pptx
@@ -9,22 +9,26 @@
     <p:sldId id="257" r:id="rId3"/>
     <p:sldId id="258" r:id="rId4"/>
     <p:sldId id="262" r:id="rId5"/>
-    <p:sldId id="259" r:id="rId6"/>
-    <p:sldId id="260" r:id="rId7"/>
-    <p:sldId id="261" r:id="rId8"/>
-    <p:sldId id="263" r:id="rId9"/>
-    <p:sldId id="264" r:id="rId10"/>
-    <p:sldId id="265" r:id="rId11"/>
-    <p:sldId id="266" r:id="rId12"/>
-    <p:sldId id="267" r:id="rId13"/>
-    <p:sldId id="268" r:id="rId14"/>
-    <p:sldId id="269" r:id="rId15"/>
-    <p:sldId id="270" r:id="rId16"/>
-    <p:sldId id="271" r:id="rId17"/>
-    <p:sldId id="272" r:id="rId18"/>
-    <p:sldId id="273" r:id="rId19"/>
-    <p:sldId id="274" r:id="rId20"/>
-    <p:sldId id="275" r:id="rId21"/>
+    <p:sldId id="276" r:id="rId6"/>
+    <p:sldId id="259" r:id="rId7"/>
+    <p:sldId id="260" r:id="rId8"/>
+    <p:sldId id="261" r:id="rId9"/>
+    <p:sldId id="263" r:id="rId10"/>
+    <p:sldId id="264" r:id="rId11"/>
+    <p:sldId id="277" r:id="rId12"/>
+    <p:sldId id="265" r:id="rId13"/>
+    <p:sldId id="266" r:id="rId14"/>
+    <p:sldId id="267" r:id="rId15"/>
+    <p:sldId id="278" r:id="rId16"/>
+    <p:sldId id="268" r:id="rId17"/>
+    <p:sldId id="269" r:id="rId18"/>
+    <p:sldId id="270" r:id="rId19"/>
+    <p:sldId id="271" r:id="rId20"/>
+    <p:sldId id="279" r:id="rId21"/>
+    <p:sldId id="272" r:id="rId22"/>
+    <p:sldId id="273" r:id="rId23"/>
+    <p:sldId id="274" r:id="rId24"/>
+    <p:sldId id="275" r:id="rId25"/>
   </p:sldIdLst>
   <p:sldSz cx="12192000" cy="6858000"/>
   <p:notesSz cx="6858000" cy="9144000"/>
@@ -257,7 +261,7 @@
           <a:p>
             <a:fld id="{F46AD298-04C2-4590-B959-0583A35A276E}" type="datetimeFigureOut">
               <a:rPr lang="en-US" smtClean="0"/>
-              <a:t>11/9/2016</a:t>
+              <a:t>11/10/2016</a:t>
             </a:fld>
             <a:endParaRPr lang="en-US"/>
           </a:p>
@@ -427,7 +431,7 @@
           <a:p>
             <a:fld id="{F46AD298-04C2-4590-B959-0583A35A276E}" type="datetimeFigureOut">
               <a:rPr lang="en-US" smtClean="0"/>
-              <a:t>11/9/2016</a:t>
+              <a:t>11/10/2016</a:t>
             </a:fld>
             <a:endParaRPr lang="en-US"/>
           </a:p>
@@ -607,7 +611,7 @@
           <a:p>
             <a:fld id="{F46AD298-04C2-4590-B959-0583A35A276E}" type="datetimeFigureOut">
               <a:rPr lang="en-US" smtClean="0"/>
-              <a:t>11/9/2016</a:t>
+              <a:t>11/10/2016</a:t>
             </a:fld>
             <a:endParaRPr lang="en-US"/>
           </a:p>
@@ -777,7 +781,7 @@
           <a:p>
             <a:fld id="{F46AD298-04C2-4590-B959-0583A35A276E}" type="datetimeFigureOut">
               <a:rPr lang="en-US" smtClean="0"/>
-              <a:t>11/9/2016</a:t>
+              <a:t>11/10/2016</a:t>
             </a:fld>
             <a:endParaRPr lang="en-US"/>
           </a:p>
@@ -1023,7 +1027,7 @@
           <a:p>
             <a:fld id="{F46AD298-04C2-4590-B959-0583A35A276E}" type="datetimeFigureOut">
               <a:rPr lang="en-US" smtClean="0"/>
-              <a:t>11/9/2016</a:t>
+              <a:t>11/10/2016</a:t>
             </a:fld>
             <a:endParaRPr lang="en-US"/>
           </a:p>
@@ -1255,7 +1259,7 @@
           <a:p>
             <a:fld id="{F46AD298-04C2-4590-B959-0583A35A276E}" type="datetimeFigureOut">
               <a:rPr lang="en-US" smtClean="0"/>
-              <a:t>11/9/2016</a:t>
+              <a:t>11/10/2016</a:t>
             </a:fld>
             <a:endParaRPr lang="en-US"/>
           </a:p>
@@ -1622,7 +1626,7 @@
           <a:p>
             <a:fld id="{F46AD298-04C2-4590-B959-0583A35A276E}" type="datetimeFigureOut">
               <a:rPr lang="en-US" smtClean="0"/>
-              <a:t>11/9/2016</a:t>
+              <a:t>11/10/2016</a:t>
             </a:fld>
             <a:endParaRPr lang="en-US"/>
           </a:p>
@@ -1740,7 +1744,7 @@
           <a:p>
             <a:fld id="{F46AD298-04C2-4590-B959-0583A35A276E}" type="datetimeFigureOut">
               <a:rPr lang="en-US" smtClean="0"/>
-              <a:t>11/9/2016</a:t>
+              <a:t>11/10/2016</a:t>
             </a:fld>
             <a:endParaRPr lang="en-US"/>
           </a:p>
@@ -1835,7 +1839,7 @@
           <a:p>
             <a:fld id="{F46AD298-04C2-4590-B959-0583A35A276E}" type="datetimeFigureOut">
               <a:rPr lang="en-US" smtClean="0"/>
-              <a:t>11/9/2016</a:t>
+              <a:t>11/10/2016</a:t>
             </a:fld>
             <a:endParaRPr lang="en-US"/>
           </a:p>
@@ -2112,7 +2116,7 @@
           <a:p>
             <a:fld id="{F46AD298-04C2-4590-B959-0583A35A276E}" type="datetimeFigureOut">
               <a:rPr lang="en-US" smtClean="0"/>
-              <a:t>11/9/2016</a:t>
+              <a:t>11/10/2016</a:t>
             </a:fld>
             <a:endParaRPr lang="en-US"/>
           </a:p>
@@ -2365,7 +2369,7 @@
           <a:p>
             <a:fld id="{F46AD298-04C2-4590-B959-0583A35A276E}" type="datetimeFigureOut">
               <a:rPr lang="en-US" smtClean="0"/>
-              <a:t>11/9/2016</a:t>
+              <a:t>11/10/2016</a:t>
             </a:fld>
             <a:endParaRPr lang="en-US"/>
           </a:p>
@@ -2578,7 +2582,7 @@
           <a:p>
             <a:fld id="{F46AD298-04C2-4590-B959-0583A35A276E}" type="datetimeFigureOut">
               <a:rPr lang="en-US" smtClean="0"/>
-              <a:t>11/9/2016</a:t>
+              <a:t>11/10/2016</a:t>
             </a:fld>
             <a:endParaRPr lang="en-US"/>
           </a:p>
@@ -3065,6 +3069,413 @@
           <a:chExt cx="0" cy="0"/>
         </a:xfrm>
       </p:grpSpPr>
+      <p:pic>
+        <p:nvPicPr>
+          <p:cNvPr id="3" name="Picture 2"/>
+          <p:cNvPicPr>
+            <a:picLocks noChangeAspect="1"/>
+          </p:cNvPicPr>
+          <p:nvPr/>
+        </p:nvPicPr>
+        <p:blipFill>
+          <a:blip r:embed="rId2">
+            <a:extLst>
+              <a:ext uri="{28A0092B-C50C-407E-A947-70E740481C1C}">
+                <a14:useLocalDpi xmlns:a14="http://schemas.microsoft.com/office/drawing/2010/main" val="0"/>
+              </a:ext>
+            </a:extLst>
+          </a:blip>
+          <a:stretch>
+            <a:fillRect/>
+          </a:stretch>
+        </p:blipFill>
+        <p:spPr>
+          <a:xfrm>
+            <a:off x="2935966" y="1625443"/>
+            <a:ext cx="6320068" cy="3607113"/>
+          </a:xfrm>
+          <a:prstGeom prst="rect">
+            <a:avLst/>
+          </a:prstGeom>
+        </p:spPr>
+      </p:pic>
+    </p:spTree>
+    <p:extLst>
+      <p:ext uri="{BB962C8B-B14F-4D97-AF65-F5344CB8AC3E}">
+        <p14:creationId xmlns:p14="http://schemas.microsoft.com/office/powerpoint/2010/main" val="1951551477"/>
+      </p:ext>
+    </p:extLst>
+  </p:cSld>
+  <p:clrMapOvr>
+    <a:masterClrMapping/>
+  </p:clrMapOvr>
+  <p:timing>
+    <p:tnLst>
+      <p:par>
+        <p:cTn id="1" dur="indefinite" restart="never" nodeType="tmRoot"/>
+      </p:par>
+    </p:tnLst>
+  </p:timing>
+</p:sld>
+</file>
+
+<file path=ppt/slides/slide11.xml><?xml version="1.0" encoding="utf-8"?>
+<p:sld xmlns:a="http://schemas.openxmlformats.org/drawingml/2006/main" xmlns:r="http://schemas.openxmlformats.org/officeDocument/2006/relationships" xmlns:p="http://schemas.openxmlformats.org/presentationml/2006/main">
+  <p:cSld>
+    <p:spTree>
+      <p:nvGrpSpPr>
+        <p:cNvPr id="1" name=""/>
+        <p:cNvGrpSpPr/>
+        <p:nvPr/>
+      </p:nvGrpSpPr>
+      <p:grpSpPr>
+        <a:xfrm>
+          <a:off x="0" y="0"/>
+          <a:ext cx="0" cy="0"/>
+          <a:chOff x="0" y="0"/>
+          <a:chExt cx="0" cy="0"/>
+        </a:xfrm>
+      </p:grpSpPr>
+      <p:sp>
+        <p:nvSpPr>
+          <p:cNvPr id="2" name="Title 1"/>
+          <p:cNvSpPr>
+            <a:spLocks noGrp="1"/>
+          </p:cNvSpPr>
+          <p:nvPr>
+            <p:ph type="title"/>
+          </p:nvPr>
+        </p:nvSpPr>
+        <p:spPr>
+          <a:xfrm>
+            <a:off x="0" y="0"/>
+            <a:ext cx="7477125" cy="835025"/>
+          </a:xfrm>
+        </p:spPr>
+        <p:txBody>
+          <a:bodyPr/>
+          <a:lstStyle/>
+          <a:p>
+            <a:r>
+              <a:rPr lang="en-US" dirty="0" smtClean="0"/>
+              <a:t>Tracking Changes</a:t>
+            </a:r>
+            <a:endParaRPr lang="en-US" dirty="0"/>
+          </a:p>
+        </p:txBody>
+      </p:sp>
+      <p:sp>
+        <p:nvSpPr>
+          <p:cNvPr id="3" name="Content Placeholder 2"/>
+          <p:cNvSpPr>
+            <a:spLocks noGrp="1"/>
+          </p:cNvSpPr>
+          <p:nvPr>
+            <p:ph idx="1"/>
+          </p:nvPr>
+        </p:nvSpPr>
+        <p:spPr>
+          <a:xfrm>
+            <a:off x="207818" y="883948"/>
+            <a:ext cx="10644620" cy="5631151"/>
+          </a:xfrm>
+        </p:spPr>
+        <p:txBody>
+          <a:bodyPr>
+            <a:normAutofit fontScale="70000" lnSpcReduction="20000"/>
+          </a:bodyPr>
+          <a:lstStyle/>
+          <a:p>
+            <a:pPr marL="0" indent="0">
+              <a:buNone/>
+            </a:pPr>
+            <a:r>
+              <a:rPr lang="en-US" dirty="0" smtClean="0"/>
+              <a:t>Exercises </a:t>
+            </a:r>
+            <a:endParaRPr lang="en-US" dirty="0" smtClean="0"/>
+          </a:p>
+          <a:p>
+            <a:r>
+              <a:rPr lang="en-US" dirty="0"/>
+              <a:t>Which of the following commit messages would be most appropriate for the last commit made to mars.txt?</a:t>
+            </a:r>
+          </a:p>
+          <a:p>
+            <a:pPr marL="914400" lvl="1" indent="-457200">
+              <a:buFont typeface="+mj-lt"/>
+              <a:buAutoNum type="arabicPeriod"/>
+            </a:pPr>
+            <a:r>
+              <a:rPr lang="en-US" dirty="0"/>
+              <a:t>“Changes”</a:t>
+            </a:r>
+          </a:p>
+          <a:p>
+            <a:pPr marL="914400" lvl="1" indent="-457200">
+              <a:buFont typeface="+mj-lt"/>
+              <a:buAutoNum type="arabicPeriod"/>
+            </a:pPr>
+            <a:r>
+              <a:rPr lang="en-US" dirty="0"/>
+              <a:t>“Added line ‘But the Mummy will appreciate the lack of humidity’ to mars.txt”</a:t>
+            </a:r>
+          </a:p>
+          <a:p>
+            <a:pPr marL="914400" lvl="1" indent="-457200">
+              <a:buFont typeface="+mj-lt"/>
+              <a:buAutoNum type="arabicPeriod"/>
+            </a:pPr>
+            <a:r>
+              <a:rPr lang="en-US" dirty="0"/>
+              <a:t>“Discuss effects of Mars’ climate on the Mummy”</a:t>
+            </a:r>
+          </a:p>
+          <a:p>
+            <a:endParaRPr lang="en-US" dirty="0" smtClean="0"/>
+          </a:p>
+          <a:p>
+            <a:r>
+              <a:rPr lang="en-US" dirty="0" smtClean="0"/>
+              <a:t>Which </a:t>
+            </a:r>
+            <a:r>
+              <a:rPr lang="en-US" dirty="0"/>
+              <a:t>command(s) below would save the changes of myfile.txt to my local </a:t>
+            </a:r>
+            <a:r>
+              <a:rPr lang="en-US" dirty="0" err="1"/>
+              <a:t>Git</a:t>
+            </a:r>
+            <a:r>
+              <a:rPr lang="en-US" dirty="0"/>
+              <a:t> repository?</a:t>
+            </a:r>
+          </a:p>
+          <a:p>
+            <a:pPr marL="914400" lvl="1" indent="-457200">
+              <a:buFont typeface="+mj-lt"/>
+              <a:buAutoNum type="arabicPeriod"/>
+            </a:pPr>
+            <a:r>
+              <a:rPr lang="en-US" dirty="0"/>
+              <a:t>$ </a:t>
+            </a:r>
+            <a:r>
+              <a:rPr lang="en-US" dirty="0" err="1"/>
+              <a:t>git</a:t>
+            </a:r>
+            <a:r>
+              <a:rPr lang="en-US" dirty="0"/>
+              <a:t> commit -m "my recent changes"</a:t>
+            </a:r>
+          </a:p>
+          <a:p>
+            <a:pPr marL="914400" lvl="1" indent="-457200">
+              <a:buFont typeface="+mj-lt"/>
+              <a:buAutoNum type="arabicPeriod"/>
+            </a:pPr>
+            <a:r>
+              <a:rPr lang="en-US" dirty="0"/>
+              <a:t>$ </a:t>
+            </a:r>
+            <a:r>
+              <a:rPr lang="en-US" dirty="0" err="1"/>
+              <a:t>git</a:t>
+            </a:r>
+            <a:r>
+              <a:rPr lang="en-US" dirty="0"/>
+              <a:t> </a:t>
+            </a:r>
+            <a:r>
+              <a:rPr lang="en-US" dirty="0" err="1"/>
+              <a:t>init</a:t>
+            </a:r>
+            <a:r>
+              <a:rPr lang="en-US" dirty="0"/>
+              <a:t> myfile.txt</a:t>
+            </a:r>
+            <a:br>
+              <a:rPr lang="en-US" dirty="0"/>
+            </a:br>
+            <a:r>
+              <a:rPr lang="en-US" dirty="0"/>
+              <a:t>$ </a:t>
+            </a:r>
+            <a:r>
+              <a:rPr lang="en-US" dirty="0" err="1"/>
+              <a:t>git</a:t>
+            </a:r>
+            <a:r>
+              <a:rPr lang="en-US" dirty="0"/>
+              <a:t> commit -m "my recent changes"</a:t>
+            </a:r>
+          </a:p>
+          <a:p>
+            <a:pPr marL="914400" lvl="1" indent="-457200">
+              <a:buFont typeface="+mj-lt"/>
+              <a:buAutoNum type="arabicPeriod"/>
+            </a:pPr>
+            <a:r>
+              <a:rPr lang="en-US" dirty="0"/>
+              <a:t>$ </a:t>
+            </a:r>
+            <a:r>
+              <a:rPr lang="en-US" dirty="0" err="1"/>
+              <a:t>git</a:t>
+            </a:r>
+            <a:r>
+              <a:rPr lang="en-US" dirty="0"/>
+              <a:t> add myfile.txt</a:t>
+            </a:r>
+            <a:br>
+              <a:rPr lang="en-US" dirty="0"/>
+            </a:br>
+            <a:r>
+              <a:rPr lang="en-US" dirty="0"/>
+              <a:t>$ </a:t>
+            </a:r>
+            <a:r>
+              <a:rPr lang="en-US" dirty="0" err="1"/>
+              <a:t>git</a:t>
+            </a:r>
+            <a:r>
+              <a:rPr lang="en-US" dirty="0"/>
+              <a:t> commit -m "my recent changes"</a:t>
+            </a:r>
+          </a:p>
+          <a:p>
+            <a:pPr marL="914400" lvl="1" indent="-457200">
+              <a:buFont typeface="+mj-lt"/>
+              <a:buAutoNum type="arabicPeriod"/>
+            </a:pPr>
+            <a:r>
+              <a:rPr lang="en-US" dirty="0"/>
+              <a:t>$ </a:t>
+            </a:r>
+            <a:r>
+              <a:rPr lang="en-US" dirty="0" err="1"/>
+              <a:t>git</a:t>
+            </a:r>
+            <a:r>
+              <a:rPr lang="en-US" dirty="0"/>
+              <a:t> commit -m myfile.txt "my recent </a:t>
+            </a:r>
+            <a:r>
+              <a:rPr lang="en-US" dirty="0" smtClean="0"/>
+              <a:t>changes“</a:t>
+            </a:r>
+          </a:p>
+          <a:p>
+            <a:pPr marL="914400" lvl="1" indent="-457200">
+              <a:buFont typeface="+mj-lt"/>
+              <a:buAutoNum type="arabicPeriod"/>
+            </a:pPr>
+            <a:endParaRPr lang="en-US" dirty="0" smtClean="0"/>
+          </a:p>
+          <a:p>
+            <a:r>
+              <a:rPr lang="en-US" dirty="0"/>
+              <a:t>The staging area can hold changes from any number of files that you want to commit as a single snapshot.</a:t>
+            </a:r>
+          </a:p>
+          <a:p>
+            <a:pPr marL="914400" lvl="1" indent="-457200">
+              <a:buFont typeface="+mj-lt"/>
+              <a:buAutoNum type="arabicPeriod"/>
+            </a:pPr>
+            <a:r>
+              <a:rPr lang="en-US" dirty="0"/>
+              <a:t>Add some text to mars.txt noting your decision to consider Venus as a base</a:t>
+            </a:r>
+          </a:p>
+          <a:p>
+            <a:pPr marL="914400" lvl="1" indent="-457200">
+              <a:buFont typeface="+mj-lt"/>
+              <a:buAutoNum type="arabicPeriod"/>
+            </a:pPr>
+            <a:r>
+              <a:rPr lang="en-US" dirty="0"/>
+              <a:t>Create a new file venus.txt with your initial thoughts about Venus as a base for you and your friends</a:t>
+            </a:r>
+          </a:p>
+          <a:p>
+            <a:pPr marL="914400" lvl="1" indent="-457200">
+              <a:buFont typeface="+mj-lt"/>
+              <a:buAutoNum type="arabicPeriod"/>
+            </a:pPr>
+            <a:r>
+              <a:rPr lang="en-US" dirty="0"/>
+              <a:t>Add changes from both files to the </a:t>
+            </a:r>
+            <a:r>
+              <a:rPr lang="en-US" dirty="0" smtClean="0"/>
+              <a:t>staging </a:t>
+            </a:r>
+            <a:r>
+              <a:rPr lang="en-US" dirty="0"/>
+              <a:t>area, and commit those changes.</a:t>
+            </a:r>
+          </a:p>
+          <a:p>
+            <a:endParaRPr lang="en-US" dirty="0" smtClean="0"/>
+          </a:p>
+          <a:p>
+            <a:pPr marL="457200" lvl="1" indent="0">
+              <a:buNone/>
+            </a:pPr>
+            <a:endParaRPr lang="en-US" dirty="0" smtClean="0"/>
+          </a:p>
+          <a:p>
+            <a:pPr marL="457200" lvl="1" indent="0">
+              <a:buNone/>
+            </a:pPr>
+            <a:endParaRPr lang="en-US" dirty="0"/>
+          </a:p>
+          <a:p>
+            <a:pPr marL="457200" lvl="1" indent="0">
+              <a:buNone/>
+            </a:pPr>
+            <a:endParaRPr lang="en-US" dirty="0"/>
+          </a:p>
+          <a:p>
+            <a:pPr marL="0" indent="0">
+              <a:buNone/>
+            </a:pPr>
+            <a:endParaRPr lang="en-US" dirty="0" smtClean="0"/>
+          </a:p>
+        </p:txBody>
+      </p:sp>
+    </p:spTree>
+    <p:extLst>
+      <p:ext uri="{BB962C8B-B14F-4D97-AF65-F5344CB8AC3E}">
+        <p14:creationId xmlns:p14="http://schemas.microsoft.com/office/powerpoint/2010/main" val="153116653"/>
+      </p:ext>
+    </p:extLst>
+  </p:cSld>
+  <p:clrMapOvr>
+    <a:masterClrMapping/>
+  </p:clrMapOvr>
+</p:sld>
+</file>
+
+<file path=ppt/slides/slide12.xml><?xml version="1.0" encoding="utf-8"?>
+<p:sld xmlns:a="http://schemas.openxmlformats.org/drawingml/2006/main" xmlns:r="http://schemas.openxmlformats.org/officeDocument/2006/relationships" xmlns:p="http://schemas.openxmlformats.org/presentationml/2006/main">
+  <p:cSld>
+    <p:spTree>
+      <p:nvGrpSpPr>
+        <p:cNvPr id="1" name=""/>
+        <p:cNvGrpSpPr/>
+        <p:nvPr/>
+      </p:nvGrpSpPr>
+      <p:grpSpPr>
+        <a:xfrm>
+          <a:off x="0" y="0"/>
+          <a:ext cx="0" cy="0"/>
+          <a:chOff x="0" y="0"/>
+          <a:chExt cx="0" cy="0"/>
+        </a:xfrm>
+      </p:grpSpPr>
       <p:sp>
         <p:nvSpPr>
           <p:cNvPr id="2" name="Title 1"/>
@@ -3216,7 +3627,7 @@
 </p:sld>
 </file>
 
-<file path=ppt/slides/slide11.xml><?xml version="1.0" encoding="utf-8"?>
+<file path=ppt/slides/slide13.xml><?xml version="1.0" encoding="utf-8"?>
 <p:sld xmlns:a="http://schemas.openxmlformats.org/drawingml/2006/main" xmlns:r="http://schemas.openxmlformats.org/officeDocument/2006/relationships" xmlns:p="http://schemas.openxmlformats.org/presentationml/2006/main">
   <p:cSld>
     <p:spTree>
@@ -3276,7 +3687,7 @@
 </p:sld>
 </file>
 
-<file path=ppt/slides/slide12.xml><?xml version="1.0" encoding="utf-8"?>
+<file path=ppt/slides/slide14.xml><?xml version="1.0" encoding="utf-8"?>
 <p:sld xmlns:a="http://schemas.openxmlformats.org/drawingml/2006/main" xmlns:r="http://schemas.openxmlformats.org/officeDocument/2006/relationships" xmlns:p="http://schemas.openxmlformats.org/presentationml/2006/main">
   <p:cSld>
     <p:spTree>
@@ -3336,7 +3747,331 @@
 </p:sld>
 </file>
 
-<file path=ppt/slides/slide13.xml><?xml version="1.0" encoding="utf-8"?>
+<file path=ppt/slides/slide15.xml><?xml version="1.0" encoding="utf-8"?>
+<p:sld xmlns:a="http://schemas.openxmlformats.org/drawingml/2006/main" xmlns:r="http://schemas.openxmlformats.org/officeDocument/2006/relationships" xmlns:p="http://schemas.openxmlformats.org/presentationml/2006/main">
+  <p:cSld>
+    <p:spTree>
+      <p:nvGrpSpPr>
+        <p:cNvPr id="1" name=""/>
+        <p:cNvGrpSpPr/>
+        <p:nvPr/>
+      </p:nvGrpSpPr>
+      <p:grpSpPr>
+        <a:xfrm>
+          <a:off x="0" y="0"/>
+          <a:ext cx="0" cy="0"/>
+          <a:chOff x="0" y="0"/>
+          <a:chExt cx="0" cy="0"/>
+        </a:xfrm>
+      </p:grpSpPr>
+      <p:sp>
+        <p:nvSpPr>
+          <p:cNvPr id="2" name="Title 1"/>
+          <p:cNvSpPr>
+            <a:spLocks noGrp="1"/>
+          </p:cNvSpPr>
+          <p:nvPr>
+            <p:ph type="title"/>
+          </p:nvPr>
+        </p:nvSpPr>
+        <p:spPr>
+          <a:xfrm>
+            <a:off x="0" y="0"/>
+            <a:ext cx="7477125" cy="835025"/>
+          </a:xfrm>
+        </p:spPr>
+        <p:txBody>
+          <a:bodyPr/>
+          <a:lstStyle/>
+          <a:p>
+            <a:r>
+              <a:rPr lang="en-US" dirty="0" smtClean="0"/>
+              <a:t>Exploring History</a:t>
+            </a:r>
+            <a:endParaRPr lang="en-US" dirty="0"/>
+          </a:p>
+        </p:txBody>
+      </p:sp>
+      <p:sp>
+        <p:nvSpPr>
+          <p:cNvPr id="3" name="Content Placeholder 2"/>
+          <p:cNvSpPr>
+            <a:spLocks noGrp="1"/>
+          </p:cNvSpPr>
+          <p:nvPr>
+            <p:ph idx="1"/>
+          </p:nvPr>
+        </p:nvSpPr>
+        <p:spPr>
+          <a:xfrm>
+            <a:off x="207818" y="883948"/>
+            <a:ext cx="10644620" cy="5631151"/>
+          </a:xfrm>
+        </p:spPr>
+        <p:txBody>
+          <a:bodyPr>
+            <a:normAutofit fontScale="77500" lnSpcReduction="20000"/>
+          </a:bodyPr>
+          <a:lstStyle/>
+          <a:p>
+            <a:pPr marL="0" indent="0">
+              <a:buNone/>
+            </a:pPr>
+            <a:r>
+              <a:rPr lang="en-US" dirty="0" smtClean="0"/>
+              <a:t>Exercises </a:t>
+            </a:r>
+            <a:endParaRPr lang="en-US" dirty="0" smtClean="0"/>
+          </a:p>
+          <a:p>
+            <a:r>
+              <a:rPr lang="en-US" dirty="0"/>
+              <a:t>What is the output of cat venus.txt at the end of this set of commands</a:t>
+            </a:r>
+            <a:r>
+              <a:rPr lang="en-US" dirty="0" smtClean="0"/>
+              <a:t>?</a:t>
+            </a:r>
+            <a:endParaRPr lang="en-US" dirty="0"/>
+          </a:p>
+          <a:p>
+            <a:pPr marL="914400" lvl="1" indent="-457200">
+              <a:buFont typeface="+mj-lt"/>
+              <a:buAutoNum type="arabicPeriod"/>
+            </a:pPr>
+            <a:r>
+              <a:rPr lang="en-US" dirty="0"/>
+              <a:t>“Added line ‘But the Mummy will appreciate the lack of humidity’ to mars.txt”</a:t>
+            </a:r>
+          </a:p>
+          <a:p>
+            <a:pPr marL="914400" lvl="1" indent="-457200">
+              <a:buFont typeface="+mj-lt"/>
+              <a:buAutoNum type="arabicPeriod"/>
+            </a:pPr>
+            <a:r>
+              <a:rPr lang="en-US" dirty="0"/>
+              <a:t>“Discuss effects of Mars’ climate on the Mummy”</a:t>
+            </a:r>
+          </a:p>
+          <a:p>
+            <a:endParaRPr lang="en-US" dirty="0" smtClean="0"/>
+          </a:p>
+          <a:p>
+            <a:r>
+              <a:rPr lang="en-US" dirty="0" smtClean="0"/>
+              <a:t>Which </a:t>
+            </a:r>
+            <a:r>
+              <a:rPr lang="en-US" dirty="0"/>
+              <a:t>command(s) below would save the changes of myfile.txt to my local </a:t>
+            </a:r>
+            <a:r>
+              <a:rPr lang="en-US" dirty="0" err="1"/>
+              <a:t>Git</a:t>
+            </a:r>
+            <a:r>
+              <a:rPr lang="en-US" dirty="0"/>
+              <a:t> repository?</a:t>
+            </a:r>
+          </a:p>
+          <a:p>
+            <a:pPr marL="914400" lvl="1" indent="-457200">
+              <a:buFont typeface="+mj-lt"/>
+              <a:buAutoNum type="arabicPeriod"/>
+            </a:pPr>
+            <a:r>
+              <a:rPr lang="en-US" dirty="0"/>
+              <a:t>$ cd planets </a:t>
+            </a:r>
+            <a:endParaRPr lang="en-US" dirty="0" smtClean="0"/>
+          </a:p>
+          <a:p>
+            <a:pPr marL="914400" lvl="1" indent="-457200">
+              <a:buFont typeface="+mj-lt"/>
+              <a:buAutoNum type="arabicPeriod"/>
+            </a:pPr>
+            <a:r>
+              <a:rPr lang="en-US" dirty="0" smtClean="0"/>
+              <a:t>$ </a:t>
+            </a:r>
+            <a:r>
+              <a:rPr lang="en-US" dirty="0" err="1"/>
+              <a:t>nano</a:t>
+            </a:r>
+            <a:r>
+              <a:rPr lang="en-US" dirty="0"/>
+              <a:t> venus.txt #input the following text: Venus is beautiful and full of love </a:t>
+            </a:r>
+            <a:endParaRPr lang="en-US" dirty="0" smtClean="0"/>
+          </a:p>
+          <a:p>
+            <a:pPr marL="914400" lvl="1" indent="-457200">
+              <a:buFont typeface="+mj-lt"/>
+              <a:buAutoNum type="arabicPeriod"/>
+            </a:pPr>
+            <a:r>
+              <a:rPr lang="en-US" dirty="0" smtClean="0"/>
+              <a:t>$ </a:t>
+            </a:r>
+            <a:r>
+              <a:rPr lang="en-US" dirty="0" err="1"/>
+              <a:t>git</a:t>
+            </a:r>
+            <a:r>
+              <a:rPr lang="en-US" dirty="0"/>
+              <a:t> add venus.txt </a:t>
+            </a:r>
+            <a:endParaRPr lang="en-US" dirty="0" smtClean="0"/>
+          </a:p>
+          <a:p>
+            <a:pPr marL="914400" lvl="1" indent="-457200">
+              <a:buFont typeface="+mj-lt"/>
+              <a:buAutoNum type="arabicPeriod"/>
+            </a:pPr>
+            <a:r>
+              <a:rPr lang="en-US" dirty="0" smtClean="0"/>
+              <a:t>$ </a:t>
+            </a:r>
+            <a:r>
+              <a:rPr lang="en-US" dirty="0" err="1"/>
+              <a:t>nano</a:t>
+            </a:r>
+            <a:r>
+              <a:rPr lang="en-US" dirty="0"/>
+              <a:t> venus.txt #add the following text: Venus is too hot to be suitable as a base </a:t>
+            </a:r>
+            <a:endParaRPr lang="en-US" dirty="0" smtClean="0"/>
+          </a:p>
+          <a:p>
+            <a:pPr marL="914400" lvl="1" indent="-457200">
+              <a:buFont typeface="+mj-lt"/>
+              <a:buAutoNum type="arabicPeriod"/>
+            </a:pPr>
+            <a:r>
+              <a:rPr lang="en-US" dirty="0" smtClean="0"/>
+              <a:t>$ </a:t>
+            </a:r>
+            <a:r>
+              <a:rPr lang="en-US" dirty="0" err="1"/>
+              <a:t>git</a:t>
+            </a:r>
+            <a:r>
+              <a:rPr lang="en-US" dirty="0"/>
+              <a:t> commit -m "comments on Venus as an unsuitable base" </a:t>
+            </a:r>
+            <a:endParaRPr lang="en-US" dirty="0" smtClean="0"/>
+          </a:p>
+          <a:p>
+            <a:pPr marL="914400" lvl="1" indent="-457200">
+              <a:buFont typeface="+mj-lt"/>
+              <a:buAutoNum type="arabicPeriod"/>
+            </a:pPr>
+            <a:r>
+              <a:rPr lang="en-US" dirty="0" smtClean="0"/>
+              <a:t>$ </a:t>
+            </a:r>
+            <a:r>
+              <a:rPr lang="en-US" dirty="0" err="1"/>
+              <a:t>git</a:t>
+            </a:r>
+            <a:r>
+              <a:rPr lang="en-US" dirty="0"/>
+              <a:t> checkout HEAD venus.txt </a:t>
+            </a:r>
+            <a:endParaRPr lang="en-US" dirty="0" smtClean="0"/>
+          </a:p>
+          <a:p>
+            <a:pPr marL="914400" lvl="1" indent="-457200">
+              <a:buFont typeface="+mj-lt"/>
+              <a:buAutoNum type="arabicPeriod"/>
+            </a:pPr>
+            <a:r>
+              <a:rPr lang="en-US" dirty="0" smtClean="0"/>
+              <a:t>$ </a:t>
+            </a:r>
+            <a:r>
+              <a:rPr lang="en-US" dirty="0"/>
+              <a:t>cat venus.txt #this will print the contents of venus.txt to the </a:t>
+            </a:r>
+            <a:r>
+              <a:rPr lang="en-US" dirty="0" smtClean="0"/>
+              <a:t>screen</a:t>
+            </a:r>
+          </a:p>
+          <a:p>
+            <a:pPr marL="914400" lvl="1" indent="-457200">
+              <a:buFont typeface="+mj-lt"/>
+              <a:buAutoNum type="arabicPeriod"/>
+            </a:pPr>
+            <a:endParaRPr lang="en-US" dirty="0" smtClean="0"/>
+          </a:p>
+          <a:p>
+            <a:r>
+              <a:rPr lang="en-US" dirty="0" err="1" smtClean="0"/>
+              <a:t>git</a:t>
+            </a:r>
+            <a:r>
+              <a:rPr lang="en-US" dirty="0" smtClean="0"/>
+              <a:t> checkout can be used to restore a previous commit when </a:t>
+            </a:r>
+            <a:r>
+              <a:rPr lang="en-US" dirty="0" err="1" smtClean="0"/>
+              <a:t>unstaged</a:t>
+            </a:r>
+            <a:r>
+              <a:rPr lang="en-US" dirty="0" smtClean="0"/>
+              <a:t> changes have been made, but will it also work for changes that have been staged but not committed? Make a change to mars.txt, add that change, and use </a:t>
+            </a:r>
+            <a:r>
+              <a:rPr lang="en-US" dirty="0" err="1" smtClean="0"/>
+              <a:t>git</a:t>
+            </a:r>
+            <a:r>
+              <a:rPr lang="en-US" dirty="0" smtClean="0"/>
+              <a:t> checkout to see if you can remove your change.</a:t>
+            </a:r>
+          </a:p>
+          <a:p>
+            <a:pPr marL="457200" lvl="1" indent="0">
+              <a:buNone/>
+            </a:pPr>
+            <a:endParaRPr lang="en-US" dirty="0" smtClean="0"/>
+          </a:p>
+          <a:p>
+            <a:pPr marL="457200" lvl="1" indent="0">
+              <a:buNone/>
+            </a:pPr>
+            <a:endParaRPr lang="en-US" dirty="0"/>
+          </a:p>
+          <a:p>
+            <a:pPr marL="457200" lvl="1" indent="0">
+              <a:buNone/>
+            </a:pPr>
+            <a:endParaRPr lang="en-US" dirty="0"/>
+          </a:p>
+          <a:p>
+            <a:pPr marL="0" indent="0">
+              <a:buNone/>
+            </a:pPr>
+            <a:endParaRPr lang="en-US" dirty="0" smtClean="0"/>
+          </a:p>
+        </p:txBody>
+      </p:sp>
+    </p:spTree>
+    <p:extLst>
+      <p:ext uri="{BB962C8B-B14F-4D97-AF65-F5344CB8AC3E}">
+        <p14:creationId xmlns:p14="http://schemas.microsoft.com/office/powerpoint/2010/main" val="3563935799"/>
+      </p:ext>
+    </p:extLst>
+  </p:cSld>
+  <p:clrMapOvr>
+    <a:masterClrMapping/>
+  </p:clrMapOvr>
+</p:sld>
+</file>
+
+<file path=ppt/slides/slide16.xml><?xml version="1.0" encoding="utf-8"?>
 <p:sld xmlns:a="http://schemas.openxmlformats.org/drawingml/2006/main" xmlns:r="http://schemas.openxmlformats.org/officeDocument/2006/relationships" xmlns:p="http://schemas.openxmlformats.org/presentationml/2006/main">
   <p:cSld>
     <p:spTree>
@@ -3492,7 +4227,7 @@
 </p:sld>
 </file>
 
-<file path=ppt/slides/slide14.xml><?xml version="1.0" encoding="utf-8"?>
+<file path=ppt/slides/slide17.xml><?xml version="1.0" encoding="utf-8"?>
 <p:sld xmlns:a="http://schemas.openxmlformats.org/drawingml/2006/main" xmlns:r="http://schemas.openxmlformats.org/officeDocument/2006/relationships" xmlns:p="http://schemas.openxmlformats.org/presentationml/2006/main">
   <p:cSld>
     <p:spTree>
@@ -3624,7 +4359,7 @@
 </p:sld>
 </file>
 
-<file path=ppt/slides/slide15.xml><?xml version="1.0" encoding="utf-8"?>
+<file path=ppt/slides/slide18.xml><?xml version="1.0" encoding="utf-8"?>
 <p:sld xmlns:a="http://schemas.openxmlformats.org/drawingml/2006/main" xmlns:r="http://schemas.openxmlformats.org/officeDocument/2006/relationships" xmlns:p="http://schemas.openxmlformats.org/presentationml/2006/main">
   <p:cSld>
     <p:spTree>
@@ -3684,7 +4419,7 @@
 </p:sld>
 </file>
 
-<file path=ppt/slides/slide16.xml><?xml version="1.0" encoding="utf-8"?>
+<file path=ppt/slides/slide19.xml><?xml version="1.0" encoding="utf-8"?>
 <p:sld xmlns:a="http://schemas.openxmlformats.org/drawingml/2006/main" xmlns:r="http://schemas.openxmlformats.org/officeDocument/2006/relationships" xmlns:p="http://schemas.openxmlformats.org/presentationml/2006/main">
   <p:cSld>
     <p:spTree>
@@ -3744,7 +4479,319 @@
 </p:sld>
 </file>
 
-<file path=ppt/slides/slide17.xml><?xml version="1.0" encoding="utf-8"?>
+<file path=ppt/slides/slide2.xml><?xml version="1.0" encoding="utf-8"?>
+<p:sld xmlns:a="http://schemas.openxmlformats.org/drawingml/2006/main" xmlns:r="http://schemas.openxmlformats.org/officeDocument/2006/relationships" xmlns:p="http://schemas.openxmlformats.org/presentationml/2006/main">
+  <p:cSld>
+    <p:spTree>
+      <p:nvGrpSpPr>
+        <p:cNvPr id="1" name=""/>
+        <p:cNvGrpSpPr/>
+        <p:nvPr/>
+      </p:nvGrpSpPr>
+      <p:grpSpPr>
+        <a:xfrm>
+          <a:off x="0" y="0"/>
+          <a:ext cx="0" cy="0"/>
+          <a:chOff x="0" y="0"/>
+          <a:chExt cx="0" cy="0"/>
+        </a:xfrm>
+      </p:grpSpPr>
+      <p:sp>
+        <p:nvSpPr>
+          <p:cNvPr id="2" name="Title 1"/>
+          <p:cNvSpPr>
+            <a:spLocks noGrp="1"/>
+          </p:cNvSpPr>
+          <p:nvPr>
+            <p:ph type="title"/>
+          </p:nvPr>
+        </p:nvSpPr>
+        <p:spPr>
+          <a:xfrm>
+            <a:off x="0" y="0"/>
+            <a:ext cx="7477125" cy="835025"/>
+          </a:xfrm>
+        </p:spPr>
+        <p:txBody>
+          <a:bodyPr/>
+          <a:lstStyle/>
+          <a:p>
+            <a:r>
+              <a:rPr lang="en-US" dirty="0" smtClean="0"/>
+              <a:t>Automated Version Control</a:t>
+            </a:r>
+            <a:endParaRPr lang="en-US" dirty="0"/>
+          </a:p>
+        </p:txBody>
+      </p:sp>
+      <p:sp>
+        <p:nvSpPr>
+          <p:cNvPr id="3" name="Content Placeholder 2"/>
+          <p:cNvSpPr>
+            <a:spLocks noGrp="1"/>
+          </p:cNvSpPr>
+          <p:nvPr>
+            <p:ph idx="1"/>
+          </p:nvPr>
+        </p:nvSpPr>
+        <p:spPr>
+          <a:xfrm>
+            <a:off x="638175" y="1382712"/>
+            <a:ext cx="10515600" cy="4351338"/>
+          </a:xfrm>
+        </p:spPr>
+        <p:txBody>
+          <a:bodyPr/>
+          <a:lstStyle/>
+          <a:p>
+            <a:pPr marL="0" indent="0">
+              <a:buNone/>
+            </a:pPr>
+            <a:r>
+              <a:rPr lang="en-US" dirty="0" smtClean="0"/>
+              <a:t>Questions</a:t>
+            </a:r>
+          </a:p>
+          <a:p>
+            <a:r>
+              <a:rPr lang="en-US" dirty="0" smtClean="0"/>
+              <a:t>What is version control and why should I use it?</a:t>
+            </a:r>
+          </a:p>
+          <a:p>
+            <a:pPr marL="0" indent="0">
+              <a:buNone/>
+            </a:pPr>
+            <a:endParaRPr lang="en-US" dirty="0"/>
+          </a:p>
+          <a:p>
+            <a:pPr marL="0" indent="0">
+              <a:buNone/>
+            </a:pPr>
+            <a:r>
+              <a:rPr lang="en-US" dirty="0" smtClean="0"/>
+              <a:t>Objectives</a:t>
+            </a:r>
+          </a:p>
+          <a:p>
+            <a:r>
+              <a:rPr lang="en-US" dirty="0" smtClean="0"/>
+              <a:t>Understand the benefits of an automated version control system</a:t>
+            </a:r>
+          </a:p>
+          <a:p>
+            <a:r>
+              <a:rPr lang="en-US" dirty="0" smtClean="0"/>
+              <a:t>Understand the basics of how </a:t>
+            </a:r>
+            <a:r>
+              <a:rPr lang="en-US" dirty="0" err="1" smtClean="0"/>
+              <a:t>Git</a:t>
+            </a:r>
+            <a:r>
+              <a:rPr lang="en-US" dirty="0" smtClean="0"/>
+              <a:t> works</a:t>
+            </a:r>
+            <a:endParaRPr lang="en-US" dirty="0"/>
+          </a:p>
+        </p:txBody>
+      </p:sp>
+    </p:spTree>
+    <p:extLst>
+      <p:ext uri="{BB962C8B-B14F-4D97-AF65-F5344CB8AC3E}">
+        <p14:creationId xmlns:p14="http://schemas.microsoft.com/office/powerpoint/2010/main" val="3746604833"/>
+      </p:ext>
+    </p:extLst>
+  </p:cSld>
+  <p:clrMapOvr>
+    <a:masterClrMapping/>
+  </p:clrMapOvr>
+</p:sld>
+</file>
+
+<file path=ppt/slides/slide20.xml><?xml version="1.0" encoding="utf-8"?>
+<p:sld xmlns:a="http://schemas.openxmlformats.org/drawingml/2006/main" xmlns:r="http://schemas.openxmlformats.org/officeDocument/2006/relationships" xmlns:p="http://schemas.openxmlformats.org/presentationml/2006/main">
+  <p:cSld>
+    <p:spTree>
+      <p:nvGrpSpPr>
+        <p:cNvPr id="1" name=""/>
+        <p:cNvGrpSpPr/>
+        <p:nvPr/>
+      </p:nvGrpSpPr>
+      <p:grpSpPr>
+        <a:xfrm>
+          <a:off x="0" y="0"/>
+          <a:ext cx="0" cy="0"/>
+          <a:chOff x="0" y="0"/>
+          <a:chExt cx="0" cy="0"/>
+        </a:xfrm>
+      </p:grpSpPr>
+      <p:sp>
+        <p:nvSpPr>
+          <p:cNvPr id="2" name="Title 1"/>
+          <p:cNvSpPr>
+            <a:spLocks noGrp="1"/>
+          </p:cNvSpPr>
+          <p:nvPr>
+            <p:ph type="title"/>
+          </p:nvPr>
+        </p:nvSpPr>
+        <p:spPr>
+          <a:xfrm>
+            <a:off x="0" y="0"/>
+            <a:ext cx="7477125" cy="835025"/>
+          </a:xfrm>
+        </p:spPr>
+        <p:txBody>
+          <a:bodyPr/>
+          <a:lstStyle/>
+          <a:p>
+            <a:r>
+              <a:rPr lang="en-US" dirty="0" smtClean="0"/>
+              <a:t>Remotes in GitHub</a:t>
+            </a:r>
+            <a:endParaRPr lang="en-US" dirty="0"/>
+          </a:p>
+        </p:txBody>
+      </p:sp>
+      <p:sp>
+        <p:nvSpPr>
+          <p:cNvPr id="3" name="Content Placeholder 2"/>
+          <p:cNvSpPr>
+            <a:spLocks noGrp="1"/>
+          </p:cNvSpPr>
+          <p:nvPr>
+            <p:ph idx="1"/>
+          </p:nvPr>
+        </p:nvSpPr>
+        <p:spPr>
+          <a:xfrm>
+            <a:off x="207818" y="883948"/>
+            <a:ext cx="10644620" cy="5631151"/>
+          </a:xfrm>
+        </p:spPr>
+        <p:txBody>
+          <a:bodyPr>
+            <a:normAutofit/>
+          </a:bodyPr>
+          <a:lstStyle/>
+          <a:p>
+            <a:pPr marL="0" indent="0">
+              <a:buNone/>
+            </a:pPr>
+            <a:r>
+              <a:rPr lang="en-US" dirty="0" smtClean="0"/>
+              <a:t>Exercises </a:t>
+            </a:r>
+            <a:endParaRPr lang="en-US" dirty="0" smtClean="0"/>
+          </a:p>
+          <a:p>
+            <a:r>
+              <a:rPr lang="en-US" dirty="0"/>
+              <a:t>In this lesson, we introduced the “</a:t>
+            </a:r>
+            <a:r>
+              <a:rPr lang="en-US" dirty="0" err="1"/>
+              <a:t>git</a:t>
+            </a:r>
+            <a:r>
+              <a:rPr lang="en-US" dirty="0"/>
+              <a:t> push” command. How is “</a:t>
+            </a:r>
+            <a:r>
+              <a:rPr lang="en-US" dirty="0" err="1"/>
+              <a:t>git</a:t>
+            </a:r>
+            <a:r>
+              <a:rPr lang="en-US" dirty="0"/>
+              <a:t> push” different from “</a:t>
+            </a:r>
+            <a:r>
+              <a:rPr lang="en-US" dirty="0" err="1"/>
+              <a:t>git</a:t>
+            </a:r>
+            <a:r>
+              <a:rPr lang="en-US" dirty="0"/>
+              <a:t> commit</a:t>
+            </a:r>
+            <a:r>
+              <a:rPr lang="en-US" dirty="0" smtClean="0"/>
+              <a:t>”?</a:t>
+            </a:r>
+          </a:p>
+          <a:p>
+            <a:endParaRPr lang="en-US" dirty="0"/>
+          </a:p>
+          <a:p>
+            <a:r>
+              <a:rPr lang="en-US" dirty="0"/>
+              <a:t>Create a remote repository on GitHub. Push the contents of your local repository to the remote. Make changes to your local repository and push these changes. Go to the repo you just created on </a:t>
+            </a:r>
+            <a:r>
+              <a:rPr lang="en-US" dirty="0" err="1"/>
+              <a:t>Github</a:t>
+            </a:r>
+            <a:r>
+              <a:rPr lang="en-US" dirty="0"/>
+              <a:t> and </a:t>
+            </a:r>
+            <a:r>
+              <a:rPr lang="en-US"/>
+              <a:t>check </a:t>
+            </a:r>
+            <a:r>
+              <a:rPr lang="en-US" smtClean="0"/>
+              <a:t>the timestamps of the </a:t>
+            </a:r>
+            <a:r>
+              <a:rPr lang="en-US" dirty="0"/>
+              <a:t>files. How does GitHub record times, and why?</a:t>
+            </a:r>
+            <a:endParaRPr lang="en-US" dirty="0" smtClean="0"/>
+          </a:p>
+          <a:p>
+            <a:endParaRPr lang="en-US" dirty="0" smtClean="0"/>
+          </a:p>
+          <a:p>
+            <a:pPr marL="457200" lvl="1" indent="0">
+              <a:buNone/>
+            </a:pPr>
+            <a:endParaRPr lang="en-US" dirty="0" smtClean="0"/>
+          </a:p>
+          <a:p>
+            <a:pPr marL="457200" lvl="1" indent="0">
+              <a:buNone/>
+            </a:pPr>
+            <a:endParaRPr lang="en-US" dirty="0"/>
+          </a:p>
+          <a:p>
+            <a:pPr marL="457200" lvl="1" indent="0">
+              <a:buNone/>
+            </a:pPr>
+            <a:endParaRPr lang="en-US" dirty="0"/>
+          </a:p>
+          <a:p>
+            <a:pPr marL="0" indent="0">
+              <a:buNone/>
+            </a:pPr>
+            <a:endParaRPr lang="en-US" dirty="0" smtClean="0"/>
+          </a:p>
+        </p:txBody>
+      </p:sp>
+    </p:spTree>
+    <p:extLst>
+      <p:ext uri="{BB962C8B-B14F-4D97-AF65-F5344CB8AC3E}">
+        <p14:creationId xmlns:p14="http://schemas.microsoft.com/office/powerpoint/2010/main" val="3325380135"/>
+      </p:ext>
+    </p:extLst>
+  </p:cSld>
+  <p:clrMapOvr>
+    <a:masterClrMapping/>
+  </p:clrMapOvr>
+</p:sld>
+</file>
+
+<file path=ppt/slides/slide21.xml><?xml version="1.0" encoding="utf-8"?>
 <p:sld xmlns:a="http://schemas.openxmlformats.org/drawingml/2006/main" xmlns:r="http://schemas.openxmlformats.org/officeDocument/2006/relationships" xmlns:p="http://schemas.openxmlformats.org/presentationml/2006/main">
   <p:cSld>
     <p:spTree>
@@ -3876,7 +4923,7 @@
 </p:sld>
 </file>
 
-<file path=ppt/slides/slide18.xml><?xml version="1.0" encoding="utf-8"?>
+<file path=ppt/slides/slide22.xml><?xml version="1.0" encoding="utf-8"?>
 <p:sld xmlns:a="http://schemas.openxmlformats.org/drawingml/2006/main" xmlns:r="http://schemas.openxmlformats.org/officeDocument/2006/relationships" xmlns:p="http://schemas.openxmlformats.org/presentationml/2006/main">
   <p:cSld>
     <p:spTree>
@@ -3936,7 +4983,7 @@
 </p:sld>
 </file>
 
-<file path=ppt/slides/slide19.xml><?xml version="1.0" encoding="utf-8"?>
+<file path=ppt/slides/slide23.xml><?xml version="1.0" encoding="utf-8"?>
 <p:sld xmlns:a="http://schemas.openxmlformats.org/drawingml/2006/main" xmlns:r="http://schemas.openxmlformats.org/officeDocument/2006/relationships" xmlns:p="http://schemas.openxmlformats.org/presentationml/2006/main">
   <p:cSld>
     <p:spTree>
@@ -4069,137 +5116,7 @@
 </p:sld>
 </file>
 
-<file path=ppt/slides/slide2.xml><?xml version="1.0" encoding="utf-8"?>
-<p:sld xmlns:a="http://schemas.openxmlformats.org/drawingml/2006/main" xmlns:r="http://schemas.openxmlformats.org/officeDocument/2006/relationships" xmlns:p="http://schemas.openxmlformats.org/presentationml/2006/main">
-  <p:cSld>
-    <p:spTree>
-      <p:nvGrpSpPr>
-        <p:cNvPr id="1" name=""/>
-        <p:cNvGrpSpPr/>
-        <p:nvPr/>
-      </p:nvGrpSpPr>
-      <p:grpSpPr>
-        <a:xfrm>
-          <a:off x="0" y="0"/>
-          <a:ext cx="0" cy="0"/>
-          <a:chOff x="0" y="0"/>
-          <a:chExt cx="0" cy="0"/>
-        </a:xfrm>
-      </p:grpSpPr>
-      <p:sp>
-        <p:nvSpPr>
-          <p:cNvPr id="2" name="Title 1"/>
-          <p:cNvSpPr>
-            <a:spLocks noGrp="1"/>
-          </p:cNvSpPr>
-          <p:nvPr>
-            <p:ph type="title"/>
-          </p:nvPr>
-        </p:nvSpPr>
-        <p:spPr>
-          <a:xfrm>
-            <a:off x="0" y="0"/>
-            <a:ext cx="7477125" cy="835025"/>
-          </a:xfrm>
-        </p:spPr>
-        <p:txBody>
-          <a:bodyPr/>
-          <a:lstStyle/>
-          <a:p>
-            <a:r>
-              <a:rPr lang="en-US" dirty="0" smtClean="0"/>
-              <a:t>Automated Version Control</a:t>
-            </a:r>
-            <a:endParaRPr lang="en-US" dirty="0"/>
-          </a:p>
-        </p:txBody>
-      </p:sp>
-      <p:sp>
-        <p:nvSpPr>
-          <p:cNvPr id="3" name="Content Placeholder 2"/>
-          <p:cNvSpPr>
-            <a:spLocks noGrp="1"/>
-          </p:cNvSpPr>
-          <p:nvPr>
-            <p:ph idx="1"/>
-          </p:nvPr>
-        </p:nvSpPr>
-        <p:spPr>
-          <a:xfrm>
-            <a:off x="638175" y="1382712"/>
-            <a:ext cx="10515600" cy="4351338"/>
-          </a:xfrm>
-        </p:spPr>
-        <p:txBody>
-          <a:bodyPr/>
-          <a:lstStyle/>
-          <a:p>
-            <a:pPr marL="0" indent="0">
-              <a:buNone/>
-            </a:pPr>
-            <a:r>
-              <a:rPr lang="en-US" dirty="0" smtClean="0"/>
-              <a:t>Questions</a:t>
-            </a:r>
-          </a:p>
-          <a:p>
-            <a:r>
-              <a:rPr lang="en-US" dirty="0" smtClean="0"/>
-              <a:t>What is version control and why should I use it?</a:t>
-            </a:r>
-          </a:p>
-          <a:p>
-            <a:pPr marL="0" indent="0">
-              <a:buNone/>
-            </a:pPr>
-            <a:endParaRPr lang="en-US" dirty="0"/>
-          </a:p>
-          <a:p>
-            <a:pPr marL="0" indent="0">
-              <a:buNone/>
-            </a:pPr>
-            <a:r>
-              <a:rPr lang="en-US" dirty="0" smtClean="0"/>
-              <a:t>Objectives</a:t>
-            </a:r>
-          </a:p>
-          <a:p>
-            <a:r>
-              <a:rPr lang="en-US" dirty="0" smtClean="0"/>
-              <a:t>Understand the benefits of an automated version control system</a:t>
-            </a:r>
-          </a:p>
-          <a:p>
-            <a:r>
-              <a:rPr lang="en-US" dirty="0" smtClean="0"/>
-              <a:t>Understand the basics of how </a:t>
-            </a:r>
-            <a:r>
-              <a:rPr lang="en-US" dirty="0" err="1" smtClean="0"/>
-              <a:t>Git</a:t>
-            </a:r>
-            <a:r>
-              <a:rPr lang="en-US" dirty="0" smtClean="0"/>
-              <a:t> works</a:t>
-            </a:r>
-            <a:endParaRPr lang="en-US" dirty="0"/>
-          </a:p>
-        </p:txBody>
-      </p:sp>
-    </p:spTree>
-    <p:extLst>
-      <p:ext uri="{BB962C8B-B14F-4D97-AF65-F5344CB8AC3E}">
-        <p14:creationId xmlns:p14="http://schemas.microsoft.com/office/powerpoint/2010/main" val="3746604833"/>
-      </p:ext>
-    </p:extLst>
-  </p:cSld>
-  <p:clrMapOvr>
-    <a:masterClrMapping/>
-  </p:clrMapOvr>
-</p:sld>
-</file>
-
-<file path=ppt/slides/slide20.xml><?xml version="1.0" encoding="utf-8"?>
+<file path=ppt/slides/slide24.xml><?xml version="1.0" encoding="utf-8"?>
 <p:sld xmlns:a="http://schemas.openxmlformats.org/drawingml/2006/main" xmlns:r="http://schemas.openxmlformats.org/officeDocument/2006/relationships" xmlns:p="http://schemas.openxmlformats.org/presentationml/2006/main">
   <p:cSld>
     <p:spTree>
@@ -4513,11 +5430,7 @@
           <a:p>
             <a:r>
               <a:rPr lang="en-US" dirty="0" smtClean="0"/>
-              <a:t>Setting Up </a:t>
-            </a:r>
-            <a:r>
-              <a:rPr lang="en-US" dirty="0" err="1" smtClean="0"/>
-              <a:t>Git</a:t>
+              <a:t>Automated Version Control</a:t>
             </a:r>
             <a:endParaRPr lang="en-US" dirty="0"/>
           </a:p>
@@ -4548,62 +5461,42 @@
             </a:pPr>
             <a:r>
               <a:rPr lang="en-US" dirty="0" smtClean="0"/>
-              <a:t>Questions</a:t>
-            </a:r>
-          </a:p>
-          <a:p>
-            <a:r>
-              <a:rPr lang="en-US" dirty="0" smtClean="0"/>
-              <a:t>How do I get set up to use </a:t>
-            </a:r>
-            <a:r>
-              <a:rPr lang="en-US" dirty="0" err="1" smtClean="0"/>
-              <a:t>Git</a:t>
-            </a:r>
-            <a:r>
-              <a:rPr lang="en-US" dirty="0" smtClean="0"/>
-              <a:t>?</a:t>
-            </a:r>
-          </a:p>
-          <a:p>
-            <a:endParaRPr lang="en-US" dirty="0"/>
+              <a:t>Exercises </a:t>
+            </a:r>
+            <a:endParaRPr lang="en-US" dirty="0" smtClean="0"/>
+          </a:p>
+          <a:p>
+            <a:r>
+              <a:rPr lang="en-US" dirty="0"/>
+              <a:t>Imagine you drafted an excellent paragraph for a paper you are writing, but later ruin it. How would you retrieve the </a:t>
+            </a:r>
+            <a:r>
+              <a:rPr lang="en-US" i="1" dirty="0"/>
+              <a:t>excellent</a:t>
+            </a:r>
+            <a:r>
+              <a:rPr lang="en-US" dirty="0"/>
+              <a:t> version of your conclusion? Is it even possible?</a:t>
+            </a:r>
+          </a:p>
+          <a:p>
+            <a:r>
+              <a:rPr lang="en-US" dirty="0"/>
+              <a:t>Imagine you have 5 co-authors. How would you manage the changes and comments they make to your paper? If you use LibreOffice Writer or Microsoft Word, what happens if you accept changes made using the Track Changes option? Do you have a history of those changes?</a:t>
+            </a:r>
           </a:p>
           <a:p>
             <a:pPr marL="0" indent="0">
               <a:buNone/>
             </a:pPr>
-            <a:r>
-              <a:rPr lang="en-US" dirty="0" smtClean="0"/>
-              <a:t>Objectives</a:t>
-            </a:r>
-          </a:p>
-          <a:p>
-            <a:r>
-              <a:rPr lang="en-US" dirty="0" smtClean="0"/>
-              <a:t>Configure </a:t>
-            </a:r>
-            <a:r>
-              <a:rPr lang="en-US" dirty="0" err="1" smtClean="0"/>
-              <a:t>git</a:t>
-            </a:r>
-            <a:r>
-              <a:rPr lang="en-US" dirty="0" smtClean="0"/>
-              <a:t> the first time it is used on a computer.</a:t>
-            </a:r>
-          </a:p>
-          <a:p>
-            <a:r>
-              <a:rPr lang="en-US" dirty="0" smtClean="0"/>
-              <a:t>Understand the meaning of the --global configuration flag.</a:t>
-            </a:r>
-            <a:endParaRPr lang="en-US" dirty="0"/>
+            <a:endParaRPr lang="en-US" dirty="0" smtClean="0"/>
           </a:p>
         </p:txBody>
       </p:sp>
     </p:spTree>
     <p:extLst>
       <p:ext uri="{BB962C8B-B14F-4D97-AF65-F5344CB8AC3E}">
-        <p14:creationId xmlns:p14="http://schemas.microsoft.com/office/powerpoint/2010/main" val="3571484654"/>
+        <p14:creationId xmlns:p14="http://schemas.microsoft.com/office/powerpoint/2010/main" val="884195965"/>
       </p:ext>
     </p:extLst>
   </p:cSld>
@@ -4651,9 +5544,14 @@
           <a:lstStyle/>
           <a:p>
             <a:r>
-              <a:rPr lang="en-US" dirty="0"/>
-              <a:t>Creating a Repository</a:t>
-            </a:r>
+              <a:rPr lang="en-US" dirty="0" smtClean="0"/>
+              <a:t>Setting Up </a:t>
+            </a:r>
+            <a:r>
+              <a:rPr lang="en-US" dirty="0" err="1" smtClean="0"/>
+              <a:t>Git</a:t>
+            </a:r>
+            <a:endParaRPr lang="en-US" dirty="0"/>
           </a:p>
         </p:txBody>
       </p:sp>
@@ -4687,18 +5585,14 @@
           </a:p>
           <a:p>
             <a:r>
-              <a:rPr lang="en-US" dirty="0"/>
-              <a:t>Where does </a:t>
-            </a:r>
-            <a:r>
-              <a:rPr lang="en-US" dirty="0" err="1"/>
+              <a:rPr lang="en-US" dirty="0" smtClean="0"/>
+              <a:t>How do I get set up to use </a:t>
+            </a:r>
+            <a:r>
+              <a:rPr lang="en-US" dirty="0" err="1" smtClean="0"/>
               <a:t>Git</a:t>
             </a:r>
             <a:r>
-              <a:rPr lang="en-US" dirty="0"/>
-              <a:t> store information</a:t>
-            </a:r>
-            <a:r>
               <a:rPr lang="en-US" dirty="0" smtClean="0"/>
               <a:t>?</a:t>
             </a:r>
@@ -4717,28 +5611,31 @@
           </a:p>
           <a:p>
             <a:r>
-              <a:rPr lang="en-US" dirty="0"/>
-              <a:t>Create a local </a:t>
-            </a:r>
-            <a:r>
-              <a:rPr lang="en-US" dirty="0" err="1"/>
-              <a:t>Git</a:t>
-            </a:r>
-            <a:r>
-              <a:rPr lang="en-US" dirty="0"/>
-              <a:t> </a:t>
-            </a:r>
-            <a:r>
-              <a:rPr lang="en-US" dirty="0" smtClean="0"/>
-              <a:t>repository.</a:t>
-            </a:r>
+              <a:rPr lang="en-US" dirty="0" smtClean="0"/>
+              <a:t>Configure </a:t>
+            </a:r>
+            <a:r>
+              <a:rPr lang="en-US" dirty="0" err="1" smtClean="0"/>
+              <a:t>git</a:t>
+            </a:r>
+            <a:r>
+              <a:rPr lang="en-US" dirty="0" smtClean="0"/>
+              <a:t> the first time it is used on a computer.</a:t>
+            </a:r>
+          </a:p>
+          <a:p>
+            <a:r>
+              <a:rPr lang="en-US" dirty="0" smtClean="0"/>
+              <a:t>Understand the meaning of the --global configuration flag.</a:t>
+            </a:r>
+            <a:endParaRPr lang="en-US" dirty="0"/>
           </a:p>
         </p:txBody>
       </p:sp>
     </p:spTree>
     <p:extLst>
       <p:ext uri="{BB962C8B-B14F-4D97-AF65-F5344CB8AC3E}">
-        <p14:creationId xmlns:p14="http://schemas.microsoft.com/office/powerpoint/2010/main" val="2054788388"/>
+        <p14:creationId xmlns:p14="http://schemas.microsoft.com/office/powerpoint/2010/main" val="3571484654"/>
       </p:ext>
     </p:extLst>
   </p:cSld>
@@ -4787,6 +5684,141 @@
           <a:p>
             <a:r>
               <a:rPr lang="en-US" dirty="0"/>
+              <a:t>Creating a Repository</a:t>
+            </a:r>
+          </a:p>
+        </p:txBody>
+      </p:sp>
+      <p:sp>
+        <p:nvSpPr>
+          <p:cNvPr id="3" name="Content Placeholder 2"/>
+          <p:cNvSpPr>
+            <a:spLocks noGrp="1"/>
+          </p:cNvSpPr>
+          <p:nvPr>
+            <p:ph idx="1"/>
+          </p:nvPr>
+        </p:nvSpPr>
+        <p:spPr>
+          <a:xfrm>
+            <a:off x="638175" y="1382712"/>
+            <a:ext cx="10515600" cy="4351338"/>
+          </a:xfrm>
+        </p:spPr>
+        <p:txBody>
+          <a:bodyPr/>
+          <a:lstStyle/>
+          <a:p>
+            <a:pPr marL="0" indent="0">
+              <a:buNone/>
+            </a:pPr>
+            <a:r>
+              <a:rPr lang="en-US" dirty="0" smtClean="0"/>
+              <a:t>Questions</a:t>
+            </a:r>
+          </a:p>
+          <a:p>
+            <a:r>
+              <a:rPr lang="en-US" dirty="0"/>
+              <a:t>Where does </a:t>
+            </a:r>
+            <a:r>
+              <a:rPr lang="en-US" dirty="0" err="1"/>
+              <a:t>Git</a:t>
+            </a:r>
+            <a:r>
+              <a:rPr lang="en-US" dirty="0"/>
+              <a:t> store information</a:t>
+            </a:r>
+            <a:r>
+              <a:rPr lang="en-US" dirty="0" smtClean="0"/>
+              <a:t>?</a:t>
+            </a:r>
+          </a:p>
+          <a:p>
+            <a:endParaRPr lang="en-US" dirty="0"/>
+          </a:p>
+          <a:p>
+            <a:pPr marL="0" indent="0">
+              <a:buNone/>
+            </a:pPr>
+            <a:r>
+              <a:rPr lang="en-US" dirty="0" smtClean="0"/>
+              <a:t>Objectives</a:t>
+            </a:r>
+          </a:p>
+          <a:p>
+            <a:r>
+              <a:rPr lang="en-US" dirty="0"/>
+              <a:t>Create a local </a:t>
+            </a:r>
+            <a:r>
+              <a:rPr lang="en-US" dirty="0" err="1"/>
+              <a:t>Git</a:t>
+            </a:r>
+            <a:r>
+              <a:rPr lang="en-US" dirty="0"/>
+              <a:t> </a:t>
+            </a:r>
+            <a:r>
+              <a:rPr lang="en-US" dirty="0" smtClean="0"/>
+              <a:t>repository.</a:t>
+            </a:r>
+          </a:p>
+        </p:txBody>
+      </p:sp>
+    </p:spTree>
+    <p:extLst>
+      <p:ext uri="{BB962C8B-B14F-4D97-AF65-F5344CB8AC3E}">
+        <p14:creationId xmlns:p14="http://schemas.microsoft.com/office/powerpoint/2010/main" val="2054788388"/>
+      </p:ext>
+    </p:extLst>
+  </p:cSld>
+  <p:clrMapOvr>
+    <a:masterClrMapping/>
+  </p:clrMapOvr>
+</p:sld>
+</file>
+
+<file path=ppt/slides/slide8.xml><?xml version="1.0" encoding="utf-8"?>
+<p:sld xmlns:a="http://schemas.openxmlformats.org/drawingml/2006/main" xmlns:r="http://schemas.openxmlformats.org/officeDocument/2006/relationships" xmlns:p="http://schemas.openxmlformats.org/presentationml/2006/main">
+  <p:cSld>
+    <p:spTree>
+      <p:nvGrpSpPr>
+        <p:cNvPr id="1" name=""/>
+        <p:cNvGrpSpPr/>
+        <p:nvPr/>
+      </p:nvGrpSpPr>
+      <p:grpSpPr>
+        <a:xfrm>
+          <a:off x="0" y="0"/>
+          <a:ext cx="0" cy="0"/>
+          <a:chOff x="0" y="0"/>
+          <a:chExt cx="0" cy="0"/>
+        </a:xfrm>
+      </p:grpSpPr>
+      <p:sp>
+        <p:nvSpPr>
+          <p:cNvPr id="2" name="Title 1"/>
+          <p:cNvSpPr>
+            <a:spLocks noGrp="1"/>
+          </p:cNvSpPr>
+          <p:nvPr>
+            <p:ph type="title"/>
+          </p:nvPr>
+        </p:nvSpPr>
+        <p:spPr>
+          <a:xfrm>
+            <a:off x="0" y="0"/>
+            <a:ext cx="7477125" cy="835025"/>
+          </a:xfrm>
+        </p:spPr>
+        <p:txBody>
+          <a:bodyPr/>
+          <a:lstStyle/>
+          <a:p>
+            <a:r>
+              <a:rPr lang="en-US" dirty="0"/>
               <a:t>Tracking Changes</a:t>
             </a:r>
           </a:p>
@@ -4902,7 +5934,7 @@
 </p:sld>
 </file>
 
-<file path=ppt/slides/slide8.xml><?xml version="1.0" encoding="utf-8"?>
+<file path=ppt/slides/slide9.xml><?xml version="1.0" encoding="utf-8"?>
 <p:sld xmlns:a="http://schemas.openxmlformats.org/drawingml/2006/main" xmlns:r="http://schemas.openxmlformats.org/officeDocument/2006/relationships" xmlns:p="http://schemas.openxmlformats.org/presentationml/2006/main">
   <p:cSld>
     <p:spTree>
@@ -4953,73 +5985,6 @@
     <p:extLst>
       <p:ext uri="{BB962C8B-B14F-4D97-AF65-F5344CB8AC3E}">
         <p14:creationId xmlns:p14="http://schemas.microsoft.com/office/powerpoint/2010/main" val="2788337564"/>
-      </p:ext>
-    </p:extLst>
-  </p:cSld>
-  <p:clrMapOvr>
-    <a:masterClrMapping/>
-  </p:clrMapOvr>
-  <p:timing>
-    <p:tnLst>
-      <p:par>
-        <p:cTn id="1" dur="indefinite" restart="never" nodeType="tmRoot"/>
-      </p:par>
-    </p:tnLst>
-  </p:timing>
-</p:sld>
-</file>
-
-<file path=ppt/slides/slide9.xml><?xml version="1.0" encoding="utf-8"?>
-<p:sld xmlns:a="http://schemas.openxmlformats.org/drawingml/2006/main" xmlns:r="http://schemas.openxmlformats.org/officeDocument/2006/relationships" xmlns:p="http://schemas.openxmlformats.org/presentationml/2006/main">
-  <p:cSld>
-    <p:spTree>
-      <p:nvGrpSpPr>
-        <p:cNvPr id="1" name=""/>
-        <p:cNvGrpSpPr/>
-        <p:nvPr/>
-      </p:nvGrpSpPr>
-      <p:grpSpPr>
-        <a:xfrm>
-          <a:off x="0" y="0"/>
-          <a:ext cx="0" cy="0"/>
-          <a:chOff x="0" y="0"/>
-          <a:chExt cx="0" cy="0"/>
-        </a:xfrm>
-      </p:grpSpPr>
-      <p:pic>
-        <p:nvPicPr>
-          <p:cNvPr id="3" name="Picture 2"/>
-          <p:cNvPicPr>
-            <a:picLocks noChangeAspect="1"/>
-          </p:cNvPicPr>
-          <p:nvPr/>
-        </p:nvPicPr>
-        <p:blipFill>
-          <a:blip r:embed="rId2">
-            <a:extLst>
-              <a:ext uri="{28A0092B-C50C-407E-A947-70E740481C1C}">
-                <a14:useLocalDpi xmlns:a14="http://schemas.microsoft.com/office/drawing/2010/main" val="0"/>
-              </a:ext>
-            </a:extLst>
-          </a:blip>
-          <a:stretch>
-            <a:fillRect/>
-          </a:stretch>
-        </p:blipFill>
-        <p:spPr>
-          <a:xfrm>
-            <a:off x="2935966" y="1625443"/>
-            <a:ext cx="6320068" cy="3607113"/>
-          </a:xfrm>
-          <a:prstGeom prst="rect">
-            <a:avLst/>
-          </a:prstGeom>
-        </p:spPr>
-      </p:pic>
-    </p:spTree>
-    <p:extLst>
-      <p:ext uri="{BB962C8B-B14F-4D97-AF65-F5344CB8AC3E}">
-        <p14:creationId xmlns:p14="http://schemas.microsoft.com/office/powerpoint/2010/main" val="1951551477"/>
       </p:ext>
     </p:extLst>
   </p:cSld>
@@ -5291,7 +6256,7 @@
   <a:extraClrSchemeLst/>
   <a:extLst>
     <a:ext uri="{05A4C25C-085E-4340-85A3-A5531E510DB2}">
-      <thm15:themeFamily xmlns:thm15="http://schemas.microsoft.com/office/thememl/2012/main" name="Office Theme" id="{62F939B6-93AF-4DB8-9C6B-D6C7DFDC589F}" vid="{4A3C46E8-61CC-4603-A589-7422A47A8E4A}"/>
+      <thm15:themeFamily xmlns:thm15="http://schemas.microsoft.com/office/thememl/2012/main" xmlns="" name="Office Theme" id="{62F939B6-93AF-4DB8-9C6B-D6C7DFDC589F}" vid="{4A3C46E8-61CC-4603-A589-7422A47A8E4A}"/>
     </a:ext>
   </a:extLst>
 </a:theme>

</xml_diff>

<commit_message>
updated slides for powerpoints
</commit_message>
<xml_diff>
--- a/Version control with Git/Version control with Git.pptx
+++ b/Version control with Git/Version control with Git.pptx
@@ -6,29 +6,35 @@
   </p:sldMasterIdLst>
   <p:sldIdLst>
     <p:sldId id="256" r:id="rId2"/>
-    <p:sldId id="257" r:id="rId3"/>
-    <p:sldId id="258" r:id="rId4"/>
-    <p:sldId id="262" r:id="rId5"/>
-    <p:sldId id="276" r:id="rId6"/>
-    <p:sldId id="259" r:id="rId7"/>
-    <p:sldId id="260" r:id="rId8"/>
-    <p:sldId id="261" r:id="rId9"/>
-    <p:sldId id="263" r:id="rId10"/>
-    <p:sldId id="264" r:id="rId11"/>
-    <p:sldId id="277" r:id="rId12"/>
-    <p:sldId id="265" r:id="rId13"/>
-    <p:sldId id="266" r:id="rId14"/>
-    <p:sldId id="267" r:id="rId15"/>
-    <p:sldId id="278" r:id="rId16"/>
-    <p:sldId id="268" r:id="rId17"/>
-    <p:sldId id="269" r:id="rId18"/>
-    <p:sldId id="270" r:id="rId19"/>
-    <p:sldId id="271" r:id="rId20"/>
-    <p:sldId id="279" r:id="rId21"/>
-    <p:sldId id="272" r:id="rId22"/>
-    <p:sldId id="273" r:id="rId23"/>
-    <p:sldId id="274" r:id="rId24"/>
-    <p:sldId id="275" r:id="rId25"/>
+    <p:sldId id="280" r:id="rId3"/>
+    <p:sldId id="281" r:id="rId4"/>
+    <p:sldId id="282" r:id="rId5"/>
+    <p:sldId id="257" r:id="rId6"/>
+    <p:sldId id="258" r:id="rId7"/>
+    <p:sldId id="262" r:id="rId8"/>
+    <p:sldId id="276" r:id="rId9"/>
+    <p:sldId id="259" r:id="rId10"/>
+    <p:sldId id="283" r:id="rId11"/>
+    <p:sldId id="284" r:id="rId12"/>
+    <p:sldId id="260" r:id="rId13"/>
+    <p:sldId id="261" r:id="rId14"/>
+    <p:sldId id="263" r:id="rId15"/>
+    <p:sldId id="264" r:id="rId16"/>
+    <p:sldId id="277" r:id="rId17"/>
+    <p:sldId id="265" r:id="rId18"/>
+    <p:sldId id="266" r:id="rId19"/>
+    <p:sldId id="267" r:id="rId20"/>
+    <p:sldId id="278" r:id="rId21"/>
+    <p:sldId id="268" r:id="rId22"/>
+    <p:sldId id="285" r:id="rId23"/>
+    <p:sldId id="269" r:id="rId24"/>
+    <p:sldId id="270" r:id="rId25"/>
+    <p:sldId id="271" r:id="rId26"/>
+    <p:sldId id="279" r:id="rId27"/>
+    <p:sldId id="272" r:id="rId28"/>
+    <p:sldId id="273" r:id="rId29"/>
+    <p:sldId id="274" r:id="rId30"/>
+    <p:sldId id="275" r:id="rId31"/>
   </p:sldIdLst>
   <p:sldSz cx="12192000" cy="6858000"/>
   <p:notesSz cx="6858000" cy="9144000"/>
@@ -127,6 +133,22 @@
       </a:defRPr>
     </a:lvl9pPr>
   </p:defaultTextStyle>
+  <p:extLst>
+    <p:ext uri="{EFAFB233-063F-42B5-8137-9DF3F51BA10A}">
+      <p15:sldGuideLst xmlns:p15="http://schemas.microsoft.com/office/powerpoint/2012/main">
+        <p15:guide id="1" orient="horz" pos="2160">
+          <p15:clr>
+            <a:srgbClr val="A4A3A4"/>
+          </p15:clr>
+        </p15:guide>
+        <p15:guide id="2" pos="3840">
+          <p15:clr>
+            <a:srgbClr val="A4A3A4"/>
+          </p15:clr>
+        </p15:guide>
+      </p15:sldGuideLst>
+    </p:ext>
+  </p:extLst>
 </p:presentation>
 </file>
 
@@ -261,7 +283,7 @@
           <a:p>
             <a:fld id="{F46AD298-04C2-4590-B959-0583A35A276E}" type="datetimeFigureOut">
               <a:rPr lang="en-US" smtClean="0"/>
-              <a:t>11/10/2016</a:t>
+              <a:t>10/26/2017</a:t>
             </a:fld>
             <a:endParaRPr lang="en-US"/>
           </a:p>
@@ -431,7 +453,7 @@
           <a:p>
             <a:fld id="{F46AD298-04C2-4590-B959-0583A35A276E}" type="datetimeFigureOut">
               <a:rPr lang="en-US" smtClean="0"/>
-              <a:t>11/10/2016</a:t>
+              <a:t>10/26/2017</a:t>
             </a:fld>
             <a:endParaRPr lang="en-US"/>
           </a:p>
@@ -611,7 +633,7 @@
           <a:p>
             <a:fld id="{F46AD298-04C2-4590-B959-0583A35A276E}" type="datetimeFigureOut">
               <a:rPr lang="en-US" smtClean="0"/>
-              <a:t>11/10/2016</a:t>
+              <a:t>10/26/2017</a:t>
             </a:fld>
             <a:endParaRPr lang="en-US"/>
           </a:p>
@@ -781,7 +803,7 @@
           <a:p>
             <a:fld id="{F46AD298-04C2-4590-B959-0583A35A276E}" type="datetimeFigureOut">
               <a:rPr lang="en-US" smtClean="0"/>
-              <a:t>11/10/2016</a:t>
+              <a:t>10/26/2017</a:t>
             </a:fld>
             <a:endParaRPr lang="en-US"/>
           </a:p>
@@ -1027,7 +1049,7 @@
           <a:p>
             <a:fld id="{F46AD298-04C2-4590-B959-0583A35A276E}" type="datetimeFigureOut">
               <a:rPr lang="en-US" smtClean="0"/>
-              <a:t>11/10/2016</a:t>
+              <a:t>10/26/2017</a:t>
             </a:fld>
             <a:endParaRPr lang="en-US"/>
           </a:p>
@@ -1259,7 +1281,7 @@
           <a:p>
             <a:fld id="{F46AD298-04C2-4590-B959-0583A35A276E}" type="datetimeFigureOut">
               <a:rPr lang="en-US" smtClean="0"/>
-              <a:t>11/10/2016</a:t>
+              <a:t>10/26/2017</a:t>
             </a:fld>
             <a:endParaRPr lang="en-US"/>
           </a:p>
@@ -1626,7 +1648,7 @@
           <a:p>
             <a:fld id="{F46AD298-04C2-4590-B959-0583A35A276E}" type="datetimeFigureOut">
               <a:rPr lang="en-US" smtClean="0"/>
-              <a:t>11/10/2016</a:t>
+              <a:t>10/26/2017</a:t>
             </a:fld>
             <a:endParaRPr lang="en-US"/>
           </a:p>
@@ -1744,7 +1766,7 @@
           <a:p>
             <a:fld id="{F46AD298-04C2-4590-B959-0583A35A276E}" type="datetimeFigureOut">
               <a:rPr lang="en-US" smtClean="0"/>
-              <a:t>11/10/2016</a:t>
+              <a:t>10/26/2017</a:t>
             </a:fld>
             <a:endParaRPr lang="en-US"/>
           </a:p>
@@ -1839,7 +1861,7 @@
           <a:p>
             <a:fld id="{F46AD298-04C2-4590-B959-0583A35A276E}" type="datetimeFigureOut">
               <a:rPr lang="en-US" smtClean="0"/>
-              <a:t>11/10/2016</a:t>
+              <a:t>10/26/2017</a:t>
             </a:fld>
             <a:endParaRPr lang="en-US"/>
           </a:p>
@@ -2116,7 +2138,7 @@
           <a:p>
             <a:fld id="{F46AD298-04C2-4590-B959-0583A35A276E}" type="datetimeFigureOut">
               <a:rPr lang="en-US" smtClean="0"/>
-              <a:t>11/10/2016</a:t>
+              <a:t>10/26/2017</a:t>
             </a:fld>
             <a:endParaRPr lang="en-US"/>
           </a:p>
@@ -2369,7 +2391,7 @@
           <a:p>
             <a:fld id="{F46AD298-04C2-4590-B959-0583A35A276E}" type="datetimeFigureOut">
               <a:rPr lang="en-US" smtClean="0"/>
-              <a:t>11/10/2016</a:t>
+              <a:t>10/26/2017</a:t>
             </a:fld>
             <a:endParaRPr lang="en-US"/>
           </a:p>
@@ -2582,7 +2604,7 @@
           <a:p>
             <a:fld id="{F46AD298-04C2-4590-B959-0583A35A276E}" type="datetimeFigureOut">
               <a:rPr lang="en-US" smtClean="0"/>
-              <a:t>11/10/2016</a:t>
+              <a:t>10/26/2017</a:t>
             </a:fld>
             <a:endParaRPr lang="en-US"/>
           </a:p>
@@ -3031,8 +3053,9 @@
           <a:p>
             <a:r>
               <a:rPr lang="en-US" dirty="0" smtClean="0"/>
-              <a:t>11.11.16</a:t>
-            </a:r>
+              <a:t>10.27.17</a:t>
+            </a:r>
+            <a:endParaRPr lang="en-US" dirty="0" smtClean="0"/>
           </a:p>
           <a:p>
             <a:endParaRPr lang="en-US" dirty="0"/>
@@ -3053,6 +3076,1859 @@
 </file>
 
 <file path=ppt/slides/slide10.xml><?xml version="1.0" encoding="utf-8"?>
+<p:sld xmlns:a="http://schemas.openxmlformats.org/drawingml/2006/main" xmlns:r="http://schemas.openxmlformats.org/officeDocument/2006/relationships" xmlns:p="http://schemas.openxmlformats.org/presentationml/2006/main">
+  <p:cSld>
+    <p:spTree>
+      <p:nvGrpSpPr>
+        <p:cNvPr id="1" name=""/>
+        <p:cNvGrpSpPr/>
+        <p:nvPr/>
+      </p:nvGrpSpPr>
+      <p:grpSpPr>
+        <a:xfrm>
+          <a:off x="0" y="0"/>
+          <a:ext cx="0" cy="0"/>
+          <a:chOff x="0" y="0"/>
+          <a:chExt cx="0" cy="0"/>
+        </a:xfrm>
+      </p:grpSpPr>
+      <p:sp>
+        <p:nvSpPr>
+          <p:cNvPr id="2" name="Title 1"/>
+          <p:cNvSpPr>
+            <a:spLocks noGrp="1"/>
+          </p:cNvSpPr>
+          <p:nvPr>
+            <p:ph type="title"/>
+          </p:nvPr>
+        </p:nvSpPr>
+        <p:spPr/>
+        <p:txBody>
+          <a:bodyPr/>
+          <a:lstStyle/>
+          <a:p>
+            <a:r>
+              <a:rPr lang="en-US" dirty="0" smtClean="0"/>
+              <a:t>Some common things to configure</a:t>
+            </a:r>
+            <a:endParaRPr lang="en-US" dirty="0"/>
+          </a:p>
+        </p:txBody>
+      </p:sp>
+      <p:sp>
+        <p:nvSpPr>
+          <p:cNvPr id="3" name="Content Placeholder 2"/>
+          <p:cNvSpPr>
+            <a:spLocks noGrp="1"/>
+          </p:cNvSpPr>
+          <p:nvPr>
+            <p:ph idx="1"/>
+          </p:nvPr>
+        </p:nvSpPr>
+        <p:spPr/>
+        <p:txBody>
+          <a:bodyPr/>
+          <a:lstStyle/>
+          <a:p>
+            <a:r>
+              <a:rPr lang="en-US" dirty="0"/>
+              <a:t>our name and email </a:t>
+            </a:r>
+            <a:r>
+              <a:rPr lang="en-US" dirty="0" smtClean="0"/>
+              <a:t>address &lt;- </a:t>
+            </a:r>
+            <a:r>
+              <a:rPr lang="en-US" dirty="0" smtClean="0">
+                <a:solidFill>
+                  <a:srgbClr val="FF0000"/>
+                </a:solidFill>
+              </a:rPr>
+              <a:t>so people know who you are!</a:t>
+            </a:r>
+            <a:endParaRPr lang="en-US" dirty="0">
+              <a:solidFill>
+                <a:srgbClr val="FF0000"/>
+              </a:solidFill>
+            </a:endParaRPr>
+          </a:p>
+          <a:p>
+            <a:r>
+              <a:rPr lang="en-US" dirty="0">
+                <a:solidFill>
+                  <a:srgbClr val="FF0000"/>
+                </a:solidFill>
+              </a:rPr>
+              <a:t>to</a:t>
+            </a:r>
+            <a:r>
+              <a:rPr lang="en-US" dirty="0"/>
+              <a:t> </a:t>
+            </a:r>
+            <a:r>
+              <a:rPr lang="en-US" dirty="0">
+                <a:solidFill>
+                  <a:schemeClr val="accent1"/>
+                </a:solidFill>
+              </a:rPr>
+              <a:t>colorize</a:t>
+            </a:r>
+            <a:r>
+              <a:rPr lang="en-US" dirty="0"/>
+              <a:t> </a:t>
+            </a:r>
+            <a:r>
+              <a:rPr lang="en-US" dirty="0">
+                <a:solidFill>
+                  <a:schemeClr val="accent6">
+                    <a:lumMod val="60000"/>
+                    <a:lumOff val="40000"/>
+                  </a:schemeClr>
+                </a:solidFill>
+              </a:rPr>
+              <a:t>our</a:t>
+            </a:r>
+            <a:r>
+              <a:rPr lang="en-US" dirty="0"/>
+              <a:t> </a:t>
+            </a:r>
+            <a:r>
+              <a:rPr lang="en-US" dirty="0" smtClean="0">
+                <a:solidFill>
+                  <a:schemeClr val="accent4">
+                    <a:lumMod val="75000"/>
+                  </a:schemeClr>
+                </a:solidFill>
+              </a:rPr>
+              <a:t>output</a:t>
+            </a:r>
+            <a:endParaRPr lang="en-US" dirty="0">
+              <a:solidFill>
+                <a:schemeClr val="accent4">
+                  <a:lumMod val="75000"/>
+                </a:schemeClr>
+              </a:solidFill>
+            </a:endParaRPr>
+          </a:p>
+          <a:p>
+            <a:r>
+              <a:rPr lang="en-US" dirty="0"/>
+              <a:t>what our preferred text editor </a:t>
+            </a:r>
+            <a:r>
+              <a:rPr lang="en-US" dirty="0" smtClean="0"/>
+              <a:t>is &lt;- </a:t>
+            </a:r>
+            <a:r>
+              <a:rPr lang="en-US" dirty="0" err="1" smtClean="0"/>
+              <a:t>nano</a:t>
+            </a:r>
+            <a:r>
+              <a:rPr lang="en-US" dirty="0" smtClean="0"/>
+              <a:t>, vim, etc.  </a:t>
+            </a:r>
+            <a:endParaRPr lang="en-US" dirty="0"/>
+          </a:p>
+          <a:p>
+            <a:r>
+              <a:rPr lang="en-US" dirty="0"/>
+              <a:t>and </a:t>
+            </a:r>
+            <a:r>
+              <a:rPr lang="en-US" dirty="0" smtClean="0"/>
+              <a:t>that </a:t>
+            </a:r>
+            <a:r>
+              <a:rPr lang="en-US" dirty="0"/>
+              <a:t>we want to use these settings globally (i.e. for every project</a:t>
+            </a:r>
+            <a:r>
+              <a:rPr lang="en-US" dirty="0" smtClean="0"/>
+              <a:t>)</a:t>
+            </a:r>
+          </a:p>
+          <a:p>
+            <a:endParaRPr lang="en-US" dirty="0"/>
+          </a:p>
+          <a:p>
+            <a:pPr marL="0" indent="0">
+              <a:buNone/>
+            </a:pPr>
+            <a:r>
+              <a:rPr lang="en-US" dirty="0" smtClean="0"/>
+              <a:t>These are general written:</a:t>
+            </a:r>
+          </a:p>
+          <a:p>
+            <a:pPr marL="0" indent="0">
+              <a:buNone/>
+            </a:pPr>
+            <a:r>
+              <a:rPr lang="en-US" dirty="0" err="1" smtClean="0"/>
+              <a:t>git</a:t>
+            </a:r>
+            <a:r>
+              <a:rPr lang="en-US" dirty="0" smtClean="0"/>
+              <a:t> verb </a:t>
+            </a:r>
+            <a:endParaRPr lang="en-US" dirty="0"/>
+          </a:p>
+        </p:txBody>
+      </p:sp>
+    </p:spTree>
+    <p:extLst>
+      <p:ext uri="{BB962C8B-B14F-4D97-AF65-F5344CB8AC3E}">
+        <p14:creationId xmlns:p14="http://schemas.microsoft.com/office/powerpoint/2010/main" val="3388446699"/>
+      </p:ext>
+    </p:extLst>
+  </p:cSld>
+  <p:clrMapOvr>
+    <a:masterClrMapping/>
+  </p:clrMapOvr>
+</p:sld>
+</file>
+
+<file path=ppt/slides/slide11.xml><?xml version="1.0" encoding="utf-8"?>
+<p:sld xmlns:a="http://schemas.openxmlformats.org/drawingml/2006/main" xmlns:r="http://schemas.openxmlformats.org/officeDocument/2006/relationships" xmlns:p="http://schemas.openxmlformats.org/presentationml/2006/main">
+  <p:cSld>
+    <p:spTree>
+      <p:nvGrpSpPr>
+        <p:cNvPr id="1" name=""/>
+        <p:cNvGrpSpPr/>
+        <p:nvPr/>
+      </p:nvGrpSpPr>
+      <p:grpSpPr>
+        <a:xfrm>
+          <a:off x="0" y="0"/>
+          <a:ext cx="0" cy="0"/>
+          <a:chOff x="0" y="0"/>
+          <a:chExt cx="0" cy="0"/>
+        </a:xfrm>
+      </p:grpSpPr>
+      <p:sp>
+        <p:nvSpPr>
+          <p:cNvPr id="2" name="Title 1"/>
+          <p:cNvSpPr>
+            <a:spLocks noGrp="1"/>
+          </p:cNvSpPr>
+          <p:nvPr>
+            <p:ph type="title"/>
+          </p:nvPr>
+        </p:nvSpPr>
+        <p:spPr>
+          <a:xfrm>
+            <a:off x="85640" y="0"/>
+            <a:ext cx="8281524" cy="597827"/>
+          </a:xfrm>
+        </p:spPr>
+        <p:txBody>
+          <a:bodyPr>
+            <a:normAutofit fontScale="90000"/>
+          </a:bodyPr>
+          <a:lstStyle/>
+          <a:p>
+            <a:r>
+              <a:rPr lang="en-US" dirty="0" smtClean="0"/>
+              <a:t>Setting an editor</a:t>
+            </a:r>
+            <a:endParaRPr lang="en-US" dirty="0"/>
+          </a:p>
+        </p:txBody>
+      </p:sp>
+      <p:graphicFrame>
+        <p:nvGraphicFramePr>
+          <p:cNvPr id="4" name="Table 3"/>
+          <p:cNvGraphicFramePr>
+            <a:graphicFrameLocks noGrp="1"/>
+          </p:cNvGraphicFramePr>
+          <p:nvPr>
+            <p:extLst>
+              <p:ext uri="{D42A27DB-BD31-4B8C-83A1-F6EECF244321}">
+                <p14:modId xmlns:p14="http://schemas.microsoft.com/office/powerpoint/2010/main" val="3597043638"/>
+              </p:ext>
+            </p:extLst>
+          </p:nvPr>
+        </p:nvGraphicFramePr>
+        <p:xfrm>
+          <a:off x="1581026" y="587544"/>
+          <a:ext cx="9610258" cy="6031226"/>
+        </p:xfrm>
+        <a:graphic>
+          <a:graphicData uri="http://schemas.openxmlformats.org/drawingml/2006/table">
+            <a:tbl>
+              <a:tblPr/>
+              <a:tblGrid>
+                <a:gridCol w="4805129"/>
+                <a:gridCol w="4805129"/>
+              </a:tblGrid>
+              <a:tr h="255780">
+                <a:tc>
+                  <a:txBody>
+                    <a:bodyPr/>
+                    <a:lstStyle/>
+                    <a:p>
+                      <a:pPr algn="l" fontAlgn="t"/>
+                      <a:r>
+                        <a:rPr lang="en-US" sz="1600" dirty="0">
+                          <a:effectLst/>
+                        </a:rPr>
+                        <a:t>Atom</a:t>
+                      </a:r>
+                    </a:p>
+                  </a:txBody>
+                  <a:tcPr marL="44401" marR="44401" marT="44401" marB="44401">
+                    <a:lnL>
+                      <a:noFill/>
+                    </a:lnL>
+                    <a:lnR>
+                      <a:noFill/>
+                    </a:lnR>
+                    <a:lnT w="9525" cap="flat" cmpd="sng" algn="ctr">
+                      <a:solidFill>
+                        <a:srgbClr val="DDDDDD"/>
+                      </a:solidFill>
+                      <a:prstDash val="solid"/>
+                      <a:round/>
+                      <a:headEnd type="none" w="med" len="med"/>
+                      <a:tailEnd type="none" w="med" len="med"/>
+                    </a:lnT>
+                    <a:lnB w="9525" cap="flat" cmpd="sng" algn="ctr">
+                      <a:solidFill>
+                        <a:srgbClr val="DDDDDD"/>
+                      </a:solidFill>
+                      <a:prstDash val="solid"/>
+                      <a:round/>
+                      <a:headEnd type="none" w="med" len="med"/>
+                      <a:tailEnd type="none" w="med" len="med"/>
+                    </a:lnB>
+                    <a:solidFill>
+                      <a:srgbClr val="F9F9F9"/>
+                    </a:solidFill>
+                  </a:tcPr>
+                </a:tc>
+                <a:tc>
+                  <a:txBody>
+                    <a:bodyPr/>
+                    <a:lstStyle/>
+                    <a:p>
+                      <a:pPr algn="l" fontAlgn="t"/>
+                      <a:r>
+                        <a:rPr lang="en-US" sz="1600">
+                          <a:effectLst/>
+                        </a:rPr>
+                        <a:t>$ git config --global core.editor "atom --wait"</a:t>
+                      </a:r>
+                    </a:p>
+                  </a:txBody>
+                  <a:tcPr marL="44401" marR="44401" marT="44401" marB="44401">
+                    <a:lnL>
+                      <a:noFill/>
+                    </a:lnL>
+                    <a:lnR>
+                      <a:noFill/>
+                    </a:lnR>
+                    <a:lnT w="9525" cap="flat" cmpd="sng" algn="ctr">
+                      <a:solidFill>
+                        <a:srgbClr val="DDDDDD"/>
+                      </a:solidFill>
+                      <a:prstDash val="solid"/>
+                      <a:round/>
+                      <a:headEnd type="none" w="med" len="med"/>
+                      <a:tailEnd type="none" w="med" len="med"/>
+                    </a:lnT>
+                    <a:lnB w="9525" cap="flat" cmpd="sng" algn="ctr">
+                      <a:solidFill>
+                        <a:srgbClr val="DDDDDD"/>
+                      </a:solidFill>
+                      <a:prstDash val="solid"/>
+                      <a:round/>
+                      <a:headEnd type="none" w="med" len="med"/>
+                      <a:tailEnd type="none" w="med" len="med"/>
+                    </a:lnB>
+                    <a:solidFill>
+                      <a:srgbClr val="F9F9F9"/>
+                    </a:solidFill>
+                  </a:tcPr>
+                </a:tc>
+              </a:tr>
+              <a:tr h="255780">
+                <a:tc>
+                  <a:txBody>
+                    <a:bodyPr/>
+                    <a:lstStyle/>
+                    <a:p>
+                      <a:pPr algn="l" fontAlgn="t"/>
+                      <a:r>
+                        <a:rPr lang="en-US" sz="1600">
+                          <a:effectLst/>
+                        </a:rPr>
+                        <a:t>nano</a:t>
+                      </a:r>
+                    </a:p>
+                  </a:txBody>
+                  <a:tcPr marL="44401" marR="44401" marT="44401" marB="44401">
+                    <a:lnL>
+                      <a:noFill/>
+                    </a:lnL>
+                    <a:lnR>
+                      <a:noFill/>
+                    </a:lnR>
+                    <a:lnT w="9525" cap="flat" cmpd="sng" algn="ctr">
+                      <a:solidFill>
+                        <a:srgbClr val="DDDDDD"/>
+                      </a:solidFill>
+                      <a:prstDash val="solid"/>
+                      <a:round/>
+                      <a:headEnd type="none" w="med" len="med"/>
+                      <a:tailEnd type="none" w="med" len="med"/>
+                    </a:lnT>
+                    <a:lnB w="9525" cap="flat" cmpd="sng" algn="ctr">
+                      <a:solidFill>
+                        <a:srgbClr val="DDDDDD"/>
+                      </a:solidFill>
+                      <a:prstDash val="solid"/>
+                      <a:round/>
+                      <a:headEnd type="none" w="med" len="med"/>
+                      <a:tailEnd type="none" w="med" len="med"/>
+                    </a:lnB>
+                    <a:solidFill>
+                      <a:srgbClr val="FFFFFF"/>
+                    </a:solidFill>
+                  </a:tcPr>
+                </a:tc>
+                <a:tc>
+                  <a:txBody>
+                    <a:bodyPr/>
+                    <a:lstStyle/>
+                    <a:p>
+                      <a:pPr algn="l" fontAlgn="t"/>
+                      <a:r>
+                        <a:rPr lang="en-US" sz="1600">
+                          <a:effectLst/>
+                        </a:rPr>
+                        <a:t>$ git config --global core.editor "nano -w"</a:t>
+                      </a:r>
+                    </a:p>
+                  </a:txBody>
+                  <a:tcPr marL="44401" marR="44401" marT="44401" marB="44401">
+                    <a:lnL>
+                      <a:noFill/>
+                    </a:lnL>
+                    <a:lnR>
+                      <a:noFill/>
+                    </a:lnR>
+                    <a:lnT w="9525" cap="flat" cmpd="sng" algn="ctr">
+                      <a:solidFill>
+                        <a:srgbClr val="DDDDDD"/>
+                      </a:solidFill>
+                      <a:prstDash val="solid"/>
+                      <a:round/>
+                      <a:headEnd type="none" w="med" len="med"/>
+                      <a:tailEnd type="none" w="med" len="med"/>
+                    </a:lnT>
+                    <a:lnB w="9525" cap="flat" cmpd="sng" algn="ctr">
+                      <a:solidFill>
+                        <a:srgbClr val="DDDDDD"/>
+                      </a:solidFill>
+                      <a:prstDash val="solid"/>
+                      <a:round/>
+                      <a:headEnd type="none" w="med" len="med"/>
+                      <a:tailEnd type="none" w="med" len="med"/>
+                    </a:lnB>
+                    <a:solidFill>
+                      <a:srgbClr val="FFFFFF"/>
+                    </a:solidFill>
+                  </a:tcPr>
+                </a:tc>
+              </a:tr>
+              <a:tr h="255780">
+                <a:tc>
+                  <a:txBody>
+                    <a:bodyPr/>
+                    <a:lstStyle/>
+                    <a:p>
+                      <a:pPr algn="l" fontAlgn="t"/>
+                      <a:r>
+                        <a:rPr lang="en-US" sz="1600">
+                          <a:effectLst/>
+                        </a:rPr>
+                        <a:t>BBEdit (Mac, with command line tools)</a:t>
+                      </a:r>
+                    </a:p>
+                  </a:txBody>
+                  <a:tcPr marL="44401" marR="44401" marT="44401" marB="44401">
+                    <a:lnL>
+                      <a:noFill/>
+                    </a:lnL>
+                    <a:lnR>
+                      <a:noFill/>
+                    </a:lnR>
+                    <a:lnT w="9525" cap="flat" cmpd="sng" algn="ctr">
+                      <a:solidFill>
+                        <a:srgbClr val="DDDDDD"/>
+                      </a:solidFill>
+                      <a:prstDash val="solid"/>
+                      <a:round/>
+                      <a:headEnd type="none" w="med" len="med"/>
+                      <a:tailEnd type="none" w="med" len="med"/>
+                    </a:lnT>
+                    <a:lnB w="9525" cap="flat" cmpd="sng" algn="ctr">
+                      <a:solidFill>
+                        <a:srgbClr val="DDDDDD"/>
+                      </a:solidFill>
+                      <a:prstDash val="solid"/>
+                      <a:round/>
+                      <a:headEnd type="none" w="med" len="med"/>
+                      <a:tailEnd type="none" w="med" len="med"/>
+                    </a:lnB>
+                    <a:solidFill>
+                      <a:srgbClr val="F9F9F9"/>
+                    </a:solidFill>
+                  </a:tcPr>
+                </a:tc>
+                <a:tc>
+                  <a:txBody>
+                    <a:bodyPr/>
+                    <a:lstStyle/>
+                    <a:p>
+                      <a:pPr algn="l" fontAlgn="t"/>
+                      <a:r>
+                        <a:rPr lang="en-US" sz="1600">
+                          <a:effectLst/>
+                        </a:rPr>
+                        <a:t>$ git config --global core.editor "edit -w"</a:t>
+                      </a:r>
+                    </a:p>
+                  </a:txBody>
+                  <a:tcPr marL="44401" marR="44401" marT="44401" marB="44401">
+                    <a:lnL>
+                      <a:noFill/>
+                    </a:lnL>
+                    <a:lnR>
+                      <a:noFill/>
+                    </a:lnR>
+                    <a:lnT w="9525" cap="flat" cmpd="sng" algn="ctr">
+                      <a:solidFill>
+                        <a:srgbClr val="DDDDDD"/>
+                      </a:solidFill>
+                      <a:prstDash val="solid"/>
+                      <a:round/>
+                      <a:headEnd type="none" w="med" len="med"/>
+                      <a:tailEnd type="none" w="med" len="med"/>
+                    </a:lnT>
+                    <a:lnB w="9525" cap="flat" cmpd="sng" algn="ctr">
+                      <a:solidFill>
+                        <a:srgbClr val="DDDDDD"/>
+                      </a:solidFill>
+                      <a:prstDash val="solid"/>
+                      <a:round/>
+                      <a:headEnd type="none" w="med" len="med"/>
+                      <a:tailEnd type="none" w="med" len="med"/>
+                    </a:lnB>
+                    <a:solidFill>
+                      <a:srgbClr val="F9F9F9"/>
+                    </a:solidFill>
+                  </a:tcPr>
+                </a:tc>
+              </a:tr>
+              <a:tr h="255780">
+                <a:tc>
+                  <a:txBody>
+                    <a:bodyPr/>
+                    <a:lstStyle/>
+                    <a:p>
+                      <a:pPr algn="l" fontAlgn="t"/>
+                      <a:r>
+                        <a:rPr lang="en-US" sz="1600">
+                          <a:effectLst/>
+                        </a:rPr>
+                        <a:t>Sublime Text (Mac)</a:t>
+                      </a:r>
+                    </a:p>
+                  </a:txBody>
+                  <a:tcPr marL="44401" marR="44401" marT="44401" marB="44401">
+                    <a:lnL>
+                      <a:noFill/>
+                    </a:lnL>
+                    <a:lnR>
+                      <a:noFill/>
+                    </a:lnR>
+                    <a:lnT w="9525" cap="flat" cmpd="sng" algn="ctr">
+                      <a:solidFill>
+                        <a:srgbClr val="DDDDDD"/>
+                      </a:solidFill>
+                      <a:prstDash val="solid"/>
+                      <a:round/>
+                      <a:headEnd type="none" w="med" len="med"/>
+                      <a:tailEnd type="none" w="med" len="med"/>
+                    </a:lnT>
+                    <a:lnB w="9525" cap="flat" cmpd="sng" algn="ctr">
+                      <a:solidFill>
+                        <a:srgbClr val="DDDDDD"/>
+                      </a:solidFill>
+                      <a:prstDash val="solid"/>
+                      <a:round/>
+                      <a:headEnd type="none" w="med" len="med"/>
+                      <a:tailEnd type="none" w="med" len="med"/>
+                    </a:lnB>
+                    <a:solidFill>
+                      <a:srgbClr val="FFFFFF"/>
+                    </a:solidFill>
+                  </a:tcPr>
+                </a:tc>
+                <a:tc>
+                  <a:txBody>
+                    <a:bodyPr/>
+                    <a:lstStyle/>
+                    <a:p>
+                      <a:pPr algn="l" fontAlgn="t"/>
+                      <a:r>
+                        <a:rPr lang="pt-BR" sz="1600">
+                          <a:effectLst/>
+                        </a:rPr>
+                        <a:t>$ git config --global core.editor "subl -n -w"</a:t>
+                      </a:r>
+                    </a:p>
+                  </a:txBody>
+                  <a:tcPr marL="44401" marR="44401" marT="44401" marB="44401">
+                    <a:lnL>
+                      <a:noFill/>
+                    </a:lnL>
+                    <a:lnR>
+                      <a:noFill/>
+                    </a:lnR>
+                    <a:lnT w="9525" cap="flat" cmpd="sng" algn="ctr">
+                      <a:solidFill>
+                        <a:srgbClr val="DDDDDD"/>
+                      </a:solidFill>
+                      <a:prstDash val="solid"/>
+                      <a:round/>
+                      <a:headEnd type="none" w="med" len="med"/>
+                      <a:tailEnd type="none" w="med" len="med"/>
+                    </a:lnT>
+                    <a:lnB w="9525" cap="flat" cmpd="sng" algn="ctr">
+                      <a:solidFill>
+                        <a:srgbClr val="DDDDDD"/>
+                      </a:solidFill>
+                      <a:prstDash val="solid"/>
+                      <a:round/>
+                      <a:headEnd type="none" w="med" len="med"/>
+                      <a:tailEnd type="none" w="med" len="med"/>
+                    </a:lnB>
+                    <a:solidFill>
+                      <a:srgbClr val="FFFFFF"/>
+                    </a:solidFill>
+                  </a:tcPr>
+                </a:tc>
+              </a:tr>
+              <a:tr h="370310">
+                <a:tc>
+                  <a:txBody>
+                    <a:bodyPr/>
+                    <a:lstStyle/>
+                    <a:p>
+                      <a:pPr algn="l" fontAlgn="t"/>
+                      <a:r>
+                        <a:rPr lang="en-US" sz="1600">
+                          <a:effectLst/>
+                        </a:rPr>
+                        <a:t>Sublime Text (Win, 32-bit install)</a:t>
+                      </a:r>
+                    </a:p>
+                  </a:txBody>
+                  <a:tcPr marL="44401" marR="44401" marT="44401" marB="44401">
+                    <a:lnL>
+                      <a:noFill/>
+                    </a:lnL>
+                    <a:lnR>
+                      <a:noFill/>
+                    </a:lnR>
+                    <a:lnT w="9525" cap="flat" cmpd="sng" algn="ctr">
+                      <a:solidFill>
+                        <a:srgbClr val="DDDDDD"/>
+                      </a:solidFill>
+                      <a:prstDash val="solid"/>
+                      <a:round/>
+                      <a:headEnd type="none" w="med" len="med"/>
+                      <a:tailEnd type="none" w="med" len="med"/>
+                    </a:lnT>
+                    <a:lnB w="9525" cap="flat" cmpd="sng" algn="ctr">
+                      <a:solidFill>
+                        <a:srgbClr val="DDDDDD"/>
+                      </a:solidFill>
+                      <a:prstDash val="solid"/>
+                      <a:round/>
+                      <a:headEnd type="none" w="med" len="med"/>
+                      <a:tailEnd type="none" w="med" len="med"/>
+                    </a:lnB>
+                    <a:solidFill>
+                      <a:srgbClr val="F9F9F9"/>
+                    </a:solidFill>
+                  </a:tcPr>
+                </a:tc>
+                <a:tc>
+                  <a:txBody>
+                    <a:bodyPr/>
+                    <a:lstStyle/>
+                    <a:p>
+                      <a:pPr algn="l" fontAlgn="t"/>
+                      <a:r>
+                        <a:rPr lang="en-US" sz="1600">
+                          <a:effectLst/>
+                        </a:rPr>
+                        <a:t>$ git config --global core.editor "'c:/program files (x86)/sublime text 3/sublime_text.exe' -w"</a:t>
+                      </a:r>
+                    </a:p>
+                  </a:txBody>
+                  <a:tcPr marL="44401" marR="44401" marT="44401" marB="44401">
+                    <a:lnL>
+                      <a:noFill/>
+                    </a:lnL>
+                    <a:lnR>
+                      <a:noFill/>
+                    </a:lnR>
+                    <a:lnT w="9525" cap="flat" cmpd="sng" algn="ctr">
+                      <a:solidFill>
+                        <a:srgbClr val="DDDDDD"/>
+                      </a:solidFill>
+                      <a:prstDash val="solid"/>
+                      <a:round/>
+                      <a:headEnd type="none" w="med" len="med"/>
+                      <a:tailEnd type="none" w="med" len="med"/>
+                    </a:lnT>
+                    <a:lnB w="9525" cap="flat" cmpd="sng" algn="ctr">
+                      <a:solidFill>
+                        <a:srgbClr val="DDDDDD"/>
+                      </a:solidFill>
+                      <a:prstDash val="solid"/>
+                      <a:round/>
+                      <a:headEnd type="none" w="med" len="med"/>
+                      <a:tailEnd type="none" w="med" len="med"/>
+                    </a:lnB>
+                    <a:solidFill>
+                      <a:srgbClr val="F9F9F9"/>
+                    </a:solidFill>
+                  </a:tcPr>
+                </a:tc>
+              </a:tr>
+              <a:tr h="370310">
+                <a:tc>
+                  <a:txBody>
+                    <a:bodyPr/>
+                    <a:lstStyle/>
+                    <a:p>
+                      <a:pPr algn="l" fontAlgn="t"/>
+                      <a:r>
+                        <a:rPr lang="en-US" sz="1600">
+                          <a:effectLst/>
+                        </a:rPr>
+                        <a:t>Sublime Text (Win, 64-bit install)</a:t>
+                      </a:r>
+                    </a:p>
+                  </a:txBody>
+                  <a:tcPr marL="44401" marR="44401" marT="44401" marB="44401">
+                    <a:lnL>
+                      <a:noFill/>
+                    </a:lnL>
+                    <a:lnR>
+                      <a:noFill/>
+                    </a:lnR>
+                    <a:lnT w="9525" cap="flat" cmpd="sng" algn="ctr">
+                      <a:solidFill>
+                        <a:srgbClr val="DDDDDD"/>
+                      </a:solidFill>
+                      <a:prstDash val="solid"/>
+                      <a:round/>
+                      <a:headEnd type="none" w="med" len="med"/>
+                      <a:tailEnd type="none" w="med" len="med"/>
+                    </a:lnT>
+                    <a:lnB w="9525" cap="flat" cmpd="sng" algn="ctr">
+                      <a:solidFill>
+                        <a:srgbClr val="DDDDDD"/>
+                      </a:solidFill>
+                      <a:prstDash val="solid"/>
+                      <a:round/>
+                      <a:headEnd type="none" w="med" len="med"/>
+                      <a:tailEnd type="none" w="med" len="med"/>
+                    </a:lnB>
+                    <a:solidFill>
+                      <a:srgbClr val="FFFFFF"/>
+                    </a:solidFill>
+                  </a:tcPr>
+                </a:tc>
+                <a:tc>
+                  <a:txBody>
+                    <a:bodyPr/>
+                    <a:lstStyle/>
+                    <a:p>
+                      <a:pPr algn="l" fontAlgn="t"/>
+                      <a:r>
+                        <a:rPr lang="en-US" sz="1600">
+                          <a:effectLst/>
+                        </a:rPr>
+                        <a:t>$ git config --global core.editor "'c:/program files/sublime text 3/sublime_text.exe' -w"</a:t>
+                      </a:r>
+                    </a:p>
+                  </a:txBody>
+                  <a:tcPr marL="44401" marR="44401" marT="44401" marB="44401">
+                    <a:lnL>
+                      <a:noFill/>
+                    </a:lnL>
+                    <a:lnR>
+                      <a:noFill/>
+                    </a:lnR>
+                    <a:lnT w="9525" cap="flat" cmpd="sng" algn="ctr">
+                      <a:solidFill>
+                        <a:srgbClr val="DDDDDD"/>
+                      </a:solidFill>
+                      <a:prstDash val="solid"/>
+                      <a:round/>
+                      <a:headEnd type="none" w="med" len="med"/>
+                      <a:tailEnd type="none" w="med" len="med"/>
+                    </a:lnT>
+                    <a:lnB w="9525" cap="flat" cmpd="sng" algn="ctr">
+                      <a:solidFill>
+                        <a:srgbClr val="DDDDDD"/>
+                      </a:solidFill>
+                      <a:prstDash val="solid"/>
+                      <a:round/>
+                      <a:headEnd type="none" w="med" len="med"/>
+                      <a:tailEnd type="none" w="med" len="med"/>
+                    </a:lnB>
+                    <a:solidFill>
+                      <a:srgbClr val="FFFFFF"/>
+                    </a:solidFill>
+                  </a:tcPr>
+                </a:tc>
+              </a:tr>
+              <a:tr h="580350">
+                <a:tc>
+                  <a:txBody>
+                    <a:bodyPr/>
+                    <a:lstStyle/>
+                    <a:p>
+                      <a:pPr algn="l" fontAlgn="t"/>
+                      <a:r>
+                        <a:rPr lang="en-US" sz="1600">
+                          <a:effectLst/>
+                        </a:rPr>
+                        <a:t>Notepad++ (Win, 32-bit install)</a:t>
+                      </a:r>
+                    </a:p>
+                  </a:txBody>
+                  <a:tcPr marL="44401" marR="44401" marT="44401" marB="44401">
+                    <a:lnL>
+                      <a:noFill/>
+                    </a:lnL>
+                    <a:lnR>
+                      <a:noFill/>
+                    </a:lnR>
+                    <a:lnT w="9525" cap="flat" cmpd="sng" algn="ctr">
+                      <a:solidFill>
+                        <a:srgbClr val="DDDDDD"/>
+                      </a:solidFill>
+                      <a:prstDash val="solid"/>
+                      <a:round/>
+                      <a:headEnd type="none" w="med" len="med"/>
+                      <a:tailEnd type="none" w="med" len="med"/>
+                    </a:lnT>
+                    <a:lnB w="9525" cap="flat" cmpd="sng" algn="ctr">
+                      <a:solidFill>
+                        <a:srgbClr val="DDDDDD"/>
+                      </a:solidFill>
+                      <a:prstDash val="solid"/>
+                      <a:round/>
+                      <a:headEnd type="none" w="med" len="med"/>
+                      <a:tailEnd type="none" w="med" len="med"/>
+                    </a:lnB>
+                    <a:solidFill>
+                      <a:srgbClr val="F9F9F9"/>
+                    </a:solidFill>
+                  </a:tcPr>
+                </a:tc>
+                <a:tc>
+                  <a:txBody>
+                    <a:bodyPr/>
+                    <a:lstStyle/>
+                    <a:p>
+                      <a:pPr algn="l" fontAlgn="t"/>
+                      <a:r>
+                        <a:rPr lang="en-US" sz="1600">
+                          <a:effectLst/>
+                        </a:rPr>
+                        <a:t>$ git config --global core.editor "'c:/program files (x86)/Notepad++/notepad++.exe' -multiInst -notabbar -nosession -noPlugin"</a:t>
+                      </a:r>
+                    </a:p>
+                  </a:txBody>
+                  <a:tcPr marL="44401" marR="44401" marT="44401" marB="44401">
+                    <a:lnL>
+                      <a:noFill/>
+                    </a:lnL>
+                    <a:lnR>
+                      <a:noFill/>
+                    </a:lnR>
+                    <a:lnT w="9525" cap="flat" cmpd="sng" algn="ctr">
+                      <a:solidFill>
+                        <a:srgbClr val="DDDDDD"/>
+                      </a:solidFill>
+                      <a:prstDash val="solid"/>
+                      <a:round/>
+                      <a:headEnd type="none" w="med" len="med"/>
+                      <a:tailEnd type="none" w="med" len="med"/>
+                    </a:lnT>
+                    <a:lnB w="9525" cap="flat" cmpd="sng" algn="ctr">
+                      <a:solidFill>
+                        <a:srgbClr val="DDDDDD"/>
+                      </a:solidFill>
+                      <a:prstDash val="solid"/>
+                      <a:round/>
+                      <a:headEnd type="none" w="med" len="med"/>
+                      <a:tailEnd type="none" w="med" len="med"/>
+                    </a:lnB>
+                    <a:solidFill>
+                      <a:srgbClr val="F9F9F9"/>
+                    </a:solidFill>
+                  </a:tcPr>
+                </a:tc>
+              </a:tr>
+              <a:tr h="580350">
+                <a:tc>
+                  <a:txBody>
+                    <a:bodyPr/>
+                    <a:lstStyle/>
+                    <a:p>
+                      <a:pPr algn="l" fontAlgn="t"/>
+                      <a:r>
+                        <a:rPr lang="en-US" sz="1600">
+                          <a:effectLst/>
+                        </a:rPr>
+                        <a:t>Notepad++ (Win, 64-bit install)</a:t>
+                      </a:r>
+                    </a:p>
+                  </a:txBody>
+                  <a:tcPr marL="44401" marR="44401" marT="44401" marB="44401">
+                    <a:lnL>
+                      <a:noFill/>
+                    </a:lnL>
+                    <a:lnR>
+                      <a:noFill/>
+                    </a:lnR>
+                    <a:lnT w="9525" cap="flat" cmpd="sng" algn="ctr">
+                      <a:solidFill>
+                        <a:srgbClr val="DDDDDD"/>
+                      </a:solidFill>
+                      <a:prstDash val="solid"/>
+                      <a:round/>
+                      <a:headEnd type="none" w="med" len="med"/>
+                      <a:tailEnd type="none" w="med" len="med"/>
+                    </a:lnT>
+                    <a:lnB w="9525" cap="flat" cmpd="sng" algn="ctr">
+                      <a:solidFill>
+                        <a:srgbClr val="DDDDDD"/>
+                      </a:solidFill>
+                      <a:prstDash val="solid"/>
+                      <a:round/>
+                      <a:headEnd type="none" w="med" len="med"/>
+                      <a:tailEnd type="none" w="med" len="med"/>
+                    </a:lnB>
+                    <a:solidFill>
+                      <a:srgbClr val="FFFFFF"/>
+                    </a:solidFill>
+                  </a:tcPr>
+                </a:tc>
+                <a:tc>
+                  <a:txBody>
+                    <a:bodyPr/>
+                    <a:lstStyle/>
+                    <a:p>
+                      <a:pPr algn="l" fontAlgn="t"/>
+                      <a:r>
+                        <a:rPr lang="en-US" sz="1600">
+                          <a:effectLst/>
+                        </a:rPr>
+                        <a:t>$ git config --global core.editor "'c:/program files/Notepad++/notepad++.exe' -multiInst -notabbar -nosession -noPlugin"</a:t>
+                      </a:r>
+                    </a:p>
+                  </a:txBody>
+                  <a:tcPr marL="44401" marR="44401" marT="44401" marB="44401">
+                    <a:lnL>
+                      <a:noFill/>
+                    </a:lnL>
+                    <a:lnR>
+                      <a:noFill/>
+                    </a:lnR>
+                    <a:lnT w="9525" cap="flat" cmpd="sng" algn="ctr">
+                      <a:solidFill>
+                        <a:srgbClr val="DDDDDD"/>
+                      </a:solidFill>
+                      <a:prstDash val="solid"/>
+                      <a:round/>
+                      <a:headEnd type="none" w="med" len="med"/>
+                      <a:tailEnd type="none" w="med" len="med"/>
+                    </a:lnT>
+                    <a:lnB w="9525" cap="flat" cmpd="sng" algn="ctr">
+                      <a:solidFill>
+                        <a:srgbClr val="DDDDDD"/>
+                      </a:solidFill>
+                      <a:prstDash val="solid"/>
+                      <a:round/>
+                      <a:headEnd type="none" w="med" len="med"/>
+                      <a:tailEnd type="none" w="med" len="med"/>
+                    </a:lnB>
+                    <a:solidFill>
+                      <a:srgbClr val="FFFFFF"/>
+                    </a:solidFill>
+                  </a:tcPr>
+                </a:tc>
+              </a:tr>
+              <a:tr h="255780">
+                <a:tc>
+                  <a:txBody>
+                    <a:bodyPr/>
+                    <a:lstStyle/>
+                    <a:p>
+                      <a:pPr algn="l" fontAlgn="t"/>
+                      <a:r>
+                        <a:rPr lang="en-US" sz="1600">
+                          <a:effectLst/>
+                        </a:rPr>
+                        <a:t>Kate (Linux)</a:t>
+                      </a:r>
+                    </a:p>
+                  </a:txBody>
+                  <a:tcPr marL="44401" marR="44401" marT="44401" marB="44401">
+                    <a:lnL>
+                      <a:noFill/>
+                    </a:lnL>
+                    <a:lnR>
+                      <a:noFill/>
+                    </a:lnR>
+                    <a:lnT w="9525" cap="flat" cmpd="sng" algn="ctr">
+                      <a:solidFill>
+                        <a:srgbClr val="DDDDDD"/>
+                      </a:solidFill>
+                      <a:prstDash val="solid"/>
+                      <a:round/>
+                      <a:headEnd type="none" w="med" len="med"/>
+                      <a:tailEnd type="none" w="med" len="med"/>
+                    </a:lnT>
+                    <a:lnB w="9525" cap="flat" cmpd="sng" algn="ctr">
+                      <a:solidFill>
+                        <a:srgbClr val="DDDDDD"/>
+                      </a:solidFill>
+                      <a:prstDash val="solid"/>
+                      <a:round/>
+                      <a:headEnd type="none" w="med" len="med"/>
+                      <a:tailEnd type="none" w="med" len="med"/>
+                    </a:lnB>
+                    <a:solidFill>
+                      <a:srgbClr val="F9F9F9"/>
+                    </a:solidFill>
+                  </a:tcPr>
+                </a:tc>
+                <a:tc>
+                  <a:txBody>
+                    <a:bodyPr/>
+                    <a:lstStyle/>
+                    <a:p>
+                      <a:pPr algn="l" fontAlgn="t"/>
+                      <a:r>
+                        <a:rPr lang="en-US" sz="1600">
+                          <a:effectLst/>
+                        </a:rPr>
+                        <a:t>$ git config --global core.editor "kate"</a:t>
+                      </a:r>
+                    </a:p>
+                  </a:txBody>
+                  <a:tcPr marL="44401" marR="44401" marT="44401" marB="44401">
+                    <a:lnL>
+                      <a:noFill/>
+                    </a:lnL>
+                    <a:lnR>
+                      <a:noFill/>
+                    </a:lnR>
+                    <a:lnT w="9525" cap="flat" cmpd="sng" algn="ctr">
+                      <a:solidFill>
+                        <a:srgbClr val="DDDDDD"/>
+                      </a:solidFill>
+                      <a:prstDash val="solid"/>
+                      <a:round/>
+                      <a:headEnd type="none" w="med" len="med"/>
+                      <a:tailEnd type="none" w="med" len="med"/>
+                    </a:lnT>
+                    <a:lnB w="9525" cap="flat" cmpd="sng" algn="ctr">
+                      <a:solidFill>
+                        <a:srgbClr val="DDDDDD"/>
+                      </a:solidFill>
+                      <a:prstDash val="solid"/>
+                      <a:round/>
+                      <a:headEnd type="none" w="med" len="med"/>
+                      <a:tailEnd type="none" w="med" len="med"/>
+                    </a:lnB>
+                    <a:solidFill>
+                      <a:srgbClr val="F9F9F9"/>
+                    </a:solidFill>
+                  </a:tcPr>
+                </a:tc>
+              </a:tr>
+              <a:tr h="370310">
+                <a:tc>
+                  <a:txBody>
+                    <a:bodyPr/>
+                    <a:lstStyle/>
+                    <a:p>
+                      <a:pPr algn="l" fontAlgn="t"/>
+                      <a:r>
+                        <a:rPr lang="en-US" sz="1600">
+                          <a:effectLst/>
+                        </a:rPr>
+                        <a:t>Gedit (Linux)</a:t>
+                      </a:r>
+                    </a:p>
+                  </a:txBody>
+                  <a:tcPr marL="44401" marR="44401" marT="44401" marB="44401">
+                    <a:lnL>
+                      <a:noFill/>
+                    </a:lnL>
+                    <a:lnR>
+                      <a:noFill/>
+                    </a:lnR>
+                    <a:lnT w="9525" cap="flat" cmpd="sng" algn="ctr">
+                      <a:solidFill>
+                        <a:srgbClr val="DDDDDD"/>
+                      </a:solidFill>
+                      <a:prstDash val="solid"/>
+                      <a:round/>
+                      <a:headEnd type="none" w="med" len="med"/>
+                      <a:tailEnd type="none" w="med" len="med"/>
+                    </a:lnT>
+                    <a:lnB w="9525" cap="flat" cmpd="sng" algn="ctr">
+                      <a:solidFill>
+                        <a:srgbClr val="DDDDDD"/>
+                      </a:solidFill>
+                      <a:prstDash val="solid"/>
+                      <a:round/>
+                      <a:headEnd type="none" w="med" len="med"/>
+                      <a:tailEnd type="none" w="med" len="med"/>
+                    </a:lnB>
+                    <a:solidFill>
+                      <a:srgbClr val="FFFFFF"/>
+                    </a:solidFill>
+                  </a:tcPr>
+                </a:tc>
+                <a:tc>
+                  <a:txBody>
+                    <a:bodyPr/>
+                    <a:lstStyle/>
+                    <a:p>
+                      <a:pPr algn="l" fontAlgn="t"/>
+                      <a:r>
+                        <a:rPr lang="en-US" sz="1600">
+                          <a:effectLst/>
+                        </a:rPr>
+                        <a:t>$ git config --global core.editor "gedit --wait --new-window"</a:t>
+                      </a:r>
+                    </a:p>
+                  </a:txBody>
+                  <a:tcPr marL="44401" marR="44401" marT="44401" marB="44401">
+                    <a:lnL>
+                      <a:noFill/>
+                    </a:lnL>
+                    <a:lnR>
+                      <a:noFill/>
+                    </a:lnR>
+                    <a:lnT w="9525" cap="flat" cmpd="sng" algn="ctr">
+                      <a:solidFill>
+                        <a:srgbClr val="DDDDDD"/>
+                      </a:solidFill>
+                      <a:prstDash val="solid"/>
+                      <a:round/>
+                      <a:headEnd type="none" w="med" len="med"/>
+                      <a:tailEnd type="none" w="med" len="med"/>
+                    </a:lnT>
+                    <a:lnB w="9525" cap="flat" cmpd="sng" algn="ctr">
+                      <a:solidFill>
+                        <a:srgbClr val="DDDDDD"/>
+                      </a:solidFill>
+                      <a:prstDash val="solid"/>
+                      <a:round/>
+                      <a:headEnd type="none" w="med" len="med"/>
+                      <a:tailEnd type="none" w="med" len="med"/>
+                    </a:lnB>
+                    <a:solidFill>
+                      <a:srgbClr val="FFFFFF"/>
+                    </a:solidFill>
+                  </a:tcPr>
+                </a:tc>
+              </a:tr>
+              <a:tr h="255780">
+                <a:tc>
+                  <a:txBody>
+                    <a:bodyPr/>
+                    <a:lstStyle/>
+                    <a:p>
+                      <a:pPr algn="l" fontAlgn="t"/>
+                      <a:r>
+                        <a:rPr lang="en-US" sz="1600">
+                          <a:effectLst/>
+                        </a:rPr>
+                        <a:t>Scratch (Linux)</a:t>
+                      </a:r>
+                    </a:p>
+                  </a:txBody>
+                  <a:tcPr marL="44401" marR="44401" marT="44401" marB="44401">
+                    <a:lnL>
+                      <a:noFill/>
+                    </a:lnL>
+                    <a:lnR>
+                      <a:noFill/>
+                    </a:lnR>
+                    <a:lnT w="9525" cap="flat" cmpd="sng" algn="ctr">
+                      <a:solidFill>
+                        <a:srgbClr val="DDDDDD"/>
+                      </a:solidFill>
+                      <a:prstDash val="solid"/>
+                      <a:round/>
+                      <a:headEnd type="none" w="med" len="med"/>
+                      <a:tailEnd type="none" w="med" len="med"/>
+                    </a:lnT>
+                    <a:lnB w="9525" cap="flat" cmpd="sng" algn="ctr">
+                      <a:solidFill>
+                        <a:srgbClr val="DDDDDD"/>
+                      </a:solidFill>
+                      <a:prstDash val="solid"/>
+                      <a:round/>
+                      <a:headEnd type="none" w="med" len="med"/>
+                      <a:tailEnd type="none" w="med" len="med"/>
+                    </a:lnB>
+                    <a:solidFill>
+                      <a:srgbClr val="F9F9F9"/>
+                    </a:solidFill>
+                  </a:tcPr>
+                </a:tc>
+                <a:tc>
+                  <a:txBody>
+                    <a:bodyPr/>
+                    <a:lstStyle/>
+                    <a:p>
+                      <a:pPr algn="l" fontAlgn="t"/>
+                      <a:r>
+                        <a:rPr lang="en-US" sz="1600">
+                          <a:effectLst/>
+                        </a:rPr>
+                        <a:t>$ git config --global core.editor "scratch-text-editor"</a:t>
+                      </a:r>
+                    </a:p>
+                  </a:txBody>
+                  <a:tcPr marL="44401" marR="44401" marT="44401" marB="44401">
+                    <a:lnL>
+                      <a:noFill/>
+                    </a:lnL>
+                    <a:lnR>
+                      <a:noFill/>
+                    </a:lnR>
+                    <a:lnT w="9525" cap="flat" cmpd="sng" algn="ctr">
+                      <a:solidFill>
+                        <a:srgbClr val="DDDDDD"/>
+                      </a:solidFill>
+                      <a:prstDash val="solid"/>
+                      <a:round/>
+                      <a:headEnd type="none" w="med" len="med"/>
+                      <a:tailEnd type="none" w="med" len="med"/>
+                    </a:lnT>
+                    <a:lnB w="9525" cap="flat" cmpd="sng" algn="ctr">
+                      <a:solidFill>
+                        <a:srgbClr val="DDDDDD"/>
+                      </a:solidFill>
+                      <a:prstDash val="solid"/>
+                      <a:round/>
+                      <a:headEnd type="none" w="med" len="med"/>
+                      <a:tailEnd type="none" w="med" len="med"/>
+                    </a:lnB>
+                    <a:solidFill>
+                      <a:srgbClr val="F9F9F9"/>
+                    </a:solidFill>
+                  </a:tcPr>
+                </a:tc>
+              </a:tr>
+              <a:tr h="255780">
+                <a:tc>
+                  <a:txBody>
+                    <a:bodyPr/>
+                    <a:lstStyle/>
+                    <a:p>
+                      <a:pPr algn="l" fontAlgn="t"/>
+                      <a:r>
+                        <a:rPr lang="en-US" sz="1600">
+                          <a:effectLst/>
+                        </a:rPr>
+                        <a:t>emacs</a:t>
+                      </a:r>
+                    </a:p>
+                  </a:txBody>
+                  <a:tcPr marL="44401" marR="44401" marT="44401" marB="44401">
+                    <a:lnL>
+                      <a:noFill/>
+                    </a:lnL>
+                    <a:lnR>
+                      <a:noFill/>
+                    </a:lnR>
+                    <a:lnT w="9525" cap="flat" cmpd="sng" algn="ctr">
+                      <a:solidFill>
+                        <a:srgbClr val="DDDDDD"/>
+                      </a:solidFill>
+                      <a:prstDash val="solid"/>
+                      <a:round/>
+                      <a:headEnd type="none" w="med" len="med"/>
+                      <a:tailEnd type="none" w="med" len="med"/>
+                    </a:lnT>
+                    <a:lnB w="9525" cap="flat" cmpd="sng" algn="ctr">
+                      <a:solidFill>
+                        <a:srgbClr val="DDDDDD"/>
+                      </a:solidFill>
+                      <a:prstDash val="solid"/>
+                      <a:round/>
+                      <a:headEnd type="none" w="med" len="med"/>
+                      <a:tailEnd type="none" w="med" len="med"/>
+                    </a:lnB>
+                    <a:solidFill>
+                      <a:srgbClr val="FFFFFF"/>
+                    </a:solidFill>
+                  </a:tcPr>
+                </a:tc>
+                <a:tc>
+                  <a:txBody>
+                    <a:bodyPr/>
+                    <a:lstStyle/>
+                    <a:p>
+                      <a:pPr algn="l" fontAlgn="t"/>
+                      <a:r>
+                        <a:rPr lang="en-US" sz="1600">
+                          <a:effectLst/>
+                        </a:rPr>
+                        <a:t>$ git config --global core.editor "emacs"</a:t>
+                      </a:r>
+                    </a:p>
+                  </a:txBody>
+                  <a:tcPr marL="44401" marR="44401" marT="44401" marB="44401">
+                    <a:lnL>
+                      <a:noFill/>
+                    </a:lnL>
+                    <a:lnR>
+                      <a:noFill/>
+                    </a:lnR>
+                    <a:lnT w="9525" cap="flat" cmpd="sng" algn="ctr">
+                      <a:solidFill>
+                        <a:srgbClr val="DDDDDD"/>
+                      </a:solidFill>
+                      <a:prstDash val="solid"/>
+                      <a:round/>
+                      <a:headEnd type="none" w="med" len="med"/>
+                      <a:tailEnd type="none" w="med" len="med"/>
+                    </a:lnT>
+                    <a:lnB w="9525" cap="flat" cmpd="sng" algn="ctr">
+                      <a:solidFill>
+                        <a:srgbClr val="DDDDDD"/>
+                      </a:solidFill>
+                      <a:prstDash val="solid"/>
+                      <a:round/>
+                      <a:headEnd type="none" w="med" len="med"/>
+                      <a:tailEnd type="none" w="med" len="med"/>
+                    </a:lnB>
+                    <a:solidFill>
+                      <a:srgbClr val="FFFFFF"/>
+                    </a:solidFill>
+                  </a:tcPr>
+                </a:tc>
+              </a:tr>
+              <a:tr h="213676">
+                <a:tc>
+                  <a:txBody>
+                    <a:bodyPr/>
+                    <a:lstStyle/>
+                    <a:p>
+                      <a:pPr algn="l" fontAlgn="t"/>
+                      <a:r>
+                        <a:rPr lang="en-US" sz="1600" dirty="0">
+                          <a:effectLst/>
+                        </a:rPr>
+                        <a:t>vim</a:t>
+                      </a:r>
+                    </a:p>
+                  </a:txBody>
+                  <a:tcPr marL="44401" marR="44401" marT="44401" marB="44401">
+                    <a:lnL>
+                      <a:noFill/>
+                    </a:lnL>
+                    <a:lnR>
+                      <a:noFill/>
+                    </a:lnR>
+                    <a:lnT w="9525" cap="flat" cmpd="sng" algn="ctr">
+                      <a:solidFill>
+                        <a:srgbClr val="DDDDDD"/>
+                      </a:solidFill>
+                      <a:prstDash val="solid"/>
+                      <a:round/>
+                      <a:headEnd type="none" w="med" len="med"/>
+                      <a:tailEnd type="none" w="med" len="med"/>
+                    </a:lnT>
+                    <a:lnB>
+                      <a:noFill/>
+                    </a:lnB>
+                    <a:solidFill>
+                      <a:srgbClr val="F9F9F9"/>
+                    </a:solidFill>
+                  </a:tcPr>
+                </a:tc>
+                <a:tc>
+                  <a:txBody>
+                    <a:bodyPr/>
+                    <a:lstStyle/>
+                    <a:p>
+                      <a:pPr algn="l" fontAlgn="t"/>
+                      <a:r>
+                        <a:rPr lang="en-US" sz="1600" dirty="0">
+                          <a:effectLst/>
+                        </a:rPr>
+                        <a:t>$ </a:t>
+                      </a:r>
+                      <a:r>
+                        <a:rPr lang="en-US" sz="1600" dirty="0" err="1">
+                          <a:effectLst/>
+                        </a:rPr>
+                        <a:t>git</a:t>
+                      </a:r>
+                      <a:r>
+                        <a:rPr lang="en-US" sz="1600" dirty="0">
+                          <a:effectLst/>
+                        </a:rPr>
+                        <a:t> </a:t>
+                      </a:r>
+                      <a:r>
+                        <a:rPr lang="en-US" sz="1600" dirty="0" err="1">
+                          <a:effectLst/>
+                        </a:rPr>
+                        <a:t>config</a:t>
+                      </a:r>
+                      <a:r>
+                        <a:rPr lang="en-US" sz="1600" dirty="0">
+                          <a:effectLst/>
+                        </a:rPr>
+                        <a:t> --global </a:t>
+                      </a:r>
+                      <a:r>
+                        <a:rPr lang="en-US" sz="1600" dirty="0" err="1">
+                          <a:effectLst/>
+                        </a:rPr>
+                        <a:t>core.editor</a:t>
+                      </a:r>
+                      <a:r>
+                        <a:rPr lang="en-US" sz="1600" dirty="0">
+                          <a:effectLst/>
+                        </a:rPr>
+                        <a:t> "vim"</a:t>
+                      </a:r>
+                    </a:p>
+                  </a:txBody>
+                  <a:tcPr marL="44401" marR="44401" marT="44401" marB="44401">
+                    <a:lnL>
+                      <a:noFill/>
+                    </a:lnL>
+                    <a:lnR>
+                      <a:noFill/>
+                    </a:lnR>
+                    <a:lnT w="9525" cap="flat" cmpd="sng" algn="ctr">
+                      <a:solidFill>
+                        <a:srgbClr val="DDDDDD"/>
+                      </a:solidFill>
+                      <a:prstDash val="solid"/>
+                      <a:round/>
+                      <a:headEnd type="none" w="med" len="med"/>
+                      <a:tailEnd type="none" w="med" len="med"/>
+                    </a:lnT>
+                    <a:lnB>
+                      <a:noFill/>
+                    </a:lnB>
+                    <a:solidFill>
+                      <a:srgbClr val="F9F9F9"/>
+                    </a:solidFill>
+                  </a:tcPr>
+                </a:tc>
+              </a:tr>
+            </a:tbl>
+          </a:graphicData>
+        </a:graphic>
+      </p:graphicFrame>
+    </p:spTree>
+    <p:extLst>
+      <p:ext uri="{BB962C8B-B14F-4D97-AF65-F5344CB8AC3E}">
+        <p14:creationId xmlns:p14="http://schemas.microsoft.com/office/powerpoint/2010/main" val="87282429"/>
+      </p:ext>
+    </p:extLst>
+  </p:cSld>
+  <p:clrMapOvr>
+    <a:masterClrMapping/>
+  </p:clrMapOvr>
+</p:sld>
+</file>
+
+<file path=ppt/slides/slide12.xml><?xml version="1.0" encoding="utf-8"?>
+<p:sld xmlns:a="http://schemas.openxmlformats.org/drawingml/2006/main" xmlns:r="http://schemas.openxmlformats.org/officeDocument/2006/relationships" xmlns:p="http://schemas.openxmlformats.org/presentationml/2006/main">
+  <p:cSld>
+    <p:spTree>
+      <p:nvGrpSpPr>
+        <p:cNvPr id="1" name=""/>
+        <p:cNvGrpSpPr/>
+        <p:nvPr/>
+      </p:nvGrpSpPr>
+      <p:grpSpPr>
+        <a:xfrm>
+          <a:off x="0" y="0"/>
+          <a:ext cx="0" cy="0"/>
+          <a:chOff x="0" y="0"/>
+          <a:chExt cx="0" cy="0"/>
+        </a:xfrm>
+      </p:grpSpPr>
+      <p:sp>
+        <p:nvSpPr>
+          <p:cNvPr id="2" name="Title 1"/>
+          <p:cNvSpPr>
+            <a:spLocks noGrp="1"/>
+          </p:cNvSpPr>
+          <p:nvPr>
+            <p:ph type="title"/>
+          </p:nvPr>
+        </p:nvSpPr>
+        <p:spPr>
+          <a:xfrm>
+            <a:off x="0" y="0"/>
+            <a:ext cx="7477125" cy="835025"/>
+          </a:xfrm>
+        </p:spPr>
+        <p:txBody>
+          <a:bodyPr/>
+          <a:lstStyle/>
+          <a:p>
+            <a:r>
+              <a:rPr lang="en-US" dirty="0"/>
+              <a:t>Creating a Repository</a:t>
+            </a:r>
+          </a:p>
+        </p:txBody>
+      </p:sp>
+      <p:sp>
+        <p:nvSpPr>
+          <p:cNvPr id="3" name="Content Placeholder 2"/>
+          <p:cNvSpPr>
+            <a:spLocks noGrp="1"/>
+          </p:cNvSpPr>
+          <p:nvPr>
+            <p:ph idx="1"/>
+          </p:nvPr>
+        </p:nvSpPr>
+        <p:spPr>
+          <a:xfrm>
+            <a:off x="638175" y="1382712"/>
+            <a:ext cx="10515600" cy="4351338"/>
+          </a:xfrm>
+        </p:spPr>
+        <p:txBody>
+          <a:bodyPr/>
+          <a:lstStyle/>
+          <a:p>
+            <a:pPr marL="0" indent="0">
+              <a:buNone/>
+            </a:pPr>
+            <a:r>
+              <a:rPr lang="en-US" dirty="0" smtClean="0"/>
+              <a:t>Questions</a:t>
+            </a:r>
+          </a:p>
+          <a:p>
+            <a:r>
+              <a:rPr lang="en-US" dirty="0"/>
+              <a:t>Where does </a:t>
+            </a:r>
+            <a:r>
+              <a:rPr lang="en-US" dirty="0" err="1"/>
+              <a:t>Git</a:t>
+            </a:r>
+            <a:r>
+              <a:rPr lang="en-US" dirty="0"/>
+              <a:t> store information</a:t>
+            </a:r>
+            <a:r>
+              <a:rPr lang="en-US" dirty="0" smtClean="0"/>
+              <a:t>?</a:t>
+            </a:r>
+          </a:p>
+          <a:p>
+            <a:endParaRPr lang="en-US" dirty="0"/>
+          </a:p>
+          <a:p>
+            <a:pPr marL="0" indent="0">
+              <a:buNone/>
+            </a:pPr>
+            <a:r>
+              <a:rPr lang="en-US" dirty="0" smtClean="0"/>
+              <a:t>Objectives</a:t>
+            </a:r>
+          </a:p>
+          <a:p>
+            <a:r>
+              <a:rPr lang="en-US" dirty="0"/>
+              <a:t>Create a local </a:t>
+            </a:r>
+            <a:r>
+              <a:rPr lang="en-US" dirty="0" err="1"/>
+              <a:t>Git</a:t>
+            </a:r>
+            <a:r>
+              <a:rPr lang="en-US" dirty="0"/>
+              <a:t> </a:t>
+            </a:r>
+            <a:r>
+              <a:rPr lang="en-US" dirty="0" smtClean="0"/>
+              <a:t>repository.</a:t>
+            </a:r>
+          </a:p>
+        </p:txBody>
+      </p:sp>
+    </p:spTree>
+    <p:extLst>
+      <p:ext uri="{BB962C8B-B14F-4D97-AF65-F5344CB8AC3E}">
+        <p14:creationId xmlns:p14="http://schemas.microsoft.com/office/powerpoint/2010/main" val="2054788388"/>
+      </p:ext>
+    </p:extLst>
+  </p:cSld>
+  <p:clrMapOvr>
+    <a:masterClrMapping/>
+  </p:clrMapOvr>
+</p:sld>
+</file>
+
+<file path=ppt/slides/slide13.xml><?xml version="1.0" encoding="utf-8"?>
+<p:sld xmlns:a="http://schemas.openxmlformats.org/drawingml/2006/main" xmlns:r="http://schemas.openxmlformats.org/officeDocument/2006/relationships" xmlns:p="http://schemas.openxmlformats.org/presentationml/2006/main">
+  <p:cSld>
+    <p:spTree>
+      <p:nvGrpSpPr>
+        <p:cNvPr id="1" name=""/>
+        <p:cNvGrpSpPr/>
+        <p:nvPr/>
+      </p:nvGrpSpPr>
+      <p:grpSpPr>
+        <a:xfrm>
+          <a:off x="0" y="0"/>
+          <a:ext cx="0" cy="0"/>
+          <a:chOff x="0" y="0"/>
+          <a:chExt cx="0" cy="0"/>
+        </a:xfrm>
+      </p:grpSpPr>
+      <p:sp>
+        <p:nvSpPr>
+          <p:cNvPr id="2" name="Title 1"/>
+          <p:cNvSpPr>
+            <a:spLocks noGrp="1"/>
+          </p:cNvSpPr>
+          <p:nvPr>
+            <p:ph type="title"/>
+          </p:nvPr>
+        </p:nvSpPr>
+        <p:spPr>
+          <a:xfrm>
+            <a:off x="0" y="0"/>
+            <a:ext cx="7477125" cy="835025"/>
+          </a:xfrm>
+        </p:spPr>
+        <p:txBody>
+          <a:bodyPr/>
+          <a:lstStyle/>
+          <a:p>
+            <a:r>
+              <a:rPr lang="en-US" dirty="0"/>
+              <a:t>Tracking Changes</a:t>
+            </a:r>
+          </a:p>
+        </p:txBody>
+      </p:sp>
+      <p:sp>
+        <p:nvSpPr>
+          <p:cNvPr id="3" name="Content Placeholder 2"/>
+          <p:cNvSpPr>
+            <a:spLocks noGrp="1"/>
+          </p:cNvSpPr>
+          <p:nvPr>
+            <p:ph idx="1"/>
+          </p:nvPr>
+        </p:nvSpPr>
+        <p:spPr>
+          <a:xfrm>
+            <a:off x="638175" y="1382712"/>
+            <a:ext cx="10515600" cy="4351338"/>
+          </a:xfrm>
+        </p:spPr>
+        <p:txBody>
+          <a:bodyPr>
+            <a:normAutofit lnSpcReduction="10000"/>
+          </a:bodyPr>
+          <a:lstStyle/>
+          <a:p>
+            <a:pPr marL="0" indent="0">
+              <a:buNone/>
+            </a:pPr>
+            <a:r>
+              <a:rPr lang="en-US" dirty="0" smtClean="0"/>
+              <a:t>Questions</a:t>
+            </a:r>
+          </a:p>
+          <a:p>
+            <a:r>
+              <a:rPr lang="en-US" dirty="0" smtClean="0"/>
+              <a:t>How do I record changes in </a:t>
+            </a:r>
+            <a:r>
+              <a:rPr lang="en-US" dirty="0" err="1" smtClean="0"/>
+              <a:t>Git</a:t>
+            </a:r>
+            <a:r>
+              <a:rPr lang="en-US" dirty="0" smtClean="0"/>
+              <a:t>?</a:t>
+            </a:r>
+          </a:p>
+          <a:p>
+            <a:r>
+              <a:rPr lang="en-US" dirty="0" smtClean="0"/>
+              <a:t>How do I check the status of my version control repository?</a:t>
+            </a:r>
+          </a:p>
+          <a:p>
+            <a:r>
+              <a:rPr lang="en-US" dirty="0" smtClean="0"/>
+              <a:t>How do I record notes about what changes I made and why?</a:t>
+            </a:r>
+          </a:p>
+          <a:p>
+            <a:endParaRPr lang="en-US" dirty="0"/>
+          </a:p>
+          <a:p>
+            <a:pPr marL="0" indent="0">
+              <a:buNone/>
+            </a:pPr>
+            <a:r>
+              <a:rPr lang="en-US" dirty="0" smtClean="0"/>
+              <a:t>Objectives</a:t>
+            </a:r>
+          </a:p>
+          <a:p>
+            <a:r>
+              <a:rPr lang="en-US" dirty="0" smtClean="0"/>
+              <a:t>Go through the modify-add-commit cycle for one or more files.</a:t>
+            </a:r>
+          </a:p>
+          <a:p>
+            <a:r>
+              <a:rPr lang="en-US" dirty="0" smtClean="0"/>
+              <a:t>Explain where information is stored at each stage of </a:t>
+            </a:r>
+            <a:r>
+              <a:rPr lang="en-US" dirty="0" err="1" smtClean="0"/>
+              <a:t>Git</a:t>
+            </a:r>
+            <a:r>
+              <a:rPr lang="en-US" dirty="0" smtClean="0"/>
+              <a:t> commit workflow.</a:t>
+            </a:r>
+          </a:p>
+        </p:txBody>
+      </p:sp>
+    </p:spTree>
+    <p:extLst>
+      <p:ext uri="{BB962C8B-B14F-4D97-AF65-F5344CB8AC3E}">
+        <p14:creationId xmlns:p14="http://schemas.microsoft.com/office/powerpoint/2010/main" val="433876125"/>
+      </p:ext>
+    </p:extLst>
+  </p:cSld>
+  <p:clrMapOvr>
+    <a:masterClrMapping/>
+  </p:clrMapOvr>
+  <p:timing>
+    <p:tnLst>
+      <p:par>
+        <p:cTn id="1" dur="indefinite" restart="never" nodeType="tmRoot"/>
+      </p:par>
+    </p:tnLst>
+  </p:timing>
+</p:sld>
+</file>
+
+<file path=ppt/slides/slide14.xml><?xml version="1.0" encoding="utf-8"?>
+<p:sld xmlns:a="http://schemas.openxmlformats.org/drawingml/2006/main" xmlns:r="http://schemas.openxmlformats.org/officeDocument/2006/relationships" xmlns:p="http://schemas.openxmlformats.org/presentationml/2006/main">
+  <p:cSld>
+    <p:spTree>
+      <p:nvGrpSpPr>
+        <p:cNvPr id="1" name=""/>
+        <p:cNvGrpSpPr/>
+        <p:nvPr/>
+      </p:nvGrpSpPr>
+      <p:grpSpPr>
+        <a:xfrm>
+          <a:off x="0" y="0"/>
+          <a:ext cx="0" cy="0"/>
+          <a:chOff x="0" y="0"/>
+          <a:chExt cx="0" cy="0"/>
+        </a:xfrm>
+      </p:grpSpPr>
+      <p:pic>
+        <p:nvPicPr>
+          <p:cNvPr id="2" name="Picture 1"/>
+          <p:cNvPicPr>
+            <a:picLocks noChangeAspect="1"/>
+          </p:cNvPicPr>
+          <p:nvPr/>
+        </p:nvPicPr>
+        <p:blipFill>
+          <a:blip r:embed="rId2">
+            <a:extLst>
+              <a:ext uri="{28A0092B-C50C-407E-A947-70E740481C1C}">
+                <a14:useLocalDpi xmlns:a14="http://schemas.microsoft.com/office/drawing/2010/main" val="0"/>
+              </a:ext>
+            </a:extLst>
+          </a:blip>
+          <a:stretch>
+            <a:fillRect/>
+          </a:stretch>
+        </p:blipFill>
+        <p:spPr>
+          <a:xfrm>
+            <a:off x="2550204" y="1792827"/>
+            <a:ext cx="6320068" cy="2215072"/>
+          </a:xfrm>
+          <a:prstGeom prst="rect">
+            <a:avLst/>
+          </a:prstGeom>
+        </p:spPr>
+      </p:pic>
+    </p:spTree>
+    <p:extLst>
+      <p:ext uri="{BB962C8B-B14F-4D97-AF65-F5344CB8AC3E}">
+        <p14:creationId xmlns:p14="http://schemas.microsoft.com/office/powerpoint/2010/main" val="2788337564"/>
+      </p:ext>
+    </p:extLst>
+  </p:cSld>
+  <p:clrMapOvr>
+    <a:masterClrMapping/>
+  </p:clrMapOvr>
+  <p:timing>
+    <p:tnLst>
+      <p:par>
+        <p:cTn id="1" dur="indefinite" restart="never" nodeType="tmRoot"/>
+      </p:par>
+    </p:tnLst>
+  </p:timing>
+</p:sld>
+</file>
+
+<file path=ppt/slides/slide15.xml><?xml version="1.0" encoding="utf-8"?>
 <p:sld xmlns:a="http://schemas.openxmlformats.org/drawingml/2006/main" xmlns:r="http://schemas.openxmlformats.org/officeDocument/2006/relationships" xmlns:p="http://schemas.openxmlformats.org/presentationml/2006/main">
   <p:cSld>
     <p:spTree>
@@ -3119,7 +4995,7 @@
 </p:sld>
 </file>
 
-<file path=ppt/slides/slide11.xml><?xml version="1.0" encoding="utf-8"?>
+<file path=ppt/slides/slide16.xml><?xml version="1.0" encoding="utf-8"?>
 <p:sld xmlns:a="http://schemas.openxmlformats.org/drawingml/2006/main" xmlns:r="http://schemas.openxmlformats.org/officeDocument/2006/relationships" xmlns:p="http://schemas.openxmlformats.org/presentationml/2006/main">
   <p:cSld>
     <p:spTree>
@@ -3193,7 +5069,6 @@
               <a:rPr lang="en-US" dirty="0" smtClean="0"/>
               <a:t>Exercises </a:t>
             </a:r>
-            <a:endParaRPr lang="en-US" dirty="0" smtClean="0"/>
           </a:p>
           <a:p>
             <a:r>
@@ -3459,7 +5334,7 @@
 </p:sld>
 </file>
 
-<file path=ppt/slides/slide12.xml><?xml version="1.0" encoding="utf-8"?>
+<file path=ppt/slides/slide17.xml><?xml version="1.0" encoding="utf-8"?>
 <p:sld xmlns:a="http://schemas.openxmlformats.org/drawingml/2006/main" xmlns:r="http://schemas.openxmlformats.org/officeDocument/2006/relationships" xmlns:p="http://schemas.openxmlformats.org/presentationml/2006/main">
   <p:cSld>
     <p:spTree>
@@ -3627,7 +5502,7 @@
 </p:sld>
 </file>
 
-<file path=ppt/slides/slide13.xml><?xml version="1.0" encoding="utf-8"?>
+<file path=ppt/slides/slide18.xml><?xml version="1.0" encoding="utf-8"?>
 <p:sld xmlns:a="http://schemas.openxmlformats.org/drawingml/2006/main" xmlns:r="http://schemas.openxmlformats.org/officeDocument/2006/relationships" xmlns:p="http://schemas.openxmlformats.org/presentationml/2006/main">
   <p:cSld>
     <p:spTree>
@@ -3687,7 +5562,7 @@
 </p:sld>
 </file>
 
-<file path=ppt/slides/slide14.xml><?xml version="1.0" encoding="utf-8"?>
+<file path=ppt/slides/slide19.xml><?xml version="1.0" encoding="utf-8"?>
 <p:sld xmlns:a="http://schemas.openxmlformats.org/drawingml/2006/main" xmlns:r="http://schemas.openxmlformats.org/officeDocument/2006/relationships" xmlns:p="http://schemas.openxmlformats.org/presentationml/2006/main">
   <p:cSld>
     <p:spTree>
@@ -3747,7 +5622,7 @@
 </p:sld>
 </file>
 
-<file path=ppt/slides/slide15.xml><?xml version="1.0" encoding="utf-8"?>
+<file path=ppt/slides/slide2.xml><?xml version="1.0" encoding="utf-8"?>
 <p:sld xmlns:a="http://schemas.openxmlformats.org/drawingml/2006/main" xmlns:r="http://schemas.openxmlformats.org/officeDocument/2006/relationships" xmlns:p="http://schemas.openxmlformats.org/presentationml/2006/main">
   <p:cSld>
     <p:spTree>
@@ -3776,6 +5651,165 @@
         </p:nvSpPr>
         <p:spPr>
           <a:xfrm>
+            <a:off x="0" y="89995"/>
+            <a:ext cx="8564745" cy="557367"/>
+          </a:xfrm>
+        </p:spPr>
+        <p:txBody>
+          <a:bodyPr>
+            <a:normAutofit fontScale="90000"/>
+          </a:bodyPr>
+          <a:lstStyle/>
+          <a:p>
+            <a:r>
+              <a:rPr lang="en-US" dirty="0" smtClean="0"/>
+              <a:t>Our Project</a:t>
+            </a:r>
+            <a:endParaRPr lang="en-US" dirty="0"/>
+          </a:p>
+        </p:txBody>
+      </p:sp>
+      <p:sp>
+        <p:nvSpPr>
+          <p:cNvPr id="3" name="Content Placeholder 2"/>
+          <p:cNvSpPr>
+            <a:spLocks noGrp="1"/>
+          </p:cNvSpPr>
+          <p:nvPr>
+            <p:ph idx="1"/>
+          </p:nvPr>
+        </p:nvSpPr>
+        <p:spPr>
+          <a:xfrm>
+            <a:off x="352677" y="935501"/>
+            <a:ext cx="10515600" cy="4351338"/>
+          </a:xfrm>
+        </p:spPr>
+        <p:txBody>
+          <a:bodyPr>
+            <a:normAutofit lnSpcReduction="10000"/>
+          </a:bodyPr>
+          <a:lstStyle/>
+          <a:p>
+            <a:r>
+              <a:rPr lang="en-US" dirty="0" err="1"/>
+              <a:t>Wolfman</a:t>
+            </a:r>
+            <a:r>
+              <a:rPr lang="en-US" dirty="0"/>
+              <a:t> and Dracula have been hired by Universal Missions (a space services spinoff from Euphoric State University) to investigate if it is possible to send their next planetary lander to Mars</a:t>
+            </a:r>
+            <a:r>
+              <a:rPr lang="en-US" dirty="0" smtClean="0"/>
+              <a:t>.</a:t>
+            </a:r>
+          </a:p>
+          <a:p>
+            <a:pPr lvl="1"/>
+            <a:r>
+              <a:rPr lang="en-US" dirty="0" smtClean="0"/>
+              <a:t>How to work on it together and simultaneously?  </a:t>
+            </a:r>
+          </a:p>
+          <a:p>
+            <a:pPr lvl="1"/>
+            <a:r>
+              <a:rPr lang="en-US" dirty="0" smtClean="0"/>
+              <a:t>How to make sure nothing get lost?</a:t>
+            </a:r>
+          </a:p>
+          <a:p>
+            <a:pPr lvl="1"/>
+            <a:endParaRPr lang="en-US" dirty="0"/>
+          </a:p>
+          <a:p>
+            <a:r>
+              <a:rPr lang="en-US" dirty="0" smtClean="0"/>
+              <a:t>Version Control using </a:t>
+            </a:r>
+            <a:r>
+              <a:rPr lang="en-US" dirty="0" err="1" smtClean="0"/>
+              <a:t>Git</a:t>
+            </a:r>
+            <a:r>
+              <a:rPr lang="en-US" dirty="0" smtClean="0"/>
+              <a:t>!!</a:t>
+            </a:r>
+          </a:p>
+          <a:p>
+            <a:pPr lvl="1"/>
+            <a:r>
+              <a:rPr lang="en-US" dirty="0" smtClean="0"/>
+              <a:t>Nothing is ever lost.  You can take ‘snapshots’ of your work, called </a:t>
+            </a:r>
+            <a:r>
+              <a:rPr lang="en-US" i="1" dirty="0" smtClean="0"/>
+              <a:t>commits</a:t>
+            </a:r>
+            <a:r>
+              <a:rPr lang="en-US" dirty="0" smtClean="0"/>
+              <a:t> that act as little checkpoints.  </a:t>
+            </a:r>
+          </a:p>
+          <a:p>
+            <a:pPr lvl="1"/>
+            <a:r>
+              <a:rPr lang="en-US" dirty="0" smtClean="0"/>
+              <a:t>Changes are annotated by the author of the commit: so you know who does what</a:t>
+            </a:r>
+          </a:p>
+          <a:p>
+            <a:pPr lvl="1"/>
+            <a:r>
+              <a:rPr lang="en-US" dirty="0" smtClean="0"/>
+              <a:t>Unwanted changes can be reverted!</a:t>
+            </a:r>
+            <a:endParaRPr lang="en-US" dirty="0"/>
+          </a:p>
+        </p:txBody>
+      </p:sp>
+    </p:spTree>
+    <p:extLst>
+      <p:ext uri="{BB962C8B-B14F-4D97-AF65-F5344CB8AC3E}">
+        <p14:creationId xmlns:p14="http://schemas.microsoft.com/office/powerpoint/2010/main" val="1829375356"/>
+      </p:ext>
+    </p:extLst>
+  </p:cSld>
+  <p:clrMapOvr>
+    <a:masterClrMapping/>
+  </p:clrMapOvr>
+</p:sld>
+</file>
+
+<file path=ppt/slides/slide20.xml><?xml version="1.0" encoding="utf-8"?>
+<p:sld xmlns:a="http://schemas.openxmlformats.org/drawingml/2006/main" xmlns:r="http://schemas.openxmlformats.org/officeDocument/2006/relationships" xmlns:p="http://schemas.openxmlformats.org/presentationml/2006/main">
+  <p:cSld>
+    <p:spTree>
+      <p:nvGrpSpPr>
+        <p:cNvPr id="1" name=""/>
+        <p:cNvGrpSpPr/>
+        <p:nvPr/>
+      </p:nvGrpSpPr>
+      <p:grpSpPr>
+        <a:xfrm>
+          <a:off x="0" y="0"/>
+          <a:ext cx="0" cy="0"/>
+          <a:chOff x="0" y="0"/>
+          <a:chExt cx="0" cy="0"/>
+        </a:xfrm>
+      </p:grpSpPr>
+      <p:sp>
+        <p:nvSpPr>
+          <p:cNvPr id="2" name="Title 1"/>
+          <p:cNvSpPr>
+            <a:spLocks noGrp="1"/>
+          </p:cNvSpPr>
+          <p:nvPr>
+            <p:ph type="title"/>
+          </p:nvPr>
+        </p:nvSpPr>
+        <p:spPr>
+          <a:xfrm>
             <a:off x="0" y="0"/>
             <a:ext cx="7477125" cy="835025"/>
           </a:xfrm>
@@ -3810,7 +5844,7 @@
         </p:spPr>
         <p:txBody>
           <a:bodyPr>
-            <a:normAutofit fontScale="77500" lnSpcReduction="20000"/>
+            <a:normAutofit fontScale="47500" lnSpcReduction="20000"/>
           </a:bodyPr>
           <a:lstStyle/>
           <a:p>
@@ -3825,14 +5859,118 @@
           </a:p>
           <a:p>
             <a:r>
-              <a:rPr lang="en-US" dirty="0"/>
-              <a:t>What is the output of cat venus.txt at the end of this set of commands</a:t>
-            </a:r>
-            <a:r>
-              <a:rPr lang="en-US" dirty="0" smtClean="0"/>
-              <a:t>?</a:t>
-            </a:r>
-            <a:endParaRPr lang="en-US" dirty="0"/>
+              <a:rPr lang="en-US" dirty="0" smtClean="0"/>
+              <a:t>What is the output of cat venus.txt at the end of this set of commands?</a:t>
+            </a:r>
+          </a:p>
+          <a:p>
+            <a:pPr marL="914400" lvl="2" indent="0">
+              <a:buNone/>
+            </a:pPr>
+            <a:r>
+              <a:rPr lang="en-US" dirty="0"/>
+              <a:t>$ cd planets</a:t>
+            </a:r>
+          </a:p>
+          <a:p>
+            <a:pPr marL="914400" lvl="2" indent="0">
+              <a:buNone/>
+            </a:pPr>
+            <a:r>
+              <a:rPr lang="en-US" dirty="0"/>
+              <a:t>$ </a:t>
+            </a:r>
+            <a:r>
+              <a:rPr lang="en-US" dirty="0" err="1"/>
+              <a:t>nano</a:t>
+            </a:r>
+            <a:r>
+              <a:rPr lang="en-US" dirty="0"/>
+              <a:t> venus.txt #input the following text: Venus is beautiful and full of love</a:t>
+            </a:r>
+          </a:p>
+          <a:p>
+            <a:pPr marL="914400" lvl="2" indent="0">
+              <a:buNone/>
+            </a:pPr>
+            <a:r>
+              <a:rPr lang="en-US" dirty="0"/>
+              <a:t>$ </a:t>
+            </a:r>
+            <a:r>
+              <a:rPr lang="en-US" dirty="0" err="1"/>
+              <a:t>git</a:t>
+            </a:r>
+            <a:r>
+              <a:rPr lang="en-US" dirty="0"/>
+              <a:t> add venus.txt</a:t>
+            </a:r>
+          </a:p>
+          <a:p>
+            <a:pPr marL="914400" lvl="2" indent="0">
+              <a:buNone/>
+            </a:pPr>
+            <a:r>
+              <a:rPr lang="en-US" dirty="0"/>
+              <a:t>$ </a:t>
+            </a:r>
+            <a:r>
+              <a:rPr lang="en-US" dirty="0" err="1"/>
+              <a:t>nano</a:t>
+            </a:r>
+            <a:r>
+              <a:rPr lang="en-US" dirty="0"/>
+              <a:t> venus.txt #add the following text: Venus is too hot to be suitable as a base</a:t>
+            </a:r>
+          </a:p>
+          <a:p>
+            <a:pPr marL="914400" lvl="2" indent="0">
+              <a:buNone/>
+            </a:pPr>
+            <a:r>
+              <a:rPr lang="en-US" dirty="0"/>
+              <a:t>$ </a:t>
+            </a:r>
+            <a:r>
+              <a:rPr lang="en-US" dirty="0" err="1"/>
+              <a:t>git</a:t>
+            </a:r>
+            <a:r>
+              <a:rPr lang="en-US" dirty="0"/>
+              <a:t> commit -m "Comment on Venus as an unsuitable base"</a:t>
+            </a:r>
+          </a:p>
+          <a:p>
+            <a:pPr marL="914400" lvl="2" indent="0">
+              <a:buNone/>
+            </a:pPr>
+            <a:r>
+              <a:rPr lang="en-US" dirty="0"/>
+              <a:t>$ </a:t>
+            </a:r>
+            <a:r>
+              <a:rPr lang="en-US" dirty="0" err="1"/>
+              <a:t>git</a:t>
+            </a:r>
+            <a:r>
+              <a:rPr lang="en-US" dirty="0"/>
+              <a:t> checkout HEAD venus.txt</a:t>
+            </a:r>
+          </a:p>
+          <a:p>
+            <a:pPr marL="914400" lvl="2" indent="0">
+              <a:buNone/>
+            </a:pPr>
+            <a:r>
+              <a:rPr lang="en-US" dirty="0"/>
+              <a:t>$ cat venus.txt #this will print the contents of venus.txt to the screen</a:t>
+            </a:r>
+          </a:p>
+          <a:p>
+            <a:pPr marL="0" indent="0">
+              <a:buNone/>
+            </a:pPr>
+            <a:endParaRPr lang="en-US" dirty="0" smtClean="0"/>
           </a:p>
           <a:p>
             <a:pPr marL="914400" lvl="1" indent="-457200">
@@ -3841,8 +5979,9 @@
             </a:pPr>
             <a:r>
               <a:rPr lang="en-US" dirty="0"/>
-              <a:t>“Added line ‘But the Mummy will appreciate the lack of humidity’ to mars.txt”</a:t>
-            </a:r>
+              <a:t>“Venus is too hot to be suitable as a base”</a:t>
+            </a:r>
+            <a:endParaRPr lang="en-US" dirty="0" smtClean="0"/>
           </a:p>
           <a:p>
             <a:pPr marL="914400" lvl="1" indent="-457200">
@@ -3851,7 +5990,60 @@
             </a:pPr>
             <a:r>
               <a:rPr lang="en-US" dirty="0"/>
-              <a:t>“Discuss effects of Mars’ climate on the Mummy”</a:t>
+              <a:t>“Venus is beautiful and full of love</a:t>
+            </a:r>
+            <a:r>
+              <a:rPr lang="en-US" dirty="0" smtClean="0"/>
+              <a:t>”</a:t>
+            </a:r>
+            <a:endParaRPr lang="en-US" dirty="0"/>
+          </a:p>
+          <a:p>
+            <a:pPr marL="914400" lvl="1" indent="-457200">
+              <a:buFont typeface="+mj-lt"/>
+              <a:buAutoNum type="arabicPeriod"/>
+            </a:pPr>
+            <a:r>
+              <a:rPr lang="en-US" dirty="0"/>
+              <a:t>“Venus is beautiful and full of </a:t>
+            </a:r>
+            <a:r>
+              <a:rPr lang="en-US" dirty="0" smtClean="0"/>
+              <a:t>love</a:t>
+            </a:r>
+          </a:p>
+          <a:p>
+            <a:pPr marL="457200" lvl="1" indent="0">
+              <a:buNone/>
+            </a:pPr>
+            <a:r>
+              <a:rPr lang="en-US" dirty="0"/>
+              <a:t> </a:t>
+            </a:r>
+            <a:r>
+              <a:rPr lang="en-US" dirty="0" smtClean="0"/>
+              <a:t>               Venus </a:t>
+            </a:r>
+            <a:r>
+              <a:rPr lang="en-US" dirty="0"/>
+              <a:t>is too hot to be suitable as a base</a:t>
+            </a:r>
+            <a:r>
+              <a:rPr lang="en-US" dirty="0" smtClean="0"/>
+              <a:t>”</a:t>
+            </a:r>
+          </a:p>
+          <a:p>
+            <a:pPr marL="457200" lvl="1" indent="0">
+              <a:buNone/>
+            </a:pPr>
+            <a:r>
+              <a:rPr lang="en-US" dirty="0" smtClean="0"/>
+              <a:t>4.</a:t>
+            </a:r>
+            <a:r>
+              <a:rPr lang="en-US" dirty="0"/>
+              <a:t>	Error because you have changed venus.txt without committing the changes</a:t>
             </a:r>
           </a:p>
           <a:p>
@@ -4071,7 +6263,7 @@
 </p:sld>
 </file>
 
-<file path=ppt/slides/slide16.xml><?xml version="1.0" encoding="utf-8"?>
+<file path=ppt/slides/slide21.xml><?xml version="1.0" encoding="utf-8"?>
 <p:sld xmlns:a="http://schemas.openxmlformats.org/drawingml/2006/main" xmlns:r="http://schemas.openxmlformats.org/officeDocument/2006/relationships" xmlns:p="http://schemas.openxmlformats.org/presentationml/2006/main">
   <p:cSld>
     <p:spTree>
@@ -4227,7 +6419,243 @@
 </p:sld>
 </file>
 
-<file path=ppt/slides/slide17.xml><?xml version="1.0" encoding="utf-8"?>
+<file path=ppt/slides/slide22.xml><?xml version="1.0" encoding="utf-8"?>
+<p:sld xmlns:a="http://schemas.openxmlformats.org/drawingml/2006/main" xmlns:r="http://schemas.openxmlformats.org/officeDocument/2006/relationships" xmlns:p="http://schemas.openxmlformats.org/presentationml/2006/main">
+  <p:cSld>
+    <p:spTree>
+      <p:nvGrpSpPr>
+        <p:cNvPr id="1" name=""/>
+        <p:cNvGrpSpPr/>
+        <p:nvPr/>
+      </p:nvGrpSpPr>
+      <p:grpSpPr>
+        <a:xfrm>
+          <a:off x="0" y="0"/>
+          <a:ext cx="0" cy="0"/>
+          <a:chOff x="0" y="0"/>
+          <a:chExt cx="0" cy="0"/>
+        </a:xfrm>
+      </p:grpSpPr>
+      <p:sp>
+        <p:nvSpPr>
+          <p:cNvPr id="2" name="Title 1"/>
+          <p:cNvSpPr>
+            <a:spLocks noGrp="1"/>
+          </p:cNvSpPr>
+          <p:nvPr>
+            <p:ph type="title"/>
+          </p:nvPr>
+        </p:nvSpPr>
+        <p:spPr>
+          <a:xfrm>
+            <a:off x="0" y="0"/>
+            <a:ext cx="7477125" cy="835025"/>
+          </a:xfrm>
+        </p:spPr>
+        <p:txBody>
+          <a:bodyPr/>
+          <a:lstStyle/>
+          <a:p>
+            <a:r>
+              <a:rPr lang="en-US" dirty="0" smtClean="0"/>
+              <a:t>Ignoring Things</a:t>
+            </a:r>
+            <a:endParaRPr lang="en-US" dirty="0"/>
+          </a:p>
+        </p:txBody>
+      </p:sp>
+      <p:sp>
+        <p:nvSpPr>
+          <p:cNvPr id="3" name="Content Placeholder 2"/>
+          <p:cNvSpPr>
+            <a:spLocks noGrp="1"/>
+          </p:cNvSpPr>
+          <p:nvPr>
+            <p:ph idx="1"/>
+          </p:nvPr>
+        </p:nvSpPr>
+        <p:spPr>
+          <a:xfrm>
+            <a:off x="207818" y="883948"/>
+            <a:ext cx="10644620" cy="5631151"/>
+          </a:xfrm>
+        </p:spPr>
+        <p:txBody>
+          <a:bodyPr>
+            <a:normAutofit/>
+          </a:bodyPr>
+          <a:lstStyle/>
+          <a:p>
+            <a:pPr marL="0" indent="0">
+              <a:buNone/>
+            </a:pPr>
+            <a:r>
+              <a:rPr lang="en-US" dirty="0" smtClean="0"/>
+              <a:t>Exercises </a:t>
+            </a:r>
+            <a:endParaRPr lang="en-US" dirty="0" smtClean="0"/>
+          </a:p>
+          <a:p>
+            <a:pPr lvl="1"/>
+            <a:r>
+              <a:rPr lang="en-US" dirty="0"/>
+              <a:t>Given a directory structure that looks like</a:t>
+            </a:r>
+            <a:r>
+              <a:rPr lang="en-US" dirty="0" smtClean="0"/>
+              <a:t>:</a:t>
+            </a:r>
+          </a:p>
+          <a:p>
+            <a:pPr marL="457200" lvl="1" indent="0">
+              <a:buNone/>
+            </a:pPr>
+            <a:r>
+              <a:rPr lang="en-US" dirty="0"/>
+              <a:t>	</a:t>
+            </a:r>
+            <a:r>
+              <a:rPr lang="en-US" dirty="0" smtClean="0"/>
+              <a:t>	</a:t>
+            </a:r>
+            <a:r>
+              <a:rPr lang="en-US" dirty="0" smtClean="0"/>
+              <a:t>results/data/position/</a:t>
+            </a:r>
+            <a:r>
+              <a:rPr lang="en-US" dirty="0" err="1" smtClean="0"/>
+              <a:t>gps</a:t>
+            </a:r>
+            <a:r>
+              <a:rPr lang="en-US" dirty="0" smtClean="0"/>
+              <a:t>/</a:t>
+            </a:r>
+            <a:r>
+              <a:rPr lang="en-US" dirty="0" err="1" smtClean="0"/>
+              <a:t>a.data</a:t>
+            </a:r>
+            <a:endParaRPr lang="en-US" dirty="0"/>
+          </a:p>
+          <a:p>
+            <a:pPr marL="457200" lvl="1" indent="0">
+              <a:buNone/>
+            </a:pPr>
+            <a:r>
+              <a:rPr lang="en-US" dirty="0" smtClean="0"/>
+              <a:t>		results/data/position/</a:t>
+            </a:r>
+            <a:r>
+              <a:rPr lang="en-US" dirty="0" err="1" smtClean="0"/>
+              <a:t>gps</a:t>
+            </a:r>
+            <a:r>
+              <a:rPr lang="en-US" dirty="0" smtClean="0"/>
+              <a:t>/</a:t>
+            </a:r>
+            <a:r>
+              <a:rPr lang="en-US" dirty="0" err="1" smtClean="0"/>
+              <a:t>b.data</a:t>
+            </a:r>
+            <a:endParaRPr lang="en-US" dirty="0"/>
+          </a:p>
+          <a:p>
+            <a:pPr marL="457200" lvl="1" indent="0">
+              <a:buNone/>
+            </a:pPr>
+            <a:r>
+              <a:rPr lang="en-US" dirty="0" smtClean="0"/>
+              <a:t>		results/data/position/</a:t>
+            </a:r>
+            <a:r>
+              <a:rPr lang="en-US" dirty="0" err="1" smtClean="0"/>
+              <a:t>gps</a:t>
+            </a:r>
+            <a:r>
+              <a:rPr lang="en-US" dirty="0" smtClean="0"/>
+              <a:t>/</a:t>
+            </a:r>
+            <a:r>
+              <a:rPr lang="en-US" dirty="0" err="1" smtClean="0"/>
+              <a:t>c.data</a:t>
+            </a:r>
+            <a:endParaRPr lang="en-US" dirty="0"/>
+          </a:p>
+          <a:p>
+            <a:pPr marL="457200" lvl="1" indent="0">
+              <a:buNone/>
+            </a:pPr>
+            <a:r>
+              <a:rPr lang="en-US" dirty="0" smtClean="0"/>
+              <a:t>		results/data/position/</a:t>
+            </a:r>
+            <a:r>
+              <a:rPr lang="en-US" dirty="0" err="1" smtClean="0"/>
+              <a:t>gps</a:t>
+            </a:r>
+            <a:r>
+              <a:rPr lang="en-US" dirty="0" smtClean="0"/>
+              <a:t>/info.txt</a:t>
+            </a:r>
+            <a:endParaRPr lang="en-US" dirty="0"/>
+          </a:p>
+          <a:p>
+            <a:pPr marL="457200" lvl="1" indent="0">
+              <a:buNone/>
+            </a:pPr>
+            <a:r>
+              <a:rPr lang="en-US" dirty="0" smtClean="0"/>
+              <a:t>		results/plots</a:t>
+            </a:r>
+            <a:endParaRPr lang="en-US" dirty="0" smtClean="0"/>
+          </a:p>
+          <a:p>
+            <a:pPr marL="457200" lvl="1" indent="0">
+              <a:buNone/>
+            </a:pPr>
+            <a:r>
+              <a:rPr lang="en-US" dirty="0"/>
+              <a:t>-What’s the shortest .</a:t>
+            </a:r>
+            <a:r>
+              <a:rPr lang="en-US" dirty="0" err="1"/>
+              <a:t>gitignore</a:t>
+            </a:r>
+            <a:r>
+              <a:rPr lang="en-US" dirty="0"/>
+              <a:t> rule you could write to ignore all .data files in result/data/position/</a:t>
+            </a:r>
+            <a:r>
+              <a:rPr lang="en-US" dirty="0" err="1"/>
+              <a:t>gps</a:t>
+            </a:r>
+            <a:r>
+              <a:rPr lang="en-US" dirty="0"/>
+              <a:t>? Do not ignore the info.txt.</a:t>
+            </a:r>
+            <a:endParaRPr lang="en-US" dirty="0"/>
+          </a:p>
+          <a:p>
+            <a:pPr marL="0" indent="0">
+              <a:buNone/>
+            </a:pPr>
+            <a:endParaRPr lang="en-US" dirty="0" smtClean="0"/>
+          </a:p>
+        </p:txBody>
+      </p:sp>
+    </p:spTree>
+    <p:extLst>
+      <p:ext uri="{BB962C8B-B14F-4D97-AF65-F5344CB8AC3E}">
+        <p14:creationId xmlns:p14="http://schemas.microsoft.com/office/powerpoint/2010/main" val="3867152603"/>
+      </p:ext>
+    </p:extLst>
+  </p:cSld>
+  <p:clrMapOvr>
+    <a:masterClrMapping/>
+  </p:clrMapOvr>
+</p:sld>
+</file>
+
+<file path=ppt/slides/slide23.xml><?xml version="1.0" encoding="utf-8"?>
 <p:sld xmlns:a="http://schemas.openxmlformats.org/drawingml/2006/main" xmlns:r="http://schemas.openxmlformats.org/officeDocument/2006/relationships" xmlns:p="http://schemas.openxmlformats.org/presentationml/2006/main">
   <p:cSld>
     <p:spTree>
@@ -4359,7 +6787,7 @@
 </p:sld>
 </file>
 
-<file path=ppt/slides/slide18.xml><?xml version="1.0" encoding="utf-8"?>
+<file path=ppt/slides/slide24.xml><?xml version="1.0" encoding="utf-8"?>
 <p:sld xmlns:a="http://schemas.openxmlformats.org/drawingml/2006/main" xmlns:r="http://schemas.openxmlformats.org/officeDocument/2006/relationships" xmlns:p="http://schemas.openxmlformats.org/presentationml/2006/main">
   <p:cSld>
     <p:spTree>
@@ -4419,7 +6847,7 @@
 </p:sld>
 </file>
 
-<file path=ppt/slides/slide19.xml><?xml version="1.0" encoding="utf-8"?>
+<file path=ppt/slides/slide25.xml><?xml version="1.0" encoding="utf-8"?>
 <p:sld xmlns:a="http://schemas.openxmlformats.org/drawingml/2006/main" xmlns:r="http://schemas.openxmlformats.org/officeDocument/2006/relationships" xmlns:p="http://schemas.openxmlformats.org/presentationml/2006/main">
   <p:cSld>
     <p:spTree>
@@ -4479,7 +6907,7 @@
 </p:sld>
 </file>
 
-<file path=ppt/slides/slide2.xml><?xml version="1.0" encoding="utf-8"?>
+<file path=ppt/slides/slide26.xml><?xml version="1.0" encoding="utf-8"?>
 <p:sld xmlns:a="http://schemas.openxmlformats.org/drawingml/2006/main" xmlns:r="http://schemas.openxmlformats.org/officeDocument/2006/relationships" xmlns:p="http://schemas.openxmlformats.org/presentationml/2006/main">
   <p:cSld>
     <p:spTree>
@@ -4518,136 +6946,6 @@
           <a:p>
             <a:r>
               <a:rPr lang="en-US" dirty="0" smtClean="0"/>
-              <a:t>Automated Version Control</a:t>
-            </a:r>
-            <a:endParaRPr lang="en-US" dirty="0"/>
-          </a:p>
-        </p:txBody>
-      </p:sp>
-      <p:sp>
-        <p:nvSpPr>
-          <p:cNvPr id="3" name="Content Placeholder 2"/>
-          <p:cNvSpPr>
-            <a:spLocks noGrp="1"/>
-          </p:cNvSpPr>
-          <p:nvPr>
-            <p:ph idx="1"/>
-          </p:nvPr>
-        </p:nvSpPr>
-        <p:spPr>
-          <a:xfrm>
-            <a:off x="638175" y="1382712"/>
-            <a:ext cx="10515600" cy="4351338"/>
-          </a:xfrm>
-        </p:spPr>
-        <p:txBody>
-          <a:bodyPr/>
-          <a:lstStyle/>
-          <a:p>
-            <a:pPr marL="0" indent="0">
-              <a:buNone/>
-            </a:pPr>
-            <a:r>
-              <a:rPr lang="en-US" dirty="0" smtClean="0"/>
-              <a:t>Questions</a:t>
-            </a:r>
-          </a:p>
-          <a:p>
-            <a:r>
-              <a:rPr lang="en-US" dirty="0" smtClean="0"/>
-              <a:t>What is version control and why should I use it?</a:t>
-            </a:r>
-          </a:p>
-          <a:p>
-            <a:pPr marL="0" indent="0">
-              <a:buNone/>
-            </a:pPr>
-            <a:endParaRPr lang="en-US" dirty="0"/>
-          </a:p>
-          <a:p>
-            <a:pPr marL="0" indent="0">
-              <a:buNone/>
-            </a:pPr>
-            <a:r>
-              <a:rPr lang="en-US" dirty="0" smtClean="0"/>
-              <a:t>Objectives</a:t>
-            </a:r>
-          </a:p>
-          <a:p>
-            <a:r>
-              <a:rPr lang="en-US" dirty="0" smtClean="0"/>
-              <a:t>Understand the benefits of an automated version control system</a:t>
-            </a:r>
-          </a:p>
-          <a:p>
-            <a:r>
-              <a:rPr lang="en-US" dirty="0" smtClean="0"/>
-              <a:t>Understand the basics of how </a:t>
-            </a:r>
-            <a:r>
-              <a:rPr lang="en-US" dirty="0" err="1" smtClean="0"/>
-              <a:t>Git</a:t>
-            </a:r>
-            <a:r>
-              <a:rPr lang="en-US" dirty="0" smtClean="0"/>
-              <a:t> works</a:t>
-            </a:r>
-            <a:endParaRPr lang="en-US" dirty="0"/>
-          </a:p>
-        </p:txBody>
-      </p:sp>
-    </p:spTree>
-    <p:extLst>
-      <p:ext uri="{BB962C8B-B14F-4D97-AF65-F5344CB8AC3E}">
-        <p14:creationId xmlns:p14="http://schemas.microsoft.com/office/powerpoint/2010/main" val="3746604833"/>
-      </p:ext>
-    </p:extLst>
-  </p:cSld>
-  <p:clrMapOvr>
-    <a:masterClrMapping/>
-  </p:clrMapOvr>
-</p:sld>
-</file>
-
-<file path=ppt/slides/slide20.xml><?xml version="1.0" encoding="utf-8"?>
-<p:sld xmlns:a="http://schemas.openxmlformats.org/drawingml/2006/main" xmlns:r="http://schemas.openxmlformats.org/officeDocument/2006/relationships" xmlns:p="http://schemas.openxmlformats.org/presentationml/2006/main">
-  <p:cSld>
-    <p:spTree>
-      <p:nvGrpSpPr>
-        <p:cNvPr id="1" name=""/>
-        <p:cNvGrpSpPr/>
-        <p:nvPr/>
-      </p:nvGrpSpPr>
-      <p:grpSpPr>
-        <a:xfrm>
-          <a:off x="0" y="0"/>
-          <a:ext cx="0" cy="0"/>
-          <a:chOff x="0" y="0"/>
-          <a:chExt cx="0" cy="0"/>
-        </a:xfrm>
-      </p:grpSpPr>
-      <p:sp>
-        <p:nvSpPr>
-          <p:cNvPr id="2" name="Title 1"/>
-          <p:cNvSpPr>
-            <a:spLocks noGrp="1"/>
-          </p:cNvSpPr>
-          <p:nvPr>
-            <p:ph type="title"/>
-          </p:nvPr>
-        </p:nvSpPr>
-        <p:spPr>
-          <a:xfrm>
-            <a:off x="0" y="0"/>
-            <a:ext cx="7477125" cy="835025"/>
-          </a:xfrm>
-        </p:spPr>
-        <p:txBody>
-          <a:bodyPr/>
-          <a:lstStyle/>
-          <a:p>
-            <a:r>
-              <a:rPr lang="en-US" dirty="0" smtClean="0"/>
               <a:t>Remotes in GitHub</a:t>
             </a:r>
             <a:endParaRPr lang="en-US" dirty="0"/>
@@ -4683,7 +6981,6 @@
               <a:rPr lang="en-US" dirty="0" smtClean="0"/>
               <a:t>Exercises </a:t>
             </a:r>
-            <a:endParaRPr lang="en-US" dirty="0" smtClean="0"/>
           </a:p>
           <a:p>
             <a:r>
@@ -4791,7 +7088,7 @@
 </p:sld>
 </file>
 
-<file path=ppt/slides/slide21.xml><?xml version="1.0" encoding="utf-8"?>
+<file path=ppt/slides/slide27.xml><?xml version="1.0" encoding="utf-8"?>
 <p:sld xmlns:a="http://schemas.openxmlformats.org/drawingml/2006/main" xmlns:r="http://schemas.openxmlformats.org/officeDocument/2006/relationships" xmlns:p="http://schemas.openxmlformats.org/presentationml/2006/main">
   <p:cSld>
     <p:spTree>
@@ -4923,7 +7220,7 @@
 </p:sld>
 </file>
 
-<file path=ppt/slides/slide22.xml><?xml version="1.0" encoding="utf-8"?>
+<file path=ppt/slides/slide28.xml><?xml version="1.0" encoding="utf-8"?>
 <p:sld xmlns:a="http://schemas.openxmlformats.org/drawingml/2006/main" xmlns:r="http://schemas.openxmlformats.org/officeDocument/2006/relationships" xmlns:p="http://schemas.openxmlformats.org/presentationml/2006/main">
   <p:cSld>
     <p:spTree>
@@ -4983,7 +7280,7 @@
 </p:sld>
 </file>
 
-<file path=ppt/slides/slide23.xml><?xml version="1.0" encoding="utf-8"?>
+<file path=ppt/slides/slide29.xml><?xml version="1.0" encoding="utf-8"?>
 <p:sld xmlns:a="http://schemas.openxmlformats.org/drawingml/2006/main" xmlns:r="http://schemas.openxmlformats.org/officeDocument/2006/relationships" xmlns:p="http://schemas.openxmlformats.org/presentationml/2006/main">
   <p:cSld>
     <p:spTree>
@@ -5116,7 +7413,113 @@
 </p:sld>
 </file>
 
-<file path=ppt/slides/slide24.xml><?xml version="1.0" encoding="utf-8"?>
+<file path=ppt/slides/slide3.xml><?xml version="1.0" encoding="utf-8"?>
+<p:sld xmlns:a="http://schemas.openxmlformats.org/drawingml/2006/main" xmlns:r="http://schemas.openxmlformats.org/officeDocument/2006/relationships" xmlns:p="http://schemas.openxmlformats.org/presentationml/2006/main">
+  <p:cSld>
+    <p:spTree>
+      <p:nvGrpSpPr>
+        <p:cNvPr id="1" name=""/>
+        <p:cNvGrpSpPr/>
+        <p:nvPr/>
+      </p:nvGrpSpPr>
+      <p:grpSpPr>
+        <a:xfrm>
+          <a:off x="0" y="0"/>
+          <a:ext cx="0" cy="0"/>
+          <a:chOff x="0" y="0"/>
+          <a:chExt cx="0" cy="0"/>
+        </a:xfrm>
+      </p:grpSpPr>
+      <p:sp>
+        <p:nvSpPr>
+          <p:cNvPr id="2" name="Title 1"/>
+          <p:cNvSpPr>
+            <a:spLocks noGrp="1"/>
+          </p:cNvSpPr>
+          <p:nvPr>
+            <p:ph type="title"/>
+          </p:nvPr>
+        </p:nvSpPr>
+        <p:spPr>
+          <a:xfrm>
+            <a:off x="635899" y="227561"/>
+            <a:ext cx="9754274" cy="840588"/>
+          </a:xfrm>
+        </p:spPr>
+        <p:txBody>
+          <a:bodyPr/>
+          <a:lstStyle/>
+          <a:p>
+            <a:r>
+              <a:rPr lang="en-US" dirty="0" smtClean="0"/>
+              <a:t>Benefits beyond monsters</a:t>
+            </a:r>
+            <a:endParaRPr lang="en-US" dirty="0"/>
+          </a:p>
+        </p:txBody>
+      </p:sp>
+      <p:sp>
+        <p:nvSpPr>
+          <p:cNvPr id="3" name="Content Placeholder 2"/>
+          <p:cNvSpPr>
+            <a:spLocks noGrp="1"/>
+          </p:cNvSpPr>
+          <p:nvPr>
+            <p:ph idx="1"/>
+          </p:nvPr>
+        </p:nvSpPr>
+        <p:spPr>
+          <a:xfrm>
+            <a:off x="595439" y="1323919"/>
+            <a:ext cx="10515600" cy="4351338"/>
+          </a:xfrm>
+        </p:spPr>
+        <p:txBody>
+          <a:bodyPr/>
+          <a:lstStyle/>
+          <a:p>
+            <a:r>
+              <a:rPr lang="en-US" dirty="0" smtClean="0"/>
+              <a:t>Researchers can use </a:t>
+            </a:r>
+            <a:r>
+              <a:rPr lang="en-US" dirty="0" err="1" smtClean="0"/>
+              <a:t>Git</a:t>
+            </a:r>
+            <a:r>
+              <a:rPr lang="en-US" dirty="0" smtClean="0"/>
+              <a:t> and version control to track project progress, manuscript edits, etc.  </a:t>
+            </a:r>
+          </a:p>
+          <a:p>
+            <a:r>
+              <a:rPr lang="en-US" dirty="0" smtClean="0"/>
+              <a:t>It is the lab notebook of the digital world.  It allows you keep track and revisit what was done, even years down the line!</a:t>
+            </a:r>
+          </a:p>
+          <a:p>
+            <a:r>
+              <a:rPr lang="en-US" dirty="0" smtClean="0"/>
+              <a:t>Works best with text, but can be used to store anything that changes with time and would benefit by tracking these changes</a:t>
+            </a:r>
+            <a:endParaRPr lang="en-US" dirty="0"/>
+          </a:p>
+        </p:txBody>
+      </p:sp>
+    </p:spTree>
+    <p:extLst>
+      <p:ext uri="{BB962C8B-B14F-4D97-AF65-F5344CB8AC3E}">
+        <p14:creationId xmlns:p14="http://schemas.microsoft.com/office/powerpoint/2010/main" val="3283749035"/>
+      </p:ext>
+    </p:extLst>
+  </p:cSld>
+  <p:clrMapOvr>
+    <a:masterClrMapping/>
+  </p:clrMapOvr>
+</p:sld>
+</file>
+
+<file path=ppt/slides/slide30.xml><?xml version="1.0" encoding="utf-8"?>
 <p:sld xmlns:a="http://schemas.openxmlformats.org/drawingml/2006/main" xmlns:r="http://schemas.openxmlformats.org/officeDocument/2006/relationships" xmlns:p="http://schemas.openxmlformats.org/presentationml/2006/main">
   <p:cSld>
     <p:spTree>
@@ -5176,7 +7579,237 @@
 </p:sld>
 </file>
 
-<file path=ppt/slides/slide3.xml><?xml version="1.0" encoding="utf-8"?>
+<file path=ppt/slides/slide4.xml><?xml version="1.0" encoding="utf-8"?>
+<p:sld xmlns:a="http://schemas.openxmlformats.org/drawingml/2006/main" xmlns:r="http://schemas.openxmlformats.org/officeDocument/2006/relationships" xmlns:p="http://schemas.openxmlformats.org/presentationml/2006/main">
+  <p:cSld>
+    <p:spTree>
+      <p:nvGrpSpPr>
+        <p:cNvPr id="1" name=""/>
+        <p:cNvGrpSpPr/>
+        <p:nvPr/>
+      </p:nvGrpSpPr>
+      <p:grpSpPr>
+        <a:xfrm>
+          <a:off x="0" y="0"/>
+          <a:ext cx="0" cy="0"/>
+          <a:chOff x="0" y="0"/>
+          <a:chExt cx="0" cy="0"/>
+        </a:xfrm>
+      </p:grpSpPr>
+      <p:sp>
+        <p:nvSpPr>
+          <p:cNvPr id="2" name="Title 1"/>
+          <p:cNvSpPr>
+            <a:spLocks noGrp="1"/>
+          </p:cNvSpPr>
+          <p:nvPr>
+            <p:ph type="title"/>
+          </p:nvPr>
+        </p:nvSpPr>
+        <p:spPr/>
+        <p:txBody>
+          <a:bodyPr/>
+          <a:lstStyle/>
+          <a:p>
+            <a:r>
+              <a:rPr lang="en-US" dirty="0" smtClean="0"/>
+              <a:t>Prerequisites</a:t>
+            </a:r>
+            <a:endParaRPr lang="en-US" dirty="0"/>
+          </a:p>
+        </p:txBody>
+      </p:sp>
+      <p:sp>
+        <p:nvSpPr>
+          <p:cNvPr id="3" name="Content Placeholder 2"/>
+          <p:cNvSpPr>
+            <a:spLocks noGrp="1"/>
+          </p:cNvSpPr>
+          <p:nvPr>
+            <p:ph idx="1"/>
+          </p:nvPr>
+        </p:nvSpPr>
+        <p:spPr/>
+        <p:txBody>
+          <a:bodyPr/>
+          <a:lstStyle/>
+          <a:p>
+            <a:r>
+              <a:rPr lang="en-US" dirty="0" err="1" smtClean="0"/>
+              <a:t>Git</a:t>
+            </a:r>
+            <a:r>
+              <a:rPr lang="en-US" dirty="0" smtClean="0"/>
+              <a:t> should be installed</a:t>
+            </a:r>
+          </a:p>
+          <a:p>
+            <a:r>
+              <a:rPr lang="en-US" dirty="0" smtClean="0"/>
+              <a:t>A little experience with Unix shell</a:t>
+            </a:r>
+          </a:p>
+          <a:p>
+            <a:r>
+              <a:rPr lang="en-US" dirty="0" smtClean="0"/>
+              <a:t>A text editor – </a:t>
+            </a:r>
+            <a:r>
+              <a:rPr lang="en-US" dirty="0" err="1" smtClean="0"/>
+              <a:t>nano</a:t>
+            </a:r>
+            <a:r>
+              <a:rPr lang="en-US" dirty="0" smtClean="0"/>
+              <a:t>, vim, notepad++, sublime</a:t>
+            </a:r>
+            <a:endParaRPr lang="en-US" dirty="0"/>
+          </a:p>
+        </p:txBody>
+      </p:sp>
+    </p:spTree>
+    <p:extLst>
+      <p:ext uri="{BB962C8B-B14F-4D97-AF65-F5344CB8AC3E}">
+        <p14:creationId xmlns:p14="http://schemas.microsoft.com/office/powerpoint/2010/main" val="1222371379"/>
+      </p:ext>
+    </p:extLst>
+  </p:cSld>
+  <p:clrMapOvr>
+    <a:masterClrMapping/>
+  </p:clrMapOvr>
+</p:sld>
+</file>
+
+<file path=ppt/slides/slide5.xml><?xml version="1.0" encoding="utf-8"?>
+<p:sld xmlns:a="http://schemas.openxmlformats.org/drawingml/2006/main" xmlns:r="http://schemas.openxmlformats.org/officeDocument/2006/relationships" xmlns:p="http://schemas.openxmlformats.org/presentationml/2006/main">
+  <p:cSld>
+    <p:spTree>
+      <p:nvGrpSpPr>
+        <p:cNvPr id="1" name=""/>
+        <p:cNvGrpSpPr/>
+        <p:nvPr/>
+      </p:nvGrpSpPr>
+      <p:grpSpPr>
+        <a:xfrm>
+          <a:off x="0" y="0"/>
+          <a:ext cx="0" cy="0"/>
+          <a:chOff x="0" y="0"/>
+          <a:chExt cx="0" cy="0"/>
+        </a:xfrm>
+      </p:grpSpPr>
+      <p:sp>
+        <p:nvSpPr>
+          <p:cNvPr id="2" name="Title 1"/>
+          <p:cNvSpPr>
+            <a:spLocks noGrp="1"/>
+          </p:cNvSpPr>
+          <p:nvPr>
+            <p:ph type="title"/>
+          </p:nvPr>
+        </p:nvSpPr>
+        <p:spPr>
+          <a:xfrm>
+            <a:off x="0" y="0"/>
+            <a:ext cx="7477125" cy="835025"/>
+          </a:xfrm>
+        </p:spPr>
+        <p:txBody>
+          <a:bodyPr/>
+          <a:lstStyle/>
+          <a:p>
+            <a:r>
+              <a:rPr lang="en-US" dirty="0" smtClean="0"/>
+              <a:t>Automated Version Control</a:t>
+            </a:r>
+            <a:endParaRPr lang="en-US" dirty="0"/>
+          </a:p>
+        </p:txBody>
+      </p:sp>
+      <p:sp>
+        <p:nvSpPr>
+          <p:cNvPr id="3" name="Content Placeholder 2"/>
+          <p:cNvSpPr>
+            <a:spLocks noGrp="1"/>
+          </p:cNvSpPr>
+          <p:nvPr>
+            <p:ph idx="1"/>
+          </p:nvPr>
+        </p:nvSpPr>
+        <p:spPr>
+          <a:xfrm>
+            <a:off x="638175" y="1382712"/>
+            <a:ext cx="10515600" cy="4351338"/>
+          </a:xfrm>
+        </p:spPr>
+        <p:txBody>
+          <a:bodyPr/>
+          <a:lstStyle/>
+          <a:p>
+            <a:pPr marL="0" indent="0">
+              <a:buNone/>
+            </a:pPr>
+            <a:r>
+              <a:rPr lang="en-US" dirty="0" smtClean="0"/>
+              <a:t>Questions</a:t>
+            </a:r>
+          </a:p>
+          <a:p>
+            <a:r>
+              <a:rPr lang="en-US" dirty="0" smtClean="0"/>
+              <a:t>What is version control and why should I use it?</a:t>
+            </a:r>
+          </a:p>
+          <a:p>
+            <a:pPr marL="0" indent="0">
+              <a:buNone/>
+            </a:pPr>
+            <a:endParaRPr lang="en-US" dirty="0"/>
+          </a:p>
+          <a:p>
+            <a:pPr marL="0" indent="0">
+              <a:buNone/>
+            </a:pPr>
+            <a:r>
+              <a:rPr lang="en-US" dirty="0" smtClean="0"/>
+              <a:t>Objectives</a:t>
+            </a:r>
+          </a:p>
+          <a:p>
+            <a:r>
+              <a:rPr lang="en-US" dirty="0" smtClean="0"/>
+              <a:t>Understand the benefits of an automated version control system</a:t>
+            </a:r>
+          </a:p>
+          <a:p>
+            <a:r>
+              <a:rPr lang="en-US" dirty="0" smtClean="0"/>
+              <a:t>Understand the basics of how </a:t>
+            </a:r>
+            <a:r>
+              <a:rPr lang="en-US" dirty="0" err="1" smtClean="0"/>
+              <a:t>Git</a:t>
+            </a:r>
+            <a:r>
+              <a:rPr lang="en-US" dirty="0" smtClean="0"/>
+              <a:t> works</a:t>
+            </a:r>
+            <a:endParaRPr lang="en-US" dirty="0"/>
+          </a:p>
+        </p:txBody>
+      </p:sp>
+    </p:spTree>
+    <p:extLst>
+      <p:ext uri="{BB962C8B-B14F-4D97-AF65-F5344CB8AC3E}">
+        <p14:creationId xmlns:p14="http://schemas.microsoft.com/office/powerpoint/2010/main" val="3746604833"/>
+      </p:ext>
+    </p:extLst>
+  </p:cSld>
+  <p:clrMapOvr>
+    <a:masterClrMapping/>
+  </p:clrMapOvr>
+</p:sld>
+</file>
+
+<file path=ppt/slides/slide6.xml><?xml version="1.0" encoding="utf-8"?>
 <p:sld xmlns:a="http://schemas.openxmlformats.org/drawingml/2006/main" xmlns:r="http://schemas.openxmlformats.org/officeDocument/2006/relationships" xmlns:p="http://schemas.openxmlformats.org/presentationml/2006/main">
   <p:cSld>
     <p:spTree>
@@ -5271,7 +7904,7 @@
 </p:sld>
 </file>
 
-<file path=ppt/slides/slide4.xml><?xml version="1.0" encoding="utf-8"?>
+<file path=ppt/slides/slide7.xml><?xml version="1.0" encoding="utf-8"?>
 <p:sld xmlns:a="http://schemas.openxmlformats.org/drawingml/2006/main" xmlns:r="http://schemas.openxmlformats.org/officeDocument/2006/relationships" xmlns:p="http://schemas.openxmlformats.org/presentationml/2006/main">
   <p:cSld>
     <p:spTree>
@@ -5310,7 +7943,7 @@
         </p:blipFill>
         <p:spPr>
           <a:xfrm>
-            <a:off x="3185841" y="470766"/>
+            <a:off x="3024001" y="-168505"/>
             <a:ext cx="6248941" cy="2001693"/>
           </a:xfrm>
           <a:prstGeom prst="rect">
@@ -5340,7 +7973,7 @@
         </p:blipFill>
         <p:spPr>
           <a:xfrm>
-            <a:off x="657982" y="2571848"/>
+            <a:off x="1409791" y="1781601"/>
             <a:ext cx="3901778" cy="3596952"/>
           </a:xfrm>
           <a:prstGeom prst="rect">
@@ -5370,7 +8003,7 @@
         </p:blipFill>
         <p:spPr>
           <a:xfrm>
-            <a:off x="7745873" y="2429596"/>
+            <a:off x="6934422" y="1590423"/>
             <a:ext cx="4044030" cy="3881456"/>
           </a:xfrm>
           <a:prstGeom prst="rect">
@@ -5378,399 +8011,196 @@
           </a:prstGeom>
         </p:spPr>
       </p:pic>
+      <p:sp>
+        <p:nvSpPr>
+          <p:cNvPr id="2" name="Rectangle 1"/>
+          <p:cNvSpPr/>
+          <p:nvPr/>
+        </p:nvSpPr>
+        <p:spPr>
+          <a:xfrm>
+            <a:off x="2246887" y="3932811"/>
+            <a:ext cx="8475059" cy="2862322"/>
+          </a:xfrm>
+          <a:prstGeom prst="rect">
+            <a:avLst/>
+          </a:prstGeom>
+        </p:spPr>
+        <p:txBody>
+          <a:bodyPr wrap="square">
+            <a:spAutoFit/>
+          </a:bodyPr>
+          <a:lstStyle/>
+          <a:p>
+            <a:endParaRPr lang="en-US" dirty="0" smtClean="0">
+              <a:solidFill>
+                <a:srgbClr val="333333"/>
+              </a:solidFill>
+              <a:latin typeface="Helvetica Neue"/>
+            </a:endParaRPr>
+          </a:p>
+          <a:p>
+            <a:endParaRPr lang="en-US" dirty="0">
+              <a:solidFill>
+                <a:srgbClr val="333333"/>
+              </a:solidFill>
+              <a:latin typeface="Helvetica Neue"/>
+            </a:endParaRPr>
+          </a:p>
+          <a:p>
+            <a:endParaRPr lang="en-US" dirty="0" smtClean="0">
+              <a:solidFill>
+                <a:srgbClr val="333333"/>
+              </a:solidFill>
+              <a:latin typeface="Helvetica Neue"/>
+            </a:endParaRPr>
+          </a:p>
+          <a:p>
+            <a:endParaRPr lang="en-US" dirty="0">
+              <a:solidFill>
+                <a:srgbClr val="333333"/>
+              </a:solidFill>
+              <a:latin typeface="Helvetica Neue"/>
+            </a:endParaRPr>
+          </a:p>
+          <a:p>
+            <a:endParaRPr lang="en-US" dirty="0" smtClean="0">
+              <a:solidFill>
+                <a:srgbClr val="333333"/>
+              </a:solidFill>
+              <a:latin typeface="Helvetica Neue"/>
+            </a:endParaRPr>
+          </a:p>
+          <a:p>
+            <a:r>
+              <a:rPr lang="en-US" dirty="0" smtClean="0">
+                <a:solidFill>
+                  <a:srgbClr val="333333"/>
+                </a:solidFill>
+                <a:latin typeface="Helvetica Neue"/>
+              </a:rPr>
+              <a:t>-Changes are tracked as</a:t>
+            </a:r>
+            <a:r>
+              <a:rPr lang="en-US" dirty="0">
+                <a:solidFill>
+                  <a:srgbClr val="333333"/>
+                </a:solidFill>
+                <a:latin typeface="Helvetica Neue"/>
+              </a:rPr>
+              <a:t> </a:t>
+            </a:r>
+            <a:r>
+              <a:rPr lang="en-US" b="1" i="1" dirty="0" smtClean="0">
+                <a:solidFill>
+                  <a:schemeClr val="accent1"/>
+                </a:solidFill>
+                <a:latin typeface="Helvetica Neue"/>
+              </a:rPr>
+              <a:t>commits</a:t>
+            </a:r>
+            <a:r>
+              <a:rPr lang="en-US" i="1" dirty="0" smtClean="0">
+                <a:solidFill>
+                  <a:srgbClr val="333333"/>
+                </a:solidFill>
+                <a:latin typeface="Helvetica Neue"/>
+              </a:rPr>
+              <a:t>:</a:t>
+            </a:r>
+            <a:r>
+              <a:rPr lang="en-US" dirty="0" smtClean="0">
+                <a:solidFill>
+                  <a:srgbClr val="333333"/>
+                </a:solidFill>
+                <a:latin typeface="Helvetica Neue"/>
+              </a:rPr>
+              <a:t> all with useful metadata: a message, time, changes made, author, etc.</a:t>
+            </a:r>
+          </a:p>
+          <a:p>
+            <a:r>
+              <a:rPr lang="en-US" dirty="0" smtClean="0">
+                <a:solidFill>
+                  <a:srgbClr val="333333"/>
+                </a:solidFill>
+                <a:latin typeface="Helvetica Neue"/>
+              </a:rPr>
+              <a:t>-This </a:t>
+            </a:r>
+            <a:r>
+              <a:rPr lang="en-US" dirty="0">
+                <a:solidFill>
+                  <a:srgbClr val="333333"/>
+                </a:solidFill>
+                <a:latin typeface="Helvetica Neue"/>
+              </a:rPr>
+              <a:t>complete history of commits for a particular </a:t>
+            </a:r>
+            <a:r>
+              <a:rPr lang="en-US" dirty="0" smtClean="0">
+                <a:solidFill>
+                  <a:srgbClr val="333333"/>
+                </a:solidFill>
+                <a:latin typeface="Helvetica Neue"/>
+              </a:rPr>
+              <a:t>project is called a </a:t>
+            </a:r>
+            <a:r>
+              <a:rPr lang="en-US" b="1" i="1" dirty="0" smtClean="0">
+                <a:solidFill>
+                  <a:schemeClr val="accent1"/>
+                </a:solidFill>
+                <a:latin typeface="Helvetica Neue"/>
+              </a:rPr>
+              <a:t>repository</a:t>
+            </a:r>
+          </a:p>
+          <a:p>
+            <a:r>
+              <a:rPr lang="en-US" dirty="0" smtClean="0">
+                <a:solidFill>
+                  <a:srgbClr val="333333"/>
+                </a:solidFill>
+                <a:latin typeface="Helvetica Neue"/>
+              </a:rPr>
+              <a:t>-</a:t>
+            </a:r>
+            <a:r>
+              <a:rPr lang="en-US" b="1" i="1" dirty="0" smtClean="0">
+                <a:solidFill>
+                  <a:schemeClr val="accent1"/>
+                </a:solidFill>
+                <a:latin typeface="Helvetica Neue"/>
+              </a:rPr>
+              <a:t>Repositories</a:t>
+            </a:r>
+            <a:r>
+              <a:rPr lang="en-US" dirty="0" smtClean="0">
+                <a:solidFill>
+                  <a:srgbClr val="333333"/>
+                </a:solidFill>
+                <a:latin typeface="Helvetica Neue"/>
+              </a:rPr>
+              <a:t> </a:t>
+            </a:r>
+            <a:r>
+              <a:rPr lang="en-US" dirty="0">
+                <a:solidFill>
+                  <a:srgbClr val="333333"/>
+                </a:solidFill>
+                <a:latin typeface="Helvetica Neue"/>
+              </a:rPr>
+              <a:t>can be kept in sync across different computers facilitating collaboration among different people.</a:t>
+            </a:r>
+            <a:endParaRPr lang="en-US" dirty="0"/>
+          </a:p>
+        </p:txBody>
+      </p:sp>
     </p:spTree>
     <p:extLst>
       <p:ext uri="{BB962C8B-B14F-4D97-AF65-F5344CB8AC3E}">
         <p14:creationId xmlns:p14="http://schemas.microsoft.com/office/powerpoint/2010/main" val="2058221168"/>
-      </p:ext>
-    </p:extLst>
-  </p:cSld>
-  <p:clrMapOvr>
-    <a:masterClrMapping/>
-  </p:clrMapOvr>
-</p:sld>
-</file>
-
-<file path=ppt/slides/slide5.xml><?xml version="1.0" encoding="utf-8"?>
-<p:sld xmlns:a="http://schemas.openxmlformats.org/drawingml/2006/main" xmlns:r="http://schemas.openxmlformats.org/officeDocument/2006/relationships" xmlns:p="http://schemas.openxmlformats.org/presentationml/2006/main">
-  <p:cSld>
-    <p:spTree>
-      <p:nvGrpSpPr>
-        <p:cNvPr id="1" name=""/>
-        <p:cNvGrpSpPr/>
-        <p:nvPr/>
-      </p:nvGrpSpPr>
-      <p:grpSpPr>
-        <a:xfrm>
-          <a:off x="0" y="0"/>
-          <a:ext cx="0" cy="0"/>
-          <a:chOff x="0" y="0"/>
-          <a:chExt cx="0" cy="0"/>
-        </a:xfrm>
-      </p:grpSpPr>
-      <p:sp>
-        <p:nvSpPr>
-          <p:cNvPr id="2" name="Title 1"/>
-          <p:cNvSpPr>
-            <a:spLocks noGrp="1"/>
-          </p:cNvSpPr>
-          <p:nvPr>
-            <p:ph type="title"/>
-          </p:nvPr>
-        </p:nvSpPr>
-        <p:spPr>
-          <a:xfrm>
-            <a:off x="0" y="0"/>
-            <a:ext cx="7477125" cy="835025"/>
-          </a:xfrm>
-        </p:spPr>
-        <p:txBody>
-          <a:bodyPr/>
-          <a:lstStyle/>
-          <a:p>
-            <a:r>
-              <a:rPr lang="en-US" dirty="0" smtClean="0"/>
-              <a:t>Automated Version Control</a:t>
-            </a:r>
-            <a:endParaRPr lang="en-US" dirty="0"/>
-          </a:p>
-        </p:txBody>
-      </p:sp>
-      <p:sp>
-        <p:nvSpPr>
-          <p:cNvPr id="3" name="Content Placeholder 2"/>
-          <p:cNvSpPr>
-            <a:spLocks noGrp="1"/>
-          </p:cNvSpPr>
-          <p:nvPr>
-            <p:ph idx="1"/>
-          </p:nvPr>
-        </p:nvSpPr>
-        <p:spPr>
-          <a:xfrm>
-            <a:off x="638175" y="1382712"/>
-            <a:ext cx="10515600" cy="4351338"/>
-          </a:xfrm>
-        </p:spPr>
-        <p:txBody>
-          <a:bodyPr/>
-          <a:lstStyle/>
-          <a:p>
-            <a:pPr marL="0" indent="0">
-              <a:buNone/>
-            </a:pPr>
-            <a:r>
-              <a:rPr lang="en-US" dirty="0" smtClean="0"/>
-              <a:t>Exercises </a:t>
-            </a:r>
-            <a:endParaRPr lang="en-US" dirty="0" smtClean="0"/>
-          </a:p>
-          <a:p>
-            <a:r>
-              <a:rPr lang="en-US" dirty="0"/>
-              <a:t>Imagine you drafted an excellent paragraph for a paper you are writing, but later ruin it. How would you retrieve the </a:t>
-            </a:r>
-            <a:r>
-              <a:rPr lang="en-US" i="1" dirty="0"/>
-              <a:t>excellent</a:t>
-            </a:r>
-            <a:r>
-              <a:rPr lang="en-US" dirty="0"/>
-              <a:t> version of your conclusion? Is it even possible?</a:t>
-            </a:r>
-          </a:p>
-          <a:p>
-            <a:r>
-              <a:rPr lang="en-US" dirty="0"/>
-              <a:t>Imagine you have 5 co-authors. How would you manage the changes and comments they make to your paper? If you use LibreOffice Writer or Microsoft Word, what happens if you accept changes made using the Track Changes option? Do you have a history of those changes?</a:t>
-            </a:r>
-          </a:p>
-          <a:p>
-            <a:pPr marL="0" indent="0">
-              <a:buNone/>
-            </a:pPr>
-            <a:endParaRPr lang="en-US" dirty="0" smtClean="0"/>
-          </a:p>
-        </p:txBody>
-      </p:sp>
-    </p:spTree>
-    <p:extLst>
-      <p:ext uri="{BB962C8B-B14F-4D97-AF65-F5344CB8AC3E}">
-        <p14:creationId xmlns:p14="http://schemas.microsoft.com/office/powerpoint/2010/main" val="884195965"/>
-      </p:ext>
-    </p:extLst>
-  </p:cSld>
-  <p:clrMapOvr>
-    <a:masterClrMapping/>
-  </p:clrMapOvr>
-</p:sld>
-</file>
-
-<file path=ppt/slides/slide6.xml><?xml version="1.0" encoding="utf-8"?>
-<p:sld xmlns:a="http://schemas.openxmlformats.org/drawingml/2006/main" xmlns:r="http://schemas.openxmlformats.org/officeDocument/2006/relationships" xmlns:p="http://schemas.openxmlformats.org/presentationml/2006/main">
-  <p:cSld>
-    <p:spTree>
-      <p:nvGrpSpPr>
-        <p:cNvPr id="1" name=""/>
-        <p:cNvGrpSpPr/>
-        <p:nvPr/>
-      </p:nvGrpSpPr>
-      <p:grpSpPr>
-        <a:xfrm>
-          <a:off x="0" y="0"/>
-          <a:ext cx="0" cy="0"/>
-          <a:chOff x="0" y="0"/>
-          <a:chExt cx="0" cy="0"/>
-        </a:xfrm>
-      </p:grpSpPr>
-      <p:sp>
-        <p:nvSpPr>
-          <p:cNvPr id="2" name="Title 1"/>
-          <p:cNvSpPr>
-            <a:spLocks noGrp="1"/>
-          </p:cNvSpPr>
-          <p:nvPr>
-            <p:ph type="title"/>
-          </p:nvPr>
-        </p:nvSpPr>
-        <p:spPr>
-          <a:xfrm>
-            <a:off x="0" y="0"/>
-            <a:ext cx="7477125" cy="835025"/>
-          </a:xfrm>
-        </p:spPr>
-        <p:txBody>
-          <a:bodyPr/>
-          <a:lstStyle/>
-          <a:p>
-            <a:r>
-              <a:rPr lang="en-US" dirty="0" smtClean="0"/>
-              <a:t>Setting Up </a:t>
-            </a:r>
-            <a:r>
-              <a:rPr lang="en-US" dirty="0" err="1" smtClean="0"/>
-              <a:t>Git</a:t>
-            </a:r>
-            <a:endParaRPr lang="en-US" dirty="0"/>
-          </a:p>
-        </p:txBody>
-      </p:sp>
-      <p:sp>
-        <p:nvSpPr>
-          <p:cNvPr id="3" name="Content Placeholder 2"/>
-          <p:cNvSpPr>
-            <a:spLocks noGrp="1"/>
-          </p:cNvSpPr>
-          <p:nvPr>
-            <p:ph idx="1"/>
-          </p:nvPr>
-        </p:nvSpPr>
-        <p:spPr>
-          <a:xfrm>
-            <a:off x="638175" y="1382712"/>
-            <a:ext cx="10515600" cy="4351338"/>
-          </a:xfrm>
-        </p:spPr>
-        <p:txBody>
-          <a:bodyPr/>
-          <a:lstStyle/>
-          <a:p>
-            <a:pPr marL="0" indent="0">
-              <a:buNone/>
-            </a:pPr>
-            <a:r>
-              <a:rPr lang="en-US" dirty="0" smtClean="0"/>
-              <a:t>Questions</a:t>
-            </a:r>
-          </a:p>
-          <a:p>
-            <a:r>
-              <a:rPr lang="en-US" dirty="0" smtClean="0"/>
-              <a:t>How do I get set up to use </a:t>
-            </a:r>
-            <a:r>
-              <a:rPr lang="en-US" dirty="0" err="1" smtClean="0"/>
-              <a:t>Git</a:t>
-            </a:r>
-            <a:r>
-              <a:rPr lang="en-US" dirty="0" smtClean="0"/>
-              <a:t>?</a:t>
-            </a:r>
-          </a:p>
-          <a:p>
-            <a:endParaRPr lang="en-US" dirty="0"/>
-          </a:p>
-          <a:p>
-            <a:pPr marL="0" indent="0">
-              <a:buNone/>
-            </a:pPr>
-            <a:r>
-              <a:rPr lang="en-US" dirty="0" smtClean="0"/>
-              <a:t>Objectives</a:t>
-            </a:r>
-          </a:p>
-          <a:p>
-            <a:r>
-              <a:rPr lang="en-US" dirty="0" smtClean="0"/>
-              <a:t>Configure </a:t>
-            </a:r>
-            <a:r>
-              <a:rPr lang="en-US" dirty="0" err="1" smtClean="0"/>
-              <a:t>git</a:t>
-            </a:r>
-            <a:r>
-              <a:rPr lang="en-US" dirty="0" smtClean="0"/>
-              <a:t> the first time it is used on a computer.</a:t>
-            </a:r>
-          </a:p>
-          <a:p>
-            <a:r>
-              <a:rPr lang="en-US" dirty="0" smtClean="0"/>
-              <a:t>Understand the meaning of the --global configuration flag.</a:t>
-            </a:r>
-            <a:endParaRPr lang="en-US" dirty="0"/>
-          </a:p>
-        </p:txBody>
-      </p:sp>
-    </p:spTree>
-    <p:extLst>
-      <p:ext uri="{BB962C8B-B14F-4D97-AF65-F5344CB8AC3E}">
-        <p14:creationId xmlns:p14="http://schemas.microsoft.com/office/powerpoint/2010/main" val="3571484654"/>
-      </p:ext>
-    </p:extLst>
-  </p:cSld>
-  <p:clrMapOvr>
-    <a:masterClrMapping/>
-  </p:clrMapOvr>
-</p:sld>
-</file>
-
-<file path=ppt/slides/slide7.xml><?xml version="1.0" encoding="utf-8"?>
-<p:sld xmlns:a="http://schemas.openxmlformats.org/drawingml/2006/main" xmlns:r="http://schemas.openxmlformats.org/officeDocument/2006/relationships" xmlns:p="http://schemas.openxmlformats.org/presentationml/2006/main">
-  <p:cSld>
-    <p:spTree>
-      <p:nvGrpSpPr>
-        <p:cNvPr id="1" name=""/>
-        <p:cNvGrpSpPr/>
-        <p:nvPr/>
-      </p:nvGrpSpPr>
-      <p:grpSpPr>
-        <a:xfrm>
-          <a:off x="0" y="0"/>
-          <a:ext cx="0" cy="0"/>
-          <a:chOff x="0" y="0"/>
-          <a:chExt cx="0" cy="0"/>
-        </a:xfrm>
-      </p:grpSpPr>
-      <p:sp>
-        <p:nvSpPr>
-          <p:cNvPr id="2" name="Title 1"/>
-          <p:cNvSpPr>
-            <a:spLocks noGrp="1"/>
-          </p:cNvSpPr>
-          <p:nvPr>
-            <p:ph type="title"/>
-          </p:nvPr>
-        </p:nvSpPr>
-        <p:spPr>
-          <a:xfrm>
-            <a:off x="0" y="0"/>
-            <a:ext cx="7477125" cy="835025"/>
-          </a:xfrm>
-        </p:spPr>
-        <p:txBody>
-          <a:bodyPr/>
-          <a:lstStyle/>
-          <a:p>
-            <a:r>
-              <a:rPr lang="en-US" dirty="0"/>
-              <a:t>Creating a Repository</a:t>
-            </a:r>
-          </a:p>
-        </p:txBody>
-      </p:sp>
-      <p:sp>
-        <p:nvSpPr>
-          <p:cNvPr id="3" name="Content Placeholder 2"/>
-          <p:cNvSpPr>
-            <a:spLocks noGrp="1"/>
-          </p:cNvSpPr>
-          <p:nvPr>
-            <p:ph idx="1"/>
-          </p:nvPr>
-        </p:nvSpPr>
-        <p:spPr>
-          <a:xfrm>
-            <a:off x="638175" y="1382712"/>
-            <a:ext cx="10515600" cy="4351338"/>
-          </a:xfrm>
-        </p:spPr>
-        <p:txBody>
-          <a:bodyPr/>
-          <a:lstStyle/>
-          <a:p>
-            <a:pPr marL="0" indent="0">
-              <a:buNone/>
-            </a:pPr>
-            <a:r>
-              <a:rPr lang="en-US" dirty="0" smtClean="0"/>
-              <a:t>Questions</a:t>
-            </a:r>
-          </a:p>
-          <a:p>
-            <a:r>
-              <a:rPr lang="en-US" dirty="0"/>
-              <a:t>Where does </a:t>
-            </a:r>
-            <a:r>
-              <a:rPr lang="en-US" dirty="0" err="1"/>
-              <a:t>Git</a:t>
-            </a:r>
-            <a:r>
-              <a:rPr lang="en-US" dirty="0"/>
-              <a:t> store information</a:t>
-            </a:r>
-            <a:r>
-              <a:rPr lang="en-US" dirty="0" smtClean="0"/>
-              <a:t>?</a:t>
-            </a:r>
-          </a:p>
-          <a:p>
-            <a:endParaRPr lang="en-US" dirty="0"/>
-          </a:p>
-          <a:p>
-            <a:pPr marL="0" indent="0">
-              <a:buNone/>
-            </a:pPr>
-            <a:r>
-              <a:rPr lang="en-US" dirty="0" smtClean="0"/>
-              <a:t>Objectives</a:t>
-            </a:r>
-          </a:p>
-          <a:p>
-            <a:r>
-              <a:rPr lang="en-US" dirty="0"/>
-              <a:t>Create a local </a:t>
-            </a:r>
-            <a:r>
-              <a:rPr lang="en-US" dirty="0" err="1"/>
-              <a:t>Git</a:t>
-            </a:r>
-            <a:r>
-              <a:rPr lang="en-US" dirty="0"/>
-              <a:t> </a:t>
-            </a:r>
-            <a:r>
-              <a:rPr lang="en-US" dirty="0" smtClean="0"/>
-              <a:t>repository.</a:t>
-            </a:r>
-          </a:p>
-        </p:txBody>
-      </p:sp>
-    </p:spTree>
-    <p:extLst>
-      <p:ext uri="{BB962C8B-B14F-4D97-AF65-F5344CB8AC3E}">
-        <p14:creationId xmlns:p14="http://schemas.microsoft.com/office/powerpoint/2010/main" val="2054788388"/>
       </p:ext>
     </p:extLst>
   </p:cSld>
@@ -5818,9 +8248,10 @@
           <a:lstStyle/>
           <a:p>
             <a:r>
-              <a:rPr lang="en-US" dirty="0"/>
-              <a:t>Tracking Changes</a:t>
-            </a:r>
+              <a:rPr lang="en-US" dirty="0" smtClean="0"/>
+              <a:t>Automated Version Control</a:t>
+            </a:r>
+            <a:endParaRPr lang="en-US" dirty="0"/>
           </a:p>
         </p:txBody>
       </p:sp>
@@ -5841,9 +8272,7 @@
           </a:xfrm>
         </p:spPr>
         <p:txBody>
-          <a:bodyPr>
-            <a:normAutofit lnSpcReduction="10000"/>
-          </a:bodyPr>
+          <a:bodyPr/>
           <a:lstStyle/>
           <a:p>
             <a:pPr marL="0" indent="0">
@@ -5851,17 +8280,21 @@
             </a:pPr>
             <a:r>
               <a:rPr lang="en-US" dirty="0" smtClean="0"/>
-              <a:t>Questions</a:t>
-            </a:r>
-          </a:p>
-          <a:p>
-            <a:r>
-              <a:rPr lang="en-US" dirty="0" smtClean="0"/>
-              <a:t>How do I record changes in </a:t>
-            </a:r>
-            <a:r>
-              <a:rPr lang="en-US" dirty="0" err="1" smtClean="0"/>
-              <a:t>Git</a:t>
+              <a:t>Exercises </a:t>
+            </a:r>
+          </a:p>
+          <a:p>
+            <a:r>
+              <a:rPr lang="en-US" dirty="0"/>
+              <a:t>Imagine you drafted an excellent paragraph for a paper you are writing, but later ruin it. How would you retrieve the </a:t>
+            </a:r>
+            <a:r>
+              <a:rPr lang="en-US" i="1" u="sng" dirty="0"/>
+              <a:t>excellent</a:t>
+            </a:r>
+            <a:r>
+              <a:rPr lang="en-US" dirty="0"/>
+              <a:t> version of your conclusion? Is it even possible</a:t>
             </a:r>
             <a:r>
               <a:rPr lang="en-US" dirty="0" smtClean="0"/>
@@ -5869,68 +8302,32 @@
             </a:r>
           </a:p>
           <a:p>
-            <a:r>
-              <a:rPr lang="en-US" dirty="0" smtClean="0"/>
-              <a:t>How do I check the status of my version control repository?</a:t>
-            </a:r>
-          </a:p>
-          <a:p>
-            <a:r>
-              <a:rPr lang="en-US" dirty="0" smtClean="0"/>
-              <a:t>How do I record notes about what changes I made and why?</a:t>
-            </a:r>
-          </a:p>
-          <a:p>
             <a:endParaRPr lang="en-US" dirty="0"/>
           </a:p>
           <a:p>
+            <a:r>
+              <a:rPr lang="en-US" dirty="0"/>
+              <a:t>Imagine you have 5 co-authors. How would you manage the changes and comments they make to your paper? If you use LibreOffice Writer or Microsoft Word, what happens if you accept changes made using the Track Changes option? Do you have a history of those changes?</a:t>
+            </a:r>
+          </a:p>
+          <a:p>
             <a:pPr marL="0" indent="0">
               <a:buNone/>
             </a:pPr>
-            <a:r>
-              <a:rPr lang="en-US" dirty="0" smtClean="0"/>
-              <a:t>Objectives</a:t>
-            </a:r>
-          </a:p>
-          <a:p>
-            <a:r>
-              <a:rPr lang="en-US" dirty="0" smtClean="0"/>
-              <a:t>Go through the modify-add-commit cycle for one or more files.</a:t>
-            </a:r>
-          </a:p>
-          <a:p>
-            <a:r>
-              <a:rPr lang="en-US" dirty="0" smtClean="0"/>
-              <a:t>Explain where information is stored at each stage of </a:t>
-            </a:r>
-            <a:r>
-              <a:rPr lang="en-US" dirty="0" err="1" smtClean="0"/>
-              <a:t>Git</a:t>
-            </a:r>
-            <a:r>
-              <a:rPr lang="en-US" dirty="0" smtClean="0"/>
-              <a:t> commit workflow.</a:t>
-            </a:r>
+            <a:endParaRPr lang="en-US" dirty="0" smtClean="0"/>
           </a:p>
         </p:txBody>
       </p:sp>
     </p:spTree>
     <p:extLst>
       <p:ext uri="{BB962C8B-B14F-4D97-AF65-F5344CB8AC3E}">
-        <p14:creationId xmlns:p14="http://schemas.microsoft.com/office/powerpoint/2010/main" val="433876125"/>
+        <p14:creationId xmlns:p14="http://schemas.microsoft.com/office/powerpoint/2010/main" val="884195965"/>
       </p:ext>
     </p:extLst>
   </p:cSld>
   <p:clrMapOvr>
     <a:masterClrMapping/>
   </p:clrMapOvr>
-  <p:timing>
-    <p:tnLst>
-      <p:par>
-        <p:cTn id="1" dur="indefinite" restart="never" nodeType="tmRoot"/>
-      </p:par>
-    </p:tnLst>
-  </p:timing>
 </p:sld>
 </file>
 
@@ -5951,53 +8348,125 @@
           <a:chExt cx="0" cy="0"/>
         </a:xfrm>
       </p:grpSpPr>
-      <p:pic>
-        <p:nvPicPr>
-          <p:cNvPr id="2" name="Picture 1"/>
-          <p:cNvPicPr>
-            <a:picLocks noChangeAspect="1"/>
-          </p:cNvPicPr>
-          <p:nvPr/>
-        </p:nvPicPr>
-        <p:blipFill>
-          <a:blip r:embed="rId2">
-            <a:extLst>
-              <a:ext uri="{28A0092B-C50C-407E-A947-70E740481C1C}">
-                <a14:useLocalDpi xmlns:a14="http://schemas.microsoft.com/office/drawing/2010/main" val="0"/>
-              </a:ext>
-            </a:extLst>
-          </a:blip>
-          <a:stretch>
-            <a:fillRect/>
-          </a:stretch>
-        </p:blipFill>
+      <p:sp>
+        <p:nvSpPr>
+          <p:cNvPr id="2" name="Title 1"/>
+          <p:cNvSpPr>
+            <a:spLocks noGrp="1"/>
+          </p:cNvSpPr>
+          <p:nvPr>
+            <p:ph type="title"/>
+          </p:nvPr>
+        </p:nvSpPr>
         <p:spPr>
           <a:xfrm>
-            <a:off x="2550204" y="1792827"/>
-            <a:ext cx="6320068" cy="2215072"/>
+            <a:off x="0" y="0"/>
+            <a:ext cx="7477125" cy="835025"/>
           </a:xfrm>
-          <a:prstGeom prst="rect">
-            <a:avLst/>
-          </a:prstGeom>
         </p:spPr>
-      </p:pic>
+        <p:txBody>
+          <a:bodyPr/>
+          <a:lstStyle/>
+          <a:p>
+            <a:r>
+              <a:rPr lang="en-US" dirty="0" smtClean="0"/>
+              <a:t>Setting Up </a:t>
+            </a:r>
+            <a:r>
+              <a:rPr lang="en-US" dirty="0" err="1" smtClean="0"/>
+              <a:t>Git</a:t>
+            </a:r>
+            <a:endParaRPr lang="en-US" dirty="0"/>
+          </a:p>
+        </p:txBody>
+      </p:sp>
+      <p:sp>
+        <p:nvSpPr>
+          <p:cNvPr id="3" name="Content Placeholder 2"/>
+          <p:cNvSpPr>
+            <a:spLocks noGrp="1"/>
+          </p:cNvSpPr>
+          <p:nvPr>
+            <p:ph idx="1"/>
+          </p:nvPr>
+        </p:nvSpPr>
+        <p:spPr>
+          <a:xfrm>
+            <a:off x="638175" y="1382712"/>
+            <a:ext cx="10515600" cy="4351338"/>
+          </a:xfrm>
+        </p:spPr>
+        <p:txBody>
+          <a:bodyPr/>
+          <a:lstStyle/>
+          <a:p>
+            <a:pPr marL="0" indent="0">
+              <a:buNone/>
+            </a:pPr>
+            <a:r>
+              <a:rPr lang="en-US" dirty="0" smtClean="0"/>
+              <a:t>Questions</a:t>
+            </a:r>
+          </a:p>
+          <a:p>
+            <a:r>
+              <a:rPr lang="en-US" dirty="0" smtClean="0"/>
+              <a:t>How do I get set up to use </a:t>
+            </a:r>
+            <a:r>
+              <a:rPr lang="en-US" dirty="0" err="1" smtClean="0"/>
+              <a:t>Git</a:t>
+            </a:r>
+            <a:r>
+              <a:rPr lang="en-US" dirty="0" smtClean="0"/>
+              <a:t>?</a:t>
+            </a:r>
+          </a:p>
+          <a:p>
+            <a:endParaRPr lang="en-US" dirty="0"/>
+          </a:p>
+          <a:p>
+            <a:pPr marL="0" indent="0">
+              <a:buNone/>
+            </a:pPr>
+            <a:r>
+              <a:rPr lang="en-US" dirty="0" smtClean="0"/>
+              <a:t>Objectives</a:t>
+            </a:r>
+          </a:p>
+          <a:p>
+            <a:r>
+              <a:rPr lang="en-US" dirty="0" smtClean="0"/>
+              <a:t>Configure </a:t>
+            </a:r>
+            <a:r>
+              <a:rPr lang="en-US" dirty="0" err="1" smtClean="0"/>
+              <a:t>git</a:t>
+            </a:r>
+            <a:r>
+              <a:rPr lang="en-US" dirty="0" smtClean="0"/>
+              <a:t> the first time it is used on a computer.</a:t>
+            </a:r>
+          </a:p>
+          <a:p>
+            <a:r>
+              <a:rPr lang="en-US" dirty="0" smtClean="0"/>
+              <a:t>Understand the meaning of the --global configuration flag.</a:t>
+            </a:r>
+            <a:endParaRPr lang="en-US" dirty="0"/>
+          </a:p>
+        </p:txBody>
+      </p:sp>
     </p:spTree>
     <p:extLst>
       <p:ext uri="{BB962C8B-B14F-4D97-AF65-F5344CB8AC3E}">
-        <p14:creationId xmlns:p14="http://schemas.microsoft.com/office/powerpoint/2010/main" val="2788337564"/>
+        <p14:creationId xmlns:p14="http://schemas.microsoft.com/office/powerpoint/2010/main" val="3571484654"/>
       </p:ext>
     </p:extLst>
   </p:cSld>
   <p:clrMapOvr>
     <a:masterClrMapping/>
   </p:clrMapOvr>
-  <p:timing>
-    <p:tnLst>
-      <p:par>
-        <p:cTn id="1" dur="indefinite" restart="never" nodeType="tmRoot"/>
-      </p:par>
-    </p:tnLst>
-  </p:timing>
 </p:sld>
 </file>
 
@@ -6256,7 +8725,7 @@
   <a:extraClrSchemeLst/>
   <a:extLst>
     <a:ext uri="{05A4C25C-085E-4340-85A3-A5531E510DB2}">
-      <thm15:themeFamily xmlns:thm15="http://schemas.microsoft.com/office/thememl/2012/main" xmlns="" name="Office Theme" id="{62F939B6-93AF-4DB8-9C6B-D6C7DFDC589F}" vid="{4A3C46E8-61CC-4603-A589-7422A47A8E4A}"/>
+      <thm15:themeFamily xmlns:thm15="http://schemas.microsoft.com/office/thememl/2012/main" name="Office Theme" id="{62F939B6-93AF-4DB8-9C6B-D6C7DFDC589F}" vid="{4A3C46E8-61CC-4603-A589-7422A47A8E4A}"/>
     </a:ext>
   </a:extLst>
 </a:theme>

</xml_diff>